<commit_message>
Fluids Review summary added
</commit_message>
<xml_diff>
--- a/AguaClara Water Treatment Plant Design/Summary Sheets/Diagrams.pptx
+++ b/AguaClara Water Treatment Plant Design/Summary Sheets/Diagrams.pptx
@@ -260,7 +260,7 @@
           <a:p>
             <a:fld id="{21D1E3DE-262E-49AD-8F92-4417FBCF3DA3}" type="datetimeFigureOut">
               <a:rPr lang="en-US" smtClean="0"/>
-              <a:t>4/8/2018</a:t>
+              <a:t>4/9/2018</a:t>
             </a:fld>
             <a:endParaRPr lang="en-US"/>
           </a:p>
@@ -458,7 +458,7 @@
           <a:p>
             <a:fld id="{21D1E3DE-262E-49AD-8F92-4417FBCF3DA3}" type="datetimeFigureOut">
               <a:rPr lang="en-US" smtClean="0"/>
-              <a:t>4/8/2018</a:t>
+              <a:t>4/9/2018</a:t>
             </a:fld>
             <a:endParaRPr lang="en-US"/>
           </a:p>
@@ -666,7 +666,7 @@
           <a:p>
             <a:fld id="{21D1E3DE-262E-49AD-8F92-4417FBCF3DA3}" type="datetimeFigureOut">
               <a:rPr lang="en-US" smtClean="0"/>
-              <a:t>4/8/2018</a:t>
+              <a:t>4/9/2018</a:t>
             </a:fld>
             <a:endParaRPr lang="en-US"/>
           </a:p>
@@ -864,7 +864,7 @@
           <a:p>
             <a:fld id="{21D1E3DE-262E-49AD-8F92-4417FBCF3DA3}" type="datetimeFigureOut">
               <a:rPr lang="en-US" smtClean="0"/>
-              <a:t>4/8/2018</a:t>
+              <a:t>4/9/2018</a:t>
             </a:fld>
             <a:endParaRPr lang="en-US"/>
           </a:p>
@@ -1139,7 +1139,7 @@
           <a:p>
             <a:fld id="{21D1E3DE-262E-49AD-8F92-4417FBCF3DA3}" type="datetimeFigureOut">
               <a:rPr lang="en-US" smtClean="0"/>
-              <a:t>4/8/2018</a:t>
+              <a:t>4/9/2018</a:t>
             </a:fld>
             <a:endParaRPr lang="en-US"/>
           </a:p>
@@ -1404,7 +1404,7 @@
           <a:p>
             <a:fld id="{21D1E3DE-262E-49AD-8F92-4417FBCF3DA3}" type="datetimeFigureOut">
               <a:rPr lang="en-US" smtClean="0"/>
-              <a:t>4/8/2018</a:t>
+              <a:t>4/9/2018</a:t>
             </a:fld>
             <a:endParaRPr lang="en-US"/>
           </a:p>
@@ -1816,7 +1816,7 @@
           <a:p>
             <a:fld id="{21D1E3DE-262E-49AD-8F92-4417FBCF3DA3}" type="datetimeFigureOut">
               <a:rPr lang="en-US" smtClean="0"/>
-              <a:t>4/8/2018</a:t>
+              <a:t>4/9/2018</a:t>
             </a:fld>
             <a:endParaRPr lang="en-US"/>
           </a:p>
@@ -1957,7 +1957,7 @@
           <a:p>
             <a:fld id="{21D1E3DE-262E-49AD-8F92-4417FBCF3DA3}" type="datetimeFigureOut">
               <a:rPr lang="en-US" smtClean="0"/>
-              <a:t>4/8/2018</a:t>
+              <a:t>4/9/2018</a:t>
             </a:fld>
             <a:endParaRPr lang="en-US"/>
           </a:p>
@@ -2070,7 +2070,7 @@
           <a:p>
             <a:fld id="{21D1E3DE-262E-49AD-8F92-4417FBCF3DA3}" type="datetimeFigureOut">
               <a:rPr lang="en-US" smtClean="0"/>
-              <a:t>4/8/2018</a:t>
+              <a:t>4/9/2018</a:t>
             </a:fld>
             <a:endParaRPr lang="en-US"/>
           </a:p>
@@ -2381,7 +2381,7 @@
           <a:p>
             <a:fld id="{21D1E3DE-262E-49AD-8F92-4417FBCF3DA3}" type="datetimeFigureOut">
               <a:rPr lang="en-US" smtClean="0"/>
-              <a:t>4/8/2018</a:t>
+              <a:t>4/9/2018</a:t>
             </a:fld>
             <a:endParaRPr lang="en-US"/>
           </a:p>
@@ -2669,7 +2669,7 @@
           <a:p>
             <a:fld id="{21D1E3DE-262E-49AD-8F92-4417FBCF3DA3}" type="datetimeFigureOut">
               <a:rPr lang="en-US" smtClean="0"/>
-              <a:t>4/8/2018</a:t>
+              <a:t>4/9/2018</a:t>
             </a:fld>
             <a:endParaRPr lang="en-US"/>
           </a:p>
@@ -2910,7 +2910,7 @@
           <a:p>
             <a:fld id="{21D1E3DE-262E-49AD-8F92-4417FBCF3DA3}" type="datetimeFigureOut">
               <a:rPr lang="en-US" smtClean="0"/>
-              <a:t>4/8/2018</a:t>
+              <a:t>4/9/2018</a:t>
             </a:fld>
             <a:endParaRPr lang="en-US"/>
           </a:p>

</xml_diff>

<commit_message>
major edits to fluids review powerpoint
</commit_message>
<xml_diff>
--- a/AguaClara Water Treatment Plant Design/Summary Sheets/Diagrams.pptx
+++ b/AguaClara Water Treatment Plant Design/Summary Sheets/Diagrams.pptx
@@ -7,6 +7,8 @@
   <p:sldIdLst>
     <p:sldId id="256" r:id="rId2"/>
     <p:sldId id="257" r:id="rId3"/>
+    <p:sldId id="258" r:id="rId4"/>
+    <p:sldId id="259" r:id="rId5"/>
   </p:sldIdLst>
   <p:sldSz cx="12192000" cy="6858000"/>
   <p:notesSz cx="6858000" cy="9144000"/>
@@ -6774,7 +6776,7 @@
             <p:spPr bwMode="auto">
               <a:xfrm>
                 <a:off x="6010433" y="1939353"/>
-                <a:ext cx="549318" cy="461665"/>
+                <a:ext cx="630685" cy="461665"/>
               </a:xfrm>
               <a:prstGeom prst="rect">
                 <a:avLst/>
@@ -6794,18 +6796,18 @@
               <a:lstStyle/>
               <a:p>
                 <a:r>
-                  <a:rPr lang="en-US" sz="2400" dirty="0">
+                  <a:rPr lang="en-US" sz="2400" dirty="0" err="1">
                     <a:latin typeface="Times New Roman" panose="02020603050405020304" pitchFamily="18" charset="0"/>
                     <a:cs typeface="Times New Roman" panose="02020603050405020304" pitchFamily="18" charset="0"/>
                   </a:rPr>
                   <a:t>V</a:t>
                 </a:r>
                 <a:r>
-                  <a:rPr lang="en-US" sz="2400" baseline="-25000" dirty="0">
+                  <a:rPr lang="en-US" sz="2400" baseline="-25000" dirty="0" err="1">
                     <a:latin typeface="Times New Roman" panose="02020603050405020304" pitchFamily="18" charset="0"/>
                     <a:cs typeface="Times New Roman" panose="02020603050405020304" pitchFamily="18" charset="0"/>
                   </a:rPr>
-                  <a:t>in</a:t>
+                  <a:t>out</a:t>
                 </a:r>
                 <a:endParaRPr lang="en-US" sz="2400" dirty="0">
                   <a:latin typeface="Times New Roman" panose="02020603050405020304" pitchFamily="18" charset="0"/>
@@ -6906,6 +6908,2493 @@
     <p:extLst>
       <p:ext uri="{BB962C8B-B14F-4D97-AF65-F5344CB8AC3E}">
         <p14:creationId xmlns:p14="http://schemas.microsoft.com/office/powerpoint/2010/main" val="913652694"/>
+      </p:ext>
+    </p:extLst>
+  </p:cSld>
+  <p:clrMapOvr>
+    <a:masterClrMapping/>
+  </p:clrMapOvr>
+</p:sld>
+</file>
+
+<file path=ppt/slides/slide3.xml><?xml version="1.0" encoding="utf-8"?>
+<p:sld xmlns:a="http://schemas.openxmlformats.org/drawingml/2006/main" xmlns:r="http://schemas.openxmlformats.org/officeDocument/2006/relationships" xmlns:p="http://schemas.openxmlformats.org/presentationml/2006/main">
+  <p:cSld>
+    <p:spTree>
+      <p:nvGrpSpPr>
+        <p:cNvPr id="1" name=""/>
+        <p:cNvGrpSpPr/>
+        <p:nvPr/>
+      </p:nvGrpSpPr>
+      <p:grpSpPr>
+        <a:xfrm>
+          <a:off x="0" y="0"/>
+          <a:ext cx="0" cy="0"/>
+          <a:chOff x="0" y="0"/>
+          <a:chExt cx="0" cy="0"/>
+        </a:xfrm>
+      </p:grpSpPr>
+      <p:grpSp>
+        <p:nvGrpSpPr>
+          <p:cNvPr id="9" name="Group 8">
+            <a:extLst>
+              <a:ext uri="{FF2B5EF4-FFF2-40B4-BE49-F238E27FC236}">
+                <a16:creationId xmlns:a16="http://schemas.microsoft.com/office/drawing/2014/main" id="{C1F5878A-7542-461E-96A9-FCCB92BED5C2}"/>
+              </a:ext>
+            </a:extLst>
+          </p:cNvPr>
+          <p:cNvGrpSpPr/>
+          <p:nvPr/>
+        </p:nvGrpSpPr>
+        <p:grpSpPr>
+          <a:xfrm>
+            <a:off x="1038572" y="1534669"/>
+            <a:ext cx="8585964" cy="4004802"/>
+            <a:chOff x="1038572" y="1534669"/>
+            <a:chExt cx="8585964" cy="4004802"/>
+          </a:xfrm>
+        </p:grpSpPr>
+        <p:grpSp>
+          <p:nvGrpSpPr>
+            <p:cNvPr id="7" name="Group 6">
+              <a:extLst>
+                <a:ext uri="{FF2B5EF4-FFF2-40B4-BE49-F238E27FC236}">
+                  <a16:creationId xmlns:a16="http://schemas.microsoft.com/office/drawing/2014/main" id="{8F88794D-D3AF-4215-96B6-C33C7949C9B5}"/>
+                </a:ext>
+              </a:extLst>
+            </p:cNvPr>
+            <p:cNvGrpSpPr/>
+            <p:nvPr/>
+          </p:nvGrpSpPr>
+          <p:grpSpPr>
+            <a:xfrm>
+              <a:off x="1038572" y="1534669"/>
+              <a:ext cx="8585964" cy="4004802"/>
+              <a:chOff x="1038572" y="1534669"/>
+              <a:chExt cx="8585964" cy="4004802"/>
+            </a:xfrm>
+          </p:grpSpPr>
+          <p:sp>
+            <p:nvSpPr>
+              <p:cNvPr id="50" name="Freeform 6">
+                <a:extLst>
+                  <a:ext uri="{FF2B5EF4-FFF2-40B4-BE49-F238E27FC236}">
+                    <a16:creationId xmlns:a16="http://schemas.microsoft.com/office/drawing/2014/main" id="{2B4BD6E5-C3A2-459A-9050-3C2BBC98649B}"/>
+                  </a:ext>
+                </a:extLst>
+              </p:cNvPr>
+              <p:cNvSpPr>
+                <a:spLocks/>
+              </p:cNvSpPr>
+              <p:nvPr/>
+            </p:nvSpPr>
+            <p:spPr bwMode="auto">
+              <a:xfrm>
+                <a:off x="1722572" y="2339071"/>
+                <a:ext cx="3336367" cy="1828800"/>
+              </a:xfrm>
+              <a:custGeom>
+                <a:avLst/>
+                <a:gdLst/>
+                <a:ahLst/>
+                <a:cxnLst>
+                  <a:cxn ang="0">
+                    <a:pos x="0" y="0"/>
+                  </a:cxn>
+                  <a:cxn ang="0">
+                    <a:pos x="0" y="528"/>
+                  </a:cxn>
+                  <a:cxn ang="0">
+                    <a:pos x="3216" y="528"/>
+                  </a:cxn>
+                  <a:cxn ang="0">
+                    <a:pos x="3216" y="0"/>
+                  </a:cxn>
+                </a:cxnLst>
+                <a:rect l="0" t="0" r="r" b="b"/>
+                <a:pathLst>
+                  <a:path w="3216" h="528">
+                    <a:moveTo>
+                      <a:pt x="0" y="0"/>
+                    </a:moveTo>
+                    <a:lnTo>
+                      <a:pt x="0" y="528"/>
+                    </a:lnTo>
+                    <a:lnTo>
+                      <a:pt x="3216" y="528"/>
+                    </a:lnTo>
+                    <a:lnTo>
+                      <a:pt x="3216" y="0"/>
+                    </a:lnTo>
+                  </a:path>
+                </a:pathLst>
+              </a:custGeom>
+              <a:solidFill>
+                <a:schemeClr val="hlink"/>
+              </a:solidFill>
+              <a:ln w="57150" cap="flat" cmpd="sng">
+                <a:solidFill>
+                  <a:schemeClr val="tx1"/>
+                </a:solidFill>
+                <a:prstDash val="solid"/>
+                <a:round/>
+                <a:headEnd type="none" w="lg" len="med"/>
+                <a:tailEnd type="none" w="lg" len="med"/>
+              </a:ln>
+              <a:effectLst/>
+            </p:spPr>
+            <p:txBody>
+              <a:bodyPr wrap="square" anchor="ctr">
+                <a:spAutoFit/>
+              </a:bodyPr>
+              <a:lstStyle/>
+              <a:p>
+                <a:endParaRPr lang="en-US"/>
+              </a:p>
+            </p:txBody>
+          </p:sp>
+          <p:sp>
+            <p:nvSpPr>
+              <p:cNvPr id="51" name="AutoShape 13">
+                <a:extLst>
+                  <a:ext uri="{FF2B5EF4-FFF2-40B4-BE49-F238E27FC236}">
+                    <a16:creationId xmlns:a16="http://schemas.microsoft.com/office/drawing/2014/main" id="{22C7A6E7-4D39-45FE-B38C-2EC620390B32}"/>
+                  </a:ext>
+                </a:extLst>
+              </p:cNvPr>
+              <p:cNvSpPr>
+                <a:spLocks noChangeArrowheads="1"/>
+              </p:cNvSpPr>
+              <p:nvPr/>
+            </p:nvSpPr>
+            <p:spPr bwMode="auto">
+              <a:xfrm>
+                <a:off x="3163177" y="4065967"/>
+                <a:ext cx="728663" cy="1399032"/>
+              </a:xfrm>
+              <a:custGeom>
+                <a:avLst/>
+                <a:gdLst>
+                  <a:gd name="G0" fmla="+- 6871 0 0"/>
+                  <a:gd name="G1" fmla="+- 21600 0 6871"/>
+                  <a:gd name="G2" fmla="*/ 6871 1 2"/>
+                  <a:gd name="G3" fmla="+- 21600 0 G2"/>
+                  <a:gd name="G4" fmla="+/ 6871 21600 2"/>
+                  <a:gd name="G5" fmla="+/ G1 0 2"/>
+                  <a:gd name="G6" fmla="*/ 21600 21600 6871"/>
+                  <a:gd name="G7" fmla="*/ G6 1 2"/>
+                  <a:gd name="G8" fmla="+- 21600 0 G7"/>
+                  <a:gd name="G9" fmla="*/ 21600 1 2"/>
+                  <a:gd name="G10" fmla="+- 6871 0 G9"/>
+                  <a:gd name="G11" fmla="?: G10 G8 0"/>
+                  <a:gd name="G12" fmla="?: G10 G7 21600"/>
+                  <a:gd name="T0" fmla="*/ 18164 w 21600"/>
+                  <a:gd name="T1" fmla="*/ 10800 h 21600"/>
+                  <a:gd name="T2" fmla="*/ 10800 w 21600"/>
+                  <a:gd name="T3" fmla="*/ 21600 h 21600"/>
+                  <a:gd name="T4" fmla="*/ 3436 w 21600"/>
+                  <a:gd name="T5" fmla="*/ 10800 h 21600"/>
+                  <a:gd name="T6" fmla="*/ 10800 w 21600"/>
+                  <a:gd name="T7" fmla="*/ 0 h 21600"/>
+                  <a:gd name="T8" fmla="*/ 5236 w 21600"/>
+                  <a:gd name="T9" fmla="*/ 5236 h 21600"/>
+                  <a:gd name="T10" fmla="*/ 16364 w 21600"/>
+                  <a:gd name="T11" fmla="*/ 16364 h 21600"/>
+                </a:gdLst>
+                <a:ahLst/>
+                <a:cxnLst>
+                  <a:cxn ang="0">
+                    <a:pos x="T0" y="T1"/>
+                  </a:cxn>
+                  <a:cxn ang="0">
+                    <a:pos x="T2" y="T3"/>
+                  </a:cxn>
+                  <a:cxn ang="0">
+                    <a:pos x="T4" y="T5"/>
+                  </a:cxn>
+                  <a:cxn ang="0">
+                    <a:pos x="T6" y="T7"/>
+                  </a:cxn>
+                </a:cxnLst>
+                <a:rect l="T8" t="T9" r="T10" b="T11"/>
+                <a:pathLst>
+                  <a:path w="21600" h="21600">
+                    <a:moveTo>
+                      <a:pt x="0" y="0"/>
+                    </a:moveTo>
+                    <a:lnTo>
+                      <a:pt x="6871" y="21600"/>
+                    </a:lnTo>
+                    <a:lnTo>
+                      <a:pt x="14729" y="21600"/>
+                    </a:lnTo>
+                    <a:lnTo>
+                      <a:pt x="21600" y="0"/>
+                    </a:lnTo>
+                    <a:close/>
+                  </a:path>
+                </a:pathLst>
+              </a:custGeom>
+              <a:solidFill>
+                <a:schemeClr val="hlink"/>
+              </a:solidFill>
+              <a:ln w="12700">
+                <a:noFill/>
+                <a:miter lim="800000"/>
+                <a:headEnd type="none" w="lg" len="med"/>
+                <a:tailEnd type="none" w="lg" len="med"/>
+              </a:ln>
+              <a:effectLst/>
+            </p:spPr>
+            <p:txBody>
+              <a:bodyPr anchor="ctr">
+                <a:spAutoFit/>
+              </a:bodyPr>
+              <a:lstStyle/>
+              <a:p>
+                <a:endParaRPr lang="en-US"/>
+              </a:p>
+            </p:txBody>
+          </p:sp>
+          <p:grpSp>
+            <p:nvGrpSpPr>
+              <p:cNvPr id="52" name="Group 27">
+                <a:extLst>
+                  <a:ext uri="{FF2B5EF4-FFF2-40B4-BE49-F238E27FC236}">
+                    <a16:creationId xmlns:a16="http://schemas.microsoft.com/office/drawing/2014/main" id="{41A131C8-E9EB-4199-8BA2-4A411504E6F5}"/>
+                  </a:ext>
+                </a:extLst>
+              </p:cNvPr>
+              <p:cNvGrpSpPr>
+                <a:grpSpLocks/>
+              </p:cNvGrpSpPr>
+              <p:nvPr/>
+            </p:nvGrpSpPr>
+            <p:grpSpPr bwMode="auto">
+              <a:xfrm>
+                <a:off x="3151176" y="4150993"/>
+                <a:ext cx="740664" cy="1316736"/>
+                <a:chOff x="2480" y="2033"/>
+                <a:chExt cx="459" cy="1395"/>
+              </a:xfrm>
+            </p:grpSpPr>
+            <p:sp>
+              <p:nvSpPr>
+                <p:cNvPr id="75" name="Freeform 8">
+                  <a:extLst>
+                    <a:ext uri="{FF2B5EF4-FFF2-40B4-BE49-F238E27FC236}">
+                      <a16:creationId xmlns:a16="http://schemas.microsoft.com/office/drawing/2014/main" id="{0A55DB3D-9497-42C7-9EE3-8BB33652273C}"/>
+                    </a:ext>
+                  </a:extLst>
+                </p:cNvPr>
+                <p:cNvSpPr>
+                  <a:spLocks/>
+                </p:cNvSpPr>
+                <p:nvPr/>
+              </p:nvSpPr>
+              <p:spPr bwMode="auto">
+                <a:xfrm>
+                  <a:off x="2480" y="2033"/>
+                  <a:ext cx="147" cy="1395"/>
+                </a:xfrm>
+                <a:custGeom>
+                  <a:avLst/>
+                  <a:gdLst/>
+                  <a:ahLst/>
+                  <a:cxnLst>
+                    <a:cxn ang="0">
+                      <a:pos x="0" y="0"/>
+                    </a:cxn>
+                    <a:cxn ang="0">
+                      <a:pos x="111" y="232"/>
+                    </a:cxn>
+                    <a:cxn ang="0">
+                      <a:pos x="141" y="1395"/>
+                    </a:cxn>
+                  </a:cxnLst>
+                  <a:rect l="0" t="0" r="r" b="b"/>
+                  <a:pathLst>
+                    <a:path w="147" h="1395">
+                      <a:moveTo>
+                        <a:pt x="0" y="0"/>
+                      </a:moveTo>
+                      <a:cubicBezTo>
+                        <a:pt x="87" y="0"/>
+                        <a:pt x="106" y="174"/>
+                        <a:pt x="111" y="232"/>
+                      </a:cubicBezTo>
+                      <a:cubicBezTo>
+                        <a:pt x="116" y="290"/>
+                        <a:pt x="147" y="1084"/>
+                        <a:pt x="141" y="1395"/>
+                      </a:cubicBezTo>
+                    </a:path>
+                  </a:pathLst>
+                </a:custGeom>
+                <a:solidFill>
+                  <a:schemeClr val="bg1"/>
+                </a:solidFill>
+                <a:ln w="12700" cap="flat" cmpd="sng">
+                  <a:solidFill>
+                    <a:schemeClr val="hlink"/>
+                  </a:solidFill>
+                  <a:prstDash val="solid"/>
+                  <a:round/>
+                  <a:headEnd type="none" w="lg" len="med"/>
+                  <a:tailEnd type="none" w="lg" len="med"/>
+                </a:ln>
+                <a:effectLst/>
+              </p:spPr>
+              <p:txBody>
+                <a:bodyPr wrap="none" anchor="ctr">
+                  <a:spAutoFit/>
+                </a:bodyPr>
+                <a:lstStyle/>
+                <a:p>
+                  <a:endParaRPr lang="en-US"/>
+                </a:p>
+              </p:txBody>
+            </p:sp>
+            <p:sp>
+              <p:nvSpPr>
+                <p:cNvPr id="76" name="Freeform 15">
+                  <a:extLst>
+                    <a:ext uri="{FF2B5EF4-FFF2-40B4-BE49-F238E27FC236}">
+                      <a16:creationId xmlns:a16="http://schemas.microsoft.com/office/drawing/2014/main" id="{EAE13F74-1D37-4B6E-A647-D005203F749D}"/>
+                    </a:ext>
+                  </a:extLst>
+                </p:cNvPr>
+                <p:cNvSpPr>
+                  <a:spLocks/>
+                </p:cNvSpPr>
+                <p:nvPr/>
+              </p:nvSpPr>
+              <p:spPr bwMode="auto">
+                <a:xfrm flipH="1">
+                  <a:off x="2792" y="2033"/>
+                  <a:ext cx="147" cy="1395"/>
+                </a:xfrm>
+                <a:custGeom>
+                  <a:avLst/>
+                  <a:gdLst/>
+                  <a:ahLst/>
+                  <a:cxnLst>
+                    <a:cxn ang="0">
+                      <a:pos x="0" y="0"/>
+                    </a:cxn>
+                    <a:cxn ang="0">
+                      <a:pos x="111" y="232"/>
+                    </a:cxn>
+                    <a:cxn ang="0">
+                      <a:pos x="141" y="1395"/>
+                    </a:cxn>
+                  </a:cxnLst>
+                  <a:rect l="0" t="0" r="r" b="b"/>
+                  <a:pathLst>
+                    <a:path w="147" h="1395">
+                      <a:moveTo>
+                        <a:pt x="0" y="0"/>
+                      </a:moveTo>
+                      <a:cubicBezTo>
+                        <a:pt x="87" y="0"/>
+                        <a:pt x="106" y="174"/>
+                        <a:pt x="111" y="232"/>
+                      </a:cubicBezTo>
+                      <a:cubicBezTo>
+                        <a:pt x="116" y="290"/>
+                        <a:pt x="147" y="1084"/>
+                        <a:pt x="141" y="1395"/>
+                      </a:cubicBezTo>
+                    </a:path>
+                  </a:pathLst>
+                </a:custGeom>
+                <a:solidFill>
+                  <a:schemeClr val="bg1"/>
+                </a:solidFill>
+                <a:ln w="12700" cap="flat" cmpd="sng">
+                  <a:solidFill>
+                    <a:schemeClr val="hlink"/>
+                  </a:solidFill>
+                  <a:prstDash val="solid"/>
+                  <a:round/>
+                  <a:headEnd type="none" w="lg" len="med"/>
+                  <a:tailEnd type="none" w="lg" len="med"/>
+                </a:ln>
+                <a:effectLst/>
+              </p:spPr>
+              <p:txBody>
+                <a:bodyPr wrap="none" anchor="ctr">
+                  <a:spAutoFit/>
+                </a:bodyPr>
+                <a:lstStyle/>
+                <a:p>
+                  <a:endParaRPr lang="en-US"/>
+                </a:p>
+              </p:txBody>
+            </p:sp>
+          </p:grpSp>
+          <p:sp>
+            <p:nvSpPr>
+              <p:cNvPr id="53" name="Freeform 6">
+                <a:extLst>
+                  <a:ext uri="{FF2B5EF4-FFF2-40B4-BE49-F238E27FC236}">
+                    <a16:creationId xmlns:a16="http://schemas.microsoft.com/office/drawing/2014/main" id="{4651E136-A48F-44D0-BF34-93C34B553D6D}"/>
+                  </a:ext>
+                </a:extLst>
+              </p:cNvPr>
+              <p:cNvSpPr>
+                <a:spLocks/>
+              </p:cNvSpPr>
+              <p:nvPr/>
+            </p:nvSpPr>
+            <p:spPr bwMode="auto">
+              <a:xfrm>
+                <a:off x="5534888" y="2339071"/>
+                <a:ext cx="2152192" cy="3200400"/>
+              </a:xfrm>
+              <a:custGeom>
+                <a:avLst/>
+                <a:gdLst/>
+                <a:ahLst/>
+                <a:cxnLst>
+                  <a:cxn ang="0">
+                    <a:pos x="0" y="0"/>
+                  </a:cxn>
+                  <a:cxn ang="0">
+                    <a:pos x="0" y="528"/>
+                  </a:cxn>
+                  <a:cxn ang="0">
+                    <a:pos x="3216" y="528"/>
+                  </a:cxn>
+                  <a:cxn ang="0">
+                    <a:pos x="3216" y="0"/>
+                  </a:cxn>
+                </a:cxnLst>
+                <a:rect l="0" t="0" r="r" b="b"/>
+                <a:pathLst>
+                  <a:path w="3216" h="528">
+                    <a:moveTo>
+                      <a:pt x="0" y="0"/>
+                    </a:moveTo>
+                    <a:lnTo>
+                      <a:pt x="0" y="528"/>
+                    </a:lnTo>
+                    <a:lnTo>
+                      <a:pt x="3216" y="528"/>
+                    </a:lnTo>
+                    <a:lnTo>
+                      <a:pt x="3216" y="0"/>
+                    </a:lnTo>
+                  </a:path>
+                </a:pathLst>
+              </a:custGeom>
+              <a:solidFill>
+                <a:schemeClr val="hlink"/>
+              </a:solidFill>
+              <a:ln w="57150" cap="flat" cmpd="sng">
+                <a:solidFill>
+                  <a:schemeClr val="tx1"/>
+                </a:solidFill>
+                <a:prstDash val="solid"/>
+                <a:round/>
+                <a:headEnd type="none" w="lg" len="med"/>
+                <a:tailEnd type="none" w="lg" len="med"/>
+              </a:ln>
+              <a:effectLst/>
+            </p:spPr>
+            <p:txBody>
+              <a:bodyPr wrap="square" anchor="ctr">
+                <a:spAutoFit/>
+              </a:bodyPr>
+              <a:lstStyle/>
+              <a:p>
+                <a:endParaRPr lang="en-US"/>
+              </a:p>
+            </p:txBody>
+          </p:sp>
+          <p:sp>
+            <p:nvSpPr>
+              <p:cNvPr id="54" name="AutoShape 13">
+                <a:extLst>
+                  <a:ext uri="{FF2B5EF4-FFF2-40B4-BE49-F238E27FC236}">
+                    <a16:creationId xmlns:a16="http://schemas.microsoft.com/office/drawing/2014/main" id="{3C67FF5C-F25E-4E25-AA9C-D5770CF3A11F}"/>
+                  </a:ext>
+                </a:extLst>
+              </p:cNvPr>
+              <p:cNvSpPr>
+                <a:spLocks noChangeArrowheads="1"/>
+              </p:cNvSpPr>
+              <p:nvPr/>
+            </p:nvSpPr>
+            <p:spPr bwMode="auto">
+              <a:xfrm rot="16200000">
+                <a:off x="7611832" y="3829374"/>
+                <a:ext cx="749808" cy="694944"/>
+              </a:xfrm>
+              <a:custGeom>
+                <a:avLst/>
+                <a:gdLst>
+                  <a:gd name="G0" fmla="+- 6871 0 0"/>
+                  <a:gd name="G1" fmla="+- 21600 0 6871"/>
+                  <a:gd name="G2" fmla="*/ 6871 1 2"/>
+                  <a:gd name="G3" fmla="+- 21600 0 G2"/>
+                  <a:gd name="G4" fmla="+/ 6871 21600 2"/>
+                  <a:gd name="G5" fmla="+/ G1 0 2"/>
+                  <a:gd name="G6" fmla="*/ 21600 21600 6871"/>
+                  <a:gd name="G7" fmla="*/ G6 1 2"/>
+                  <a:gd name="G8" fmla="+- 21600 0 G7"/>
+                  <a:gd name="G9" fmla="*/ 21600 1 2"/>
+                  <a:gd name="G10" fmla="+- 6871 0 G9"/>
+                  <a:gd name="G11" fmla="?: G10 G8 0"/>
+                  <a:gd name="G12" fmla="?: G10 G7 21600"/>
+                  <a:gd name="T0" fmla="*/ 18164 w 21600"/>
+                  <a:gd name="T1" fmla="*/ 10800 h 21600"/>
+                  <a:gd name="T2" fmla="*/ 10800 w 21600"/>
+                  <a:gd name="T3" fmla="*/ 21600 h 21600"/>
+                  <a:gd name="T4" fmla="*/ 3436 w 21600"/>
+                  <a:gd name="T5" fmla="*/ 10800 h 21600"/>
+                  <a:gd name="T6" fmla="*/ 10800 w 21600"/>
+                  <a:gd name="T7" fmla="*/ 0 h 21600"/>
+                  <a:gd name="T8" fmla="*/ 5236 w 21600"/>
+                  <a:gd name="T9" fmla="*/ 5236 h 21600"/>
+                  <a:gd name="T10" fmla="*/ 16364 w 21600"/>
+                  <a:gd name="T11" fmla="*/ 16364 h 21600"/>
+                </a:gdLst>
+                <a:ahLst/>
+                <a:cxnLst>
+                  <a:cxn ang="0">
+                    <a:pos x="T0" y="T1"/>
+                  </a:cxn>
+                  <a:cxn ang="0">
+                    <a:pos x="T2" y="T3"/>
+                  </a:cxn>
+                  <a:cxn ang="0">
+                    <a:pos x="T4" y="T5"/>
+                  </a:cxn>
+                  <a:cxn ang="0">
+                    <a:pos x="T6" y="T7"/>
+                  </a:cxn>
+                </a:cxnLst>
+                <a:rect l="T8" t="T9" r="T10" b="T11"/>
+                <a:pathLst>
+                  <a:path w="21600" h="21600">
+                    <a:moveTo>
+                      <a:pt x="0" y="0"/>
+                    </a:moveTo>
+                    <a:lnTo>
+                      <a:pt x="6871" y="21600"/>
+                    </a:lnTo>
+                    <a:lnTo>
+                      <a:pt x="14729" y="21600"/>
+                    </a:lnTo>
+                    <a:lnTo>
+                      <a:pt x="21600" y="0"/>
+                    </a:lnTo>
+                    <a:close/>
+                  </a:path>
+                </a:pathLst>
+              </a:custGeom>
+              <a:solidFill>
+                <a:schemeClr val="hlink"/>
+              </a:solidFill>
+              <a:ln w="12700">
+                <a:noFill/>
+                <a:miter lim="800000"/>
+                <a:headEnd type="none" w="lg" len="med"/>
+                <a:tailEnd type="none" w="lg" len="med"/>
+              </a:ln>
+              <a:effectLst/>
+            </p:spPr>
+            <p:txBody>
+              <a:bodyPr wrap="square" anchor="ctr">
+                <a:spAutoFit/>
+              </a:bodyPr>
+              <a:lstStyle/>
+              <a:p>
+                <a:endParaRPr lang="en-US"/>
+              </a:p>
+            </p:txBody>
+          </p:sp>
+          <p:grpSp>
+            <p:nvGrpSpPr>
+              <p:cNvPr id="55" name="Group 54">
+                <a:extLst>
+                  <a:ext uri="{FF2B5EF4-FFF2-40B4-BE49-F238E27FC236}">
+                    <a16:creationId xmlns:a16="http://schemas.microsoft.com/office/drawing/2014/main" id="{4B6B3EE2-B7C9-43C7-992D-79CF64825B17}"/>
+                  </a:ext>
+                </a:extLst>
+              </p:cNvPr>
+              <p:cNvGrpSpPr>
+                <a:grpSpLocks/>
+              </p:cNvGrpSpPr>
+              <p:nvPr/>
+            </p:nvGrpSpPr>
+            <p:grpSpPr bwMode="auto">
+              <a:xfrm rot="16200000">
+                <a:off x="8231064" y="3207794"/>
+                <a:ext cx="740664" cy="1924262"/>
+                <a:chOff x="2480" y="2033"/>
+                <a:chExt cx="459" cy="1395"/>
+              </a:xfrm>
+            </p:grpSpPr>
+            <p:sp>
+              <p:nvSpPr>
+                <p:cNvPr id="73" name="Freeform 8">
+                  <a:extLst>
+                    <a:ext uri="{FF2B5EF4-FFF2-40B4-BE49-F238E27FC236}">
+                      <a16:creationId xmlns:a16="http://schemas.microsoft.com/office/drawing/2014/main" id="{94CBC85D-A3DA-4070-A99B-6710ED3D26C2}"/>
+                    </a:ext>
+                  </a:extLst>
+                </p:cNvPr>
+                <p:cNvSpPr>
+                  <a:spLocks/>
+                </p:cNvSpPr>
+                <p:nvPr/>
+              </p:nvSpPr>
+              <p:spPr bwMode="auto">
+                <a:xfrm>
+                  <a:off x="2480" y="2033"/>
+                  <a:ext cx="147" cy="1395"/>
+                </a:xfrm>
+                <a:custGeom>
+                  <a:avLst/>
+                  <a:gdLst/>
+                  <a:ahLst/>
+                  <a:cxnLst>
+                    <a:cxn ang="0">
+                      <a:pos x="0" y="0"/>
+                    </a:cxn>
+                    <a:cxn ang="0">
+                      <a:pos x="111" y="232"/>
+                    </a:cxn>
+                    <a:cxn ang="0">
+                      <a:pos x="141" y="1395"/>
+                    </a:cxn>
+                  </a:cxnLst>
+                  <a:rect l="0" t="0" r="r" b="b"/>
+                  <a:pathLst>
+                    <a:path w="147" h="1395">
+                      <a:moveTo>
+                        <a:pt x="0" y="0"/>
+                      </a:moveTo>
+                      <a:cubicBezTo>
+                        <a:pt x="87" y="0"/>
+                        <a:pt x="106" y="174"/>
+                        <a:pt x="111" y="232"/>
+                      </a:cubicBezTo>
+                      <a:cubicBezTo>
+                        <a:pt x="116" y="290"/>
+                        <a:pt x="147" y="1084"/>
+                        <a:pt x="141" y="1395"/>
+                      </a:cubicBezTo>
+                    </a:path>
+                  </a:pathLst>
+                </a:custGeom>
+                <a:solidFill>
+                  <a:schemeClr val="bg1"/>
+                </a:solidFill>
+                <a:ln w="12700" cap="flat" cmpd="sng">
+                  <a:solidFill>
+                    <a:schemeClr val="hlink"/>
+                  </a:solidFill>
+                  <a:prstDash val="solid"/>
+                  <a:round/>
+                  <a:headEnd type="none" w="lg" len="med"/>
+                  <a:tailEnd type="none" w="lg" len="med"/>
+                </a:ln>
+                <a:effectLst/>
+              </p:spPr>
+              <p:txBody>
+                <a:bodyPr wrap="none" anchor="ctr">
+                  <a:spAutoFit/>
+                </a:bodyPr>
+                <a:lstStyle/>
+                <a:p>
+                  <a:endParaRPr lang="en-US"/>
+                </a:p>
+              </p:txBody>
+            </p:sp>
+            <p:sp>
+              <p:nvSpPr>
+                <p:cNvPr id="74" name="Freeform 15">
+                  <a:extLst>
+                    <a:ext uri="{FF2B5EF4-FFF2-40B4-BE49-F238E27FC236}">
+                      <a16:creationId xmlns:a16="http://schemas.microsoft.com/office/drawing/2014/main" id="{D0D98E8B-EC8A-4D7A-B4B4-48B18931FBC4}"/>
+                    </a:ext>
+                  </a:extLst>
+                </p:cNvPr>
+                <p:cNvSpPr>
+                  <a:spLocks/>
+                </p:cNvSpPr>
+                <p:nvPr/>
+              </p:nvSpPr>
+              <p:spPr bwMode="auto">
+                <a:xfrm flipH="1">
+                  <a:off x="2792" y="2033"/>
+                  <a:ext cx="147" cy="1395"/>
+                </a:xfrm>
+                <a:custGeom>
+                  <a:avLst/>
+                  <a:gdLst/>
+                  <a:ahLst/>
+                  <a:cxnLst>
+                    <a:cxn ang="0">
+                      <a:pos x="0" y="0"/>
+                    </a:cxn>
+                    <a:cxn ang="0">
+                      <a:pos x="111" y="232"/>
+                    </a:cxn>
+                    <a:cxn ang="0">
+                      <a:pos x="141" y="1395"/>
+                    </a:cxn>
+                  </a:cxnLst>
+                  <a:rect l="0" t="0" r="r" b="b"/>
+                  <a:pathLst>
+                    <a:path w="147" h="1395">
+                      <a:moveTo>
+                        <a:pt x="0" y="0"/>
+                      </a:moveTo>
+                      <a:cubicBezTo>
+                        <a:pt x="87" y="0"/>
+                        <a:pt x="106" y="174"/>
+                        <a:pt x="111" y="232"/>
+                      </a:cubicBezTo>
+                      <a:cubicBezTo>
+                        <a:pt x="116" y="290"/>
+                        <a:pt x="147" y="1084"/>
+                        <a:pt x="141" y="1395"/>
+                      </a:cubicBezTo>
+                    </a:path>
+                  </a:pathLst>
+                </a:custGeom>
+                <a:solidFill>
+                  <a:schemeClr val="bg1"/>
+                </a:solidFill>
+                <a:ln w="12700" cap="flat" cmpd="sng">
+                  <a:solidFill>
+                    <a:schemeClr val="hlink"/>
+                  </a:solidFill>
+                  <a:prstDash val="solid"/>
+                  <a:round/>
+                  <a:headEnd type="none" w="lg" len="med"/>
+                  <a:tailEnd type="none" w="lg" len="med"/>
+                </a:ln>
+                <a:effectLst/>
+              </p:spPr>
+              <p:txBody>
+                <a:bodyPr wrap="none" anchor="ctr">
+                  <a:spAutoFit/>
+                </a:bodyPr>
+                <a:lstStyle/>
+                <a:p>
+                  <a:endParaRPr lang="en-US"/>
+                </a:p>
+              </p:txBody>
+            </p:sp>
+          </p:grpSp>
+          <p:sp>
+            <p:nvSpPr>
+              <p:cNvPr id="56" name="Rectangle 55">
+                <a:extLst>
+                  <a:ext uri="{FF2B5EF4-FFF2-40B4-BE49-F238E27FC236}">
+                    <a16:creationId xmlns:a16="http://schemas.microsoft.com/office/drawing/2014/main" id="{9B57DFC6-A94D-41B5-9872-9D95AD63F3AC}"/>
+                  </a:ext>
+                </a:extLst>
+              </p:cNvPr>
+              <p:cNvSpPr/>
+              <p:nvPr/>
+            </p:nvSpPr>
+            <p:spPr>
+              <a:xfrm>
+                <a:off x="8218961" y="3898121"/>
+                <a:ext cx="1405575" cy="508920"/>
+              </a:xfrm>
+              <a:prstGeom prst="rect">
+                <a:avLst/>
+              </a:prstGeom>
+              <a:solidFill>
+                <a:schemeClr val="bg1"/>
+              </a:solidFill>
+              <a:ln>
+                <a:solidFill>
+                  <a:schemeClr val="bg1"/>
+                </a:solidFill>
+              </a:ln>
+            </p:spPr>
+            <p:style>
+              <a:lnRef idx="2">
+                <a:schemeClr val="accent1">
+                  <a:shade val="50000"/>
+                </a:schemeClr>
+              </a:lnRef>
+              <a:fillRef idx="1">
+                <a:schemeClr val="accent1"/>
+              </a:fillRef>
+              <a:effectRef idx="0">
+                <a:schemeClr val="accent1"/>
+              </a:effectRef>
+              <a:fontRef idx="minor">
+                <a:schemeClr val="lt1"/>
+              </a:fontRef>
+            </p:style>
+            <p:txBody>
+              <a:bodyPr rtlCol="0" anchor="ctr"/>
+              <a:lstStyle/>
+              <a:p>
+                <a:pPr algn="ctr"/>
+                <a:endParaRPr lang="en-US">
+                  <a:ln>
+                    <a:solidFill>
+                      <a:schemeClr val="bg1"/>
+                    </a:solidFill>
+                  </a:ln>
+                  <a:solidFill>
+                    <a:schemeClr val="bg1"/>
+                  </a:solidFill>
+                </a:endParaRPr>
+              </a:p>
+            </p:txBody>
+          </p:sp>
+          <p:grpSp>
+            <p:nvGrpSpPr>
+              <p:cNvPr id="57" name="Group 56">
+                <a:extLst>
+                  <a:ext uri="{FF2B5EF4-FFF2-40B4-BE49-F238E27FC236}">
+                    <a16:creationId xmlns:a16="http://schemas.microsoft.com/office/drawing/2014/main" id="{A71CF64F-0C0E-4242-976B-DC0B93AEB1A7}"/>
+                  </a:ext>
+                </a:extLst>
+              </p:cNvPr>
+              <p:cNvGrpSpPr/>
+              <p:nvPr/>
+            </p:nvGrpSpPr>
+            <p:grpSpPr>
+              <a:xfrm>
+                <a:off x="1038572" y="4170507"/>
+                <a:ext cx="7914903" cy="7030"/>
+                <a:chOff x="610079" y="4168160"/>
+                <a:chExt cx="7914903" cy="7030"/>
+              </a:xfrm>
+            </p:grpSpPr>
+            <p:cxnSp>
+              <p:nvCxnSpPr>
+                <p:cNvPr id="62" name="Straight Connector 61">
+                  <a:extLst>
+                    <a:ext uri="{FF2B5EF4-FFF2-40B4-BE49-F238E27FC236}">
+                      <a16:creationId xmlns:a16="http://schemas.microsoft.com/office/drawing/2014/main" id="{98DBF7BC-47E7-42CC-B375-BA1020FC1742}"/>
+                    </a:ext>
+                  </a:extLst>
+                </p:cNvPr>
+                <p:cNvCxnSpPr/>
+                <p:nvPr/>
+              </p:nvCxnSpPr>
+              <p:spPr>
+                <a:xfrm>
+                  <a:off x="3553581" y="4175190"/>
+                  <a:ext cx="489456" cy="0"/>
+                </a:xfrm>
+                <a:prstGeom prst="line">
+                  <a:avLst/>
+                </a:prstGeom>
+                <a:ln w="28575">
+                  <a:solidFill>
+                    <a:srgbClr val="FF0000"/>
+                  </a:solidFill>
+                </a:ln>
+              </p:spPr>
+              <p:style>
+                <a:lnRef idx="1">
+                  <a:schemeClr val="accent1"/>
+                </a:lnRef>
+                <a:fillRef idx="0">
+                  <a:schemeClr val="accent1"/>
+                </a:fillRef>
+                <a:effectRef idx="0">
+                  <a:schemeClr val="accent1"/>
+                </a:effectRef>
+                <a:fontRef idx="minor">
+                  <a:schemeClr val="tx1"/>
+                </a:fontRef>
+              </p:style>
+            </p:cxnSp>
+            <p:cxnSp>
+              <p:nvCxnSpPr>
+                <p:cNvPr id="63" name="Straight Connector 62">
+                  <a:extLst>
+                    <a:ext uri="{FF2B5EF4-FFF2-40B4-BE49-F238E27FC236}">
+                      <a16:creationId xmlns:a16="http://schemas.microsoft.com/office/drawing/2014/main" id="{6FB69078-88ED-4248-90E8-6AC237BEF27A}"/>
+                    </a:ext>
+                  </a:extLst>
+                </p:cNvPr>
+                <p:cNvCxnSpPr/>
+                <p:nvPr/>
+              </p:nvCxnSpPr>
+              <p:spPr>
+                <a:xfrm>
+                  <a:off x="4295932" y="4174499"/>
+                  <a:ext cx="489456" cy="0"/>
+                </a:xfrm>
+                <a:prstGeom prst="line">
+                  <a:avLst/>
+                </a:prstGeom>
+                <a:ln w="28575">
+                  <a:solidFill>
+                    <a:srgbClr val="FF0000"/>
+                  </a:solidFill>
+                </a:ln>
+              </p:spPr>
+              <p:style>
+                <a:lnRef idx="1">
+                  <a:schemeClr val="accent1"/>
+                </a:lnRef>
+                <a:fillRef idx="0">
+                  <a:schemeClr val="accent1"/>
+                </a:fillRef>
+                <a:effectRef idx="0">
+                  <a:schemeClr val="accent1"/>
+                </a:effectRef>
+                <a:fontRef idx="minor">
+                  <a:schemeClr val="tx1"/>
+                </a:fontRef>
+              </p:style>
+            </p:cxnSp>
+            <p:cxnSp>
+              <p:nvCxnSpPr>
+                <p:cNvPr id="64" name="Straight Connector 63">
+                  <a:extLst>
+                    <a:ext uri="{FF2B5EF4-FFF2-40B4-BE49-F238E27FC236}">
+                      <a16:creationId xmlns:a16="http://schemas.microsoft.com/office/drawing/2014/main" id="{15B4825D-6C69-4EB1-A16C-1173B725DD26}"/>
+                    </a:ext>
+                  </a:extLst>
+                </p:cNvPr>
+                <p:cNvCxnSpPr/>
+                <p:nvPr/>
+              </p:nvCxnSpPr>
+              <p:spPr>
+                <a:xfrm>
+                  <a:off x="5038213" y="4174499"/>
+                  <a:ext cx="489456" cy="0"/>
+                </a:xfrm>
+                <a:prstGeom prst="line">
+                  <a:avLst/>
+                </a:prstGeom>
+                <a:ln w="28575">
+                  <a:solidFill>
+                    <a:srgbClr val="FF0000"/>
+                  </a:solidFill>
+                </a:ln>
+              </p:spPr>
+              <p:style>
+                <a:lnRef idx="1">
+                  <a:schemeClr val="accent1"/>
+                </a:lnRef>
+                <a:fillRef idx="0">
+                  <a:schemeClr val="accent1"/>
+                </a:fillRef>
+                <a:effectRef idx="0">
+                  <a:schemeClr val="accent1"/>
+                </a:effectRef>
+                <a:fontRef idx="minor">
+                  <a:schemeClr val="tx1"/>
+                </a:fontRef>
+              </p:style>
+            </p:cxnSp>
+            <p:cxnSp>
+              <p:nvCxnSpPr>
+                <p:cNvPr id="65" name="Straight Connector 64">
+                  <a:extLst>
+                    <a:ext uri="{FF2B5EF4-FFF2-40B4-BE49-F238E27FC236}">
+                      <a16:creationId xmlns:a16="http://schemas.microsoft.com/office/drawing/2014/main" id="{CE21579C-BCDE-43B2-909F-84F7C5AF1413}"/>
+                    </a:ext>
+                  </a:extLst>
+                </p:cNvPr>
+                <p:cNvCxnSpPr/>
+                <p:nvPr/>
+              </p:nvCxnSpPr>
+              <p:spPr>
+                <a:xfrm>
+                  <a:off x="6512403" y="4170601"/>
+                  <a:ext cx="489456" cy="0"/>
+                </a:xfrm>
+                <a:prstGeom prst="line">
+                  <a:avLst/>
+                </a:prstGeom>
+                <a:ln w="28575">
+                  <a:solidFill>
+                    <a:srgbClr val="FF0000"/>
+                  </a:solidFill>
+                </a:ln>
+              </p:spPr>
+              <p:style>
+                <a:lnRef idx="1">
+                  <a:schemeClr val="accent1"/>
+                </a:lnRef>
+                <a:fillRef idx="0">
+                  <a:schemeClr val="accent1"/>
+                </a:fillRef>
+                <a:effectRef idx="0">
+                  <a:schemeClr val="accent1"/>
+                </a:effectRef>
+                <a:fontRef idx="minor">
+                  <a:schemeClr val="tx1"/>
+                </a:fontRef>
+              </p:style>
+            </p:cxnSp>
+            <p:cxnSp>
+              <p:nvCxnSpPr>
+                <p:cNvPr id="66" name="Straight Connector 65">
+                  <a:extLst>
+                    <a:ext uri="{FF2B5EF4-FFF2-40B4-BE49-F238E27FC236}">
+                      <a16:creationId xmlns:a16="http://schemas.microsoft.com/office/drawing/2014/main" id="{25DB5C69-7589-4A67-8A67-AED3BB8C623F}"/>
+                    </a:ext>
+                  </a:extLst>
+                </p:cNvPr>
+                <p:cNvCxnSpPr/>
+                <p:nvPr/>
+              </p:nvCxnSpPr>
+              <p:spPr>
+                <a:xfrm>
+                  <a:off x="2819112" y="4170601"/>
+                  <a:ext cx="489456" cy="0"/>
+                </a:xfrm>
+                <a:prstGeom prst="line">
+                  <a:avLst/>
+                </a:prstGeom>
+                <a:ln w="28575">
+                  <a:solidFill>
+                    <a:srgbClr val="FF0000"/>
+                  </a:solidFill>
+                </a:ln>
+              </p:spPr>
+              <p:style>
+                <a:lnRef idx="1">
+                  <a:schemeClr val="accent1"/>
+                </a:lnRef>
+                <a:fillRef idx="0">
+                  <a:schemeClr val="accent1"/>
+                </a:fillRef>
+                <a:effectRef idx="0">
+                  <a:schemeClr val="accent1"/>
+                </a:effectRef>
+                <a:fontRef idx="minor">
+                  <a:schemeClr val="tx1"/>
+                </a:fontRef>
+              </p:style>
+            </p:cxnSp>
+            <p:cxnSp>
+              <p:nvCxnSpPr>
+                <p:cNvPr id="67" name="Straight Connector 66">
+                  <a:extLst>
+                    <a:ext uri="{FF2B5EF4-FFF2-40B4-BE49-F238E27FC236}">
+                      <a16:creationId xmlns:a16="http://schemas.microsoft.com/office/drawing/2014/main" id="{96E40DEA-B82D-4883-81FA-CE276F440C3B}"/>
+                    </a:ext>
+                  </a:extLst>
+                </p:cNvPr>
+                <p:cNvCxnSpPr/>
+                <p:nvPr/>
+              </p:nvCxnSpPr>
+              <p:spPr>
+                <a:xfrm>
+                  <a:off x="2085101" y="4170601"/>
+                  <a:ext cx="489456" cy="0"/>
+                </a:xfrm>
+                <a:prstGeom prst="line">
+                  <a:avLst/>
+                </a:prstGeom>
+                <a:ln w="28575">
+                  <a:solidFill>
+                    <a:srgbClr val="FF0000"/>
+                  </a:solidFill>
+                </a:ln>
+              </p:spPr>
+              <p:style>
+                <a:lnRef idx="1">
+                  <a:schemeClr val="accent1"/>
+                </a:lnRef>
+                <a:fillRef idx="0">
+                  <a:schemeClr val="accent1"/>
+                </a:fillRef>
+                <a:effectRef idx="0">
+                  <a:schemeClr val="accent1"/>
+                </a:effectRef>
+                <a:fontRef idx="minor">
+                  <a:schemeClr val="tx1"/>
+                </a:fontRef>
+              </p:style>
+            </p:cxnSp>
+            <p:cxnSp>
+              <p:nvCxnSpPr>
+                <p:cNvPr id="68" name="Straight Connector 67">
+                  <a:extLst>
+                    <a:ext uri="{FF2B5EF4-FFF2-40B4-BE49-F238E27FC236}">
+                      <a16:creationId xmlns:a16="http://schemas.microsoft.com/office/drawing/2014/main" id="{8E64341C-DCD9-47C1-94B3-78B4A80A2A1A}"/>
+                    </a:ext>
+                  </a:extLst>
+                </p:cNvPr>
+                <p:cNvCxnSpPr/>
+                <p:nvPr/>
+              </p:nvCxnSpPr>
+              <p:spPr>
+                <a:xfrm>
+                  <a:off x="1341057" y="4170601"/>
+                  <a:ext cx="489456" cy="0"/>
+                </a:xfrm>
+                <a:prstGeom prst="line">
+                  <a:avLst/>
+                </a:prstGeom>
+                <a:ln w="28575">
+                  <a:solidFill>
+                    <a:srgbClr val="FF0000"/>
+                  </a:solidFill>
+                </a:ln>
+              </p:spPr>
+              <p:style>
+                <a:lnRef idx="1">
+                  <a:schemeClr val="accent1"/>
+                </a:lnRef>
+                <a:fillRef idx="0">
+                  <a:schemeClr val="accent1"/>
+                </a:fillRef>
+                <a:effectRef idx="0">
+                  <a:schemeClr val="accent1"/>
+                </a:effectRef>
+                <a:fontRef idx="minor">
+                  <a:schemeClr val="tx1"/>
+                </a:fontRef>
+              </p:style>
+            </p:cxnSp>
+            <p:cxnSp>
+              <p:nvCxnSpPr>
+                <p:cNvPr id="69" name="Straight Connector 68">
+                  <a:extLst>
+                    <a:ext uri="{FF2B5EF4-FFF2-40B4-BE49-F238E27FC236}">
+                      <a16:creationId xmlns:a16="http://schemas.microsoft.com/office/drawing/2014/main" id="{43DF88DB-FA07-4F15-A8C0-89396951542B}"/>
+                    </a:ext>
+                  </a:extLst>
+                </p:cNvPr>
+                <p:cNvCxnSpPr/>
+                <p:nvPr/>
+              </p:nvCxnSpPr>
+              <p:spPr>
+                <a:xfrm>
+                  <a:off x="5772224" y="4174499"/>
+                  <a:ext cx="489456" cy="0"/>
+                </a:xfrm>
+                <a:prstGeom prst="line">
+                  <a:avLst/>
+                </a:prstGeom>
+                <a:ln w="28575">
+                  <a:solidFill>
+                    <a:srgbClr val="FF0000"/>
+                  </a:solidFill>
+                </a:ln>
+              </p:spPr>
+              <p:style>
+                <a:lnRef idx="1">
+                  <a:schemeClr val="accent1"/>
+                </a:lnRef>
+                <a:fillRef idx="0">
+                  <a:schemeClr val="accent1"/>
+                </a:fillRef>
+                <a:effectRef idx="0">
+                  <a:schemeClr val="accent1"/>
+                </a:effectRef>
+                <a:fontRef idx="minor">
+                  <a:schemeClr val="tx1"/>
+                </a:fontRef>
+              </p:style>
+            </p:cxnSp>
+            <p:cxnSp>
+              <p:nvCxnSpPr>
+                <p:cNvPr id="70" name="Straight Connector 69">
+                  <a:extLst>
+                    <a:ext uri="{FF2B5EF4-FFF2-40B4-BE49-F238E27FC236}">
+                      <a16:creationId xmlns:a16="http://schemas.microsoft.com/office/drawing/2014/main" id="{A532F9E6-B158-44FF-9EED-53EEDD1E950C}"/>
+                    </a:ext>
+                  </a:extLst>
+                </p:cNvPr>
+                <p:cNvCxnSpPr/>
+                <p:nvPr/>
+              </p:nvCxnSpPr>
+              <p:spPr>
+                <a:xfrm>
+                  <a:off x="7301515" y="4168160"/>
+                  <a:ext cx="489456" cy="0"/>
+                </a:xfrm>
+                <a:prstGeom prst="line">
+                  <a:avLst/>
+                </a:prstGeom>
+                <a:ln w="28575">
+                  <a:solidFill>
+                    <a:srgbClr val="FF0000"/>
+                  </a:solidFill>
+                </a:ln>
+              </p:spPr>
+              <p:style>
+                <a:lnRef idx="1">
+                  <a:schemeClr val="accent1"/>
+                </a:lnRef>
+                <a:fillRef idx="0">
+                  <a:schemeClr val="accent1"/>
+                </a:fillRef>
+                <a:effectRef idx="0">
+                  <a:schemeClr val="accent1"/>
+                </a:effectRef>
+                <a:fontRef idx="minor">
+                  <a:schemeClr val="tx1"/>
+                </a:fontRef>
+              </p:style>
+            </p:cxnSp>
+            <p:cxnSp>
+              <p:nvCxnSpPr>
+                <p:cNvPr id="71" name="Straight Connector 70">
+                  <a:extLst>
+                    <a:ext uri="{FF2B5EF4-FFF2-40B4-BE49-F238E27FC236}">
+                      <a16:creationId xmlns:a16="http://schemas.microsoft.com/office/drawing/2014/main" id="{B93A33DD-FF01-425B-AE99-47720AAD5097}"/>
+                    </a:ext>
+                  </a:extLst>
+                </p:cNvPr>
+                <p:cNvCxnSpPr/>
+                <p:nvPr/>
+              </p:nvCxnSpPr>
+              <p:spPr>
+                <a:xfrm>
+                  <a:off x="8035526" y="4168160"/>
+                  <a:ext cx="489456" cy="0"/>
+                </a:xfrm>
+                <a:prstGeom prst="line">
+                  <a:avLst/>
+                </a:prstGeom>
+                <a:ln w="28575">
+                  <a:solidFill>
+                    <a:srgbClr val="FF0000"/>
+                  </a:solidFill>
+                </a:ln>
+              </p:spPr>
+              <p:style>
+                <a:lnRef idx="1">
+                  <a:schemeClr val="accent1"/>
+                </a:lnRef>
+                <a:fillRef idx="0">
+                  <a:schemeClr val="accent1"/>
+                </a:fillRef>
+                <a:effectRef idx="0">
+                  <a:schemeClr val="accent1"/>
+                </a:effectRef>
+                <a:fontRef idx="minor">
+                  <a:schemeClr val="tx1"/>
+                </a:fontRef>
+              </p:style>
+            </p:cxnSp>
+            <p:cxnSp>
+              <p:nvCxnSpPr>
+                <p:cNvPr id="72" name="Straight Connector 71">
+                  <a:extLst>
+                    <a:ext uri="{FF2B5EF4-FFF2-40B4-BE49-F238E27FC236}">
+                      <a16:creationId xmlns:a16="http://schemas.microsoft.com/office/drawing/2014/main" id="{CE4E5827-5F8B-4A9A-BEFD-9E75917440AE}"/>
+                    </a:ext>
+                  </a:extLst>
+                </p:cNvPr>
+                <p:cNvCxnSpPr/>
+                <p:nvPr/>
+              </p:nvCxnSpPr>
+              <p:spPr>
+                <a:xfrm>
+                  <a:off x="610079" y="4175190"/>
+                  <a:ext cx="489456" cy="0"/>
+                </a:xfrm>
+                <a:prstGeom prst="line">
+                  <a:avLst/>
+                </a:prstGeom>
+                <a:ln w="28575">
+                  <a:solidFill>
+                    <a:srgbClr val="FF0000"/>
+                  </a:solidFill>
+                </a:ln>
+              </p:spPr>
+              <p:style>
+                <a:lnRef idx="1">
+                  <a:schemeClr val="accent1"/>
+                </a:lnRef>
+                <a:fillRef idx="0">
+                  <a:schemeClr val="accent1"/>
+                </a:fillRef>
+                <a:effectRef idx="0">
+                  <a:schemeClr val="accent1"/>
+                </a:effectRef>
+                <a:fontRef idx="minor">
+                  <a:schemeClr val="tx1"/>
+                </a:fontRef>
+              </p:style>
+            </p:cxnSp>
+          </p:grpSp>
+          <p:cxnSp>
+            <p:nvCxnSpPr>
+              <p:cNvPr id="58" name="Straight Arrow Connector 57">
+                <a:extLst>
+                  <a:ext uri="{FF2B5EF4-FFF2-40B4-BE49-F238E27FC236}">
+                    <a16:creationId xmlns:a16="http://schemas.microsoft.com/office/drawing/2014/main" id="{D4BD617D-3288-4169-ADB3-D92AB3B31030}"/>
+                  </a:ext>
+                </a:extLst>
+              </p:cNvPr>
+              <p:cNvCxnSpPr>
+                <a:cxnSpLocks/>
+              </p:cNvCxnSpPr>
+              <p:nvPr/>
+            </p:nvCxnSpPr>
+            <p:spPr>
+              <a:xfrm>
+                <a:off x="8795767" y="2339071"/>
+                <a:ext cx="0" cy="1804248"/>
+              </a:xfrm>
+              <a:prstGeom prst="straightConnector1">
+                <a:avLst/>
+              </a:prstGeom>
+              <a:ln w="19050">
+                <a:solidFill>
+                  <a:schemeClr val="tx1"/>
+                </a:solidFill>
+                <a:headEnd type="triangle" w="lg" len="lg"/>
+                <a:tailEnd type="triangle" w="lg" len="lg"/>
+              </a:ln>
+            </p:spPr>
+            <p:style>
+              <a:lnRef idx="1">
+                <a:schemeClr val="accent1"/>
+              </a:lnRef>
+              <a:fillRef idx="0">
+                <a:schemeClr val="accent1"/>
+              </a:fillRef>
+              <a:effectRef idx="0">
+                <a:schemeClr val="accent1"/>
+              </a:effectRef>
+              <a:fontRef idx="minor">
+                <a:schemeClr val="tx1"/>
+              </a:fontRef>
+            </p:style>
+          </p:cxnSp>
+          <p:sp>
+            <p:nvSpPr>
+              <p:cNvPr id="59" name="TextBox 58">
+                <a:extLst>
+                  <a:ext uri="{FF2B5EF4-FFF2-40B4-BE49-F238E27FC236}">
+                    <a16:creationId xmlns:a16="http://schemas.microsoft.com/office/drawing/2014/main" id="{884573FD-8786-4177-8F32-C956445D5B87}"/>
+                  </a:ext>
+                </a:extLst>
+              </p:cNvPr>
+              <p:cNvSpPr txBox="1"/>
+              <p:nvPr/>
+            </p:nvSpPr>
+            <p:spPr>
+              <a:xfrm>
+                <a:off x="1916405" y="1534669"/>
+                <a:ext cx="2951689" cy="477054"/>
+              </a:xfrm>
+              <a:prstGeom prst="rect">
+                <a:avLst/>
+              </a:prstGeom>
+              <a:solidFill>
+                <a:schemeClr val="bg1"/>
+              </a:solidFill>
+            </p:spPr>
+            <p:txBody>
+              <a:bodyPr wrap="square" rtlCol="0">
+                <a:spAutoFit/>
+              </a:bodyPr>
+              <a:lstStyle/>
+              <a:p>
+                <a:pPr algn="ctr"/>
+                <a:r>
+                  <a:rPr lang="en-US" sz="2500" dirty="0">
+                    <a:latin typeface="Times New Roman" panose="02020603050405020304" pitchFamily="18" charset="0"/>
+                    <a:cs typeface="Times New Roman" panose="02020603050405020304" pitchFamily="18" charset="0"/>
+                  </a:rPr>
+                  <a:t>Horizontal orifice</a:t>
+                </a:r>
+              </a:p>
+            </p:txBody>
+          </p:sp>
+          <p:sp>
+            <p:nvSpPr>
+              <p:cNvPr id="60" name="TextBox 59">
+                <a:extLst>
+                  <a:ext uri="{FF2B5EF4-FFF2-40B4-BE49-F238E27FC236}">
+                    <a16:creationId xmlns:a16="http://schemas.microsoft.com/office/drawing/2014/main" id="{DAFFEBE5-AB30-4BAD-848E-87F1B73C8433}"/>
+                  </a:ext>
+                </a:extLst>
+              </p:cNvPr>
+              <p:cNvSpPr txBox="1"/>
+              <p:nvPr/>
+            </p:nvSpPr>
+            <p:spPr>
+              <a:xfrm>
+                <a:off x="5442054" y="1540428"/>
+                <a:ext cx="2496237" cy="477054"/>
+              </a:xfrm>
+              <a:prstGeom prst="rect">
+                <a:avLst/>
+              </a:prstGeom>
+              <a:solidFill>
+                <a:schemeClr val="bg1"/>
+              </a:solidFill>
+            </p:spPr>
+            <p:txBody>
+              <a:bodyPr wrap="square" rtlCol="0">
+                <a:spAutoFit/>
+              </a:bodyPr>
+              <a:lstStyle/>
+              <a:p>
+                <a:pPr algn="ctr"/>
+                <a:r>
+                  <a:rPr lang="en-US" sz="2500" dirty="0">
+                    <a:latin typeface="Times New Roman" panose="02020603050405020304" pitchFamily="18" charset="0"/>
+                    <a:cs typeface="Times New Roman" panose="02020603050405020304" pitchFamily="18" charset="0"/>
+                  </a:rPr>
+                  <a:t>Vertical orifice</a:t>
+                </a:r>
+              </a:p>
+            </p:txBody>
+          </p:sp>
+          <mc:AlternateContent xmlns:mc="http://schemas.openxmlformats.org/markup-compatibility/2006">
+            <mc:Choice xmlns:a14="http://schemas.microsoft.com/office/drawing/2010/main" Requires="a14">
+              <p:sp>
+                <p:nvSpPr>
+                  <p:cNvPr id="61" name="Rectangle 60">
+                    <a:extLst>
+                      <a:ext uri="{FF2B5EF4-FFF2-40B4-BE49-F238E27FC236}">
+                        <a16:creationId xmlns:a16="http://schemas.microsoft.com/office/drawing/2014/main" id="{04B78F2F-7552-4E64-A00E-86968E9934FA}"/>
+                      </a:ext>
+                    </a:extLst>
+                  </p:cNvPr>
+                  <p:cNvSpPr/>
+                  <p:nvPr/>
+                </p:nvSpPr>
+                <p:spPr>
+                  <a:xfrm>
+                    <a:off x="8472735" y="2973970"/>
+                    <a:ext cx="646064" cy="461665"/>
+                  </a:xfrm>
+                  <a:prstGeom prst="rect">
+                    <a:avLst/>
+                  </a:prstGeom>
+                  <a:solidFill>
+                    <a:schemeClr val="bg1"/>
+                  </a:solidFill>
+                </p:spPr>
+                <p:txBody>
+                  <a:bodyPr wrap="square">
+                    <a:spAutoFit/>
+                  </a:bodyPr>
+                  <a:lstStyle/>
+                  <a:p>
+                    <a:pPr/>
+                    <a14:m>
+                      <m:oMathPara xmlns:m="http://schemas.openxmlformats.org/officeDocument/2006/math">
+                        <m:oMathParaPr>
+                          <m:jc m:val="centerGroup"/>
+                        </m:oMathParaPr>
+                        <m:oMath xmlns:m="http://schemas.openxmlformats.org/officeDocument/2006/math">
+                          <m:r>
+                            <a:rPr lang="en-US" sz="2400" i="1">
+                              <a:latin typeface="Cambria Math"/>
+                            </a:rPr>
+                            <m:t>𝛥</m:t>
+                          </m:r>
+                          <m:r>
+                            <a:rPr lang="en-US" sz="2400" i="1">
+                              <a:latin typeface="Cambria Math"/>
+                            </a:rPr>
+                            <m:t>h</m:t>
+                          </m:r>
+                        </m:oMath>
+                      </m:oMathPara>
+                    </a14:m>
+                    <a:endParaRPr lang="en-US" sz="2400" dirty="0">
+                      <a:latin typeface="Times New Roman" panose="02020603050405020304" pitchFamily="18" charset="0"/>
+                      <a:cs typeface="Times New Roman" panose="02020603050405020304" pitchFamily="18" charset="0"/>
+                    </a:endParaRPr>
+                  </a:p>
+                </p:txBody>
+              </p:sp>
+            </mc:Choice>
+            <mc:Fallback>
+              <p:sp>
+                <p:nvSpPr>
+                  <p:cNvPr id="61" name="Rectangle 60">
+                    <a:extLst>
+                      <a:ext uri="{FF2B5EF4-FFF2-40B4-BE49-F238E27FC236}">
+                        <a16:creationId xmlns:a16="http://schemas.microsoft.com/office/drawing/2014/main" id="{04B78F2F-7552-4E64-A00E-86968E9934FA}"/>
+                      </a:ext>
+                    </a:extLst>
+                  </p:cNvPr>
+                  <p:cNvSpPr>
+                    <a:spLocks noRot="1" noChangeAspect="1" noMove="1" noResize="1" noEditPoints="1" noAdjustHandles="1" noChangeArrowheads="1" noChangeShapeType="1" noTextEdit="1"/>
+                  </p:cNvSpPr>
+                  <p:nvPr/>
+                </p:nvSpPr>
+                <p:spPr>
+                  <a:xfrm>
+                    <a:off x="8472735" y="2973970"/>
+                    <a:ext cx="646064" cy="461665"/>
+                  </a:xfrm>
+                  <a:prstGeom prst="rect">
+                    <a:avLst/>
+                  </a:prstGeom>
+                  <a:blipFill>
+                    <a:blip r:embed="rId2"/>
+                    <a:stretch>
+                      <a:fillRect/>
+                    </a:stretch>
+                  </a:blipFill>
+                </p:spPr>
+                <p:txBody>
+                  <a:bodyPr/>
+                  <a:lstStyle/>
+                  <a:p>
+                    <a:r>
+                      <a:rPr lang="en-US">
+                        <a:noFill/>
+                      </a:rPr>
+                      <a:t> </a:t>
+                    </a:r>
+                  </a:p>
+                </p:txBody>
+              </p:sp>
+            </mc:Fallback>
+          </mc:AlternateContent>
+          <p:grpSp>
+            <p:nvGrpSpPr>
+              <p:cNvPr id="77" name="Group 76">
+                <a:extLst>
+                  <a:ext uri="{FF2B5EF4-FFF2-40B4-BE49-F238E27FC236}">
+                    <a16:creationId xmlns:a16="http://schemas.microsoft.com/office/drawing/2014/main" id="{F2084CFB-D5C5-4F2E-BBA6-B46260321574}"/>
+                  </a:ext>
+                </a:extLst>
+              </p:cNvPr>
+              <p:cNvGrpSpPr/>
+              <p:nvPr/>
+            </p:nvGrpSpPr>
+            <p:grpSpPr>
+              <a:xfrm>
+                <a:off x="1038572" y="2321502"/>
+                <a:ext cx="7914903" cy="7030"/>
+                <a:chOff x="610079" y="4168160"/>
+                <a:chExt cx="7914903" cy="7030"/>
+              </a:xfrm>
+            </p:grpSpPr>
+            <p:cxnSp>
+              <p:nvCxnSpPr>
+                <p:cNvPr id="78" name="Straight Connector 77">
+                  <a:extLst>
+                    <a:ext uri="{FF2B5EF4-FFF2-40B4-BE49-F238E27FC236}">
+                      <a16:creationId xmlns:a16="http://schemas.microsoft.com/office/drawing/2014/main" id="{F79B2906-2DF5-46E1-ADA2-CD8ED7A837ED}"/>
+                    </a:ext>
+                  </a:extLst>
+                </p:cNvPr>
+                <p:cNvCxnSpPr/>
+                <p:nvPr/>
+              </p:nvCxnSpPr>
+              <p:spPr>
+                <a:xfrm>
+                  <a:off x="3553581" y="4175190"/>
+                  <a:ext cx="489456" cy="0"/>
+                </a:xfrm>
+                <a:prstGeom prst="line">
+                  <a:avLst/>
+                </a:prstGeom>
+                <a:ln w="28575">
+                  <a:solidFill>
+                    <a:srgbClr val="FF0000"/>
+                  </a:solidFill>
+                </a:ln>
+              </p:spPr>
+              <p:style>
+                <a:lnRef idx="1">
+                  <a:schemeClr val="accent1"/>
+                </a:lnRef>
+                <a:fillRef idx="0">
+                  <a:schemeClr val="accent1"/>
+                </a:fillRef>
+                <a:effectRef idx="0">
+                  <a:schemeClr val="accent1"/>
+                </a:effectRef>
+                <a:fontRef idx="minor">
+                  <a:schemeClr val="tx1"/>
+                </a:fontRef>
+              </p:style>
+            </p:cxnSp>
+            <p:cxnSp>
+              <p:nvCxnSpPr>
+                <p:cNvPr id="79" name="Straight Connector 78">
+                  <a:extLst>
+                    <a:ext uri="{FF2B5EF4-FFF2-40B4-BE49-F238E27FC236}">
+                      <a16:creationId xmlns:a16="http://schemas.microsoft.com/office/drawing/2014/main" id="{6D7B7480-338F-4BB4-AC2D-119BF6C68CA0}"/>
+                    </a:ext>
+                  </a:extLst>
+                </p:cNvPr>
+                <p:cNvCxnSpPr/>
+                <p:nvPr/>
+              </p:nvCxnSpPr>
+              <p:spPr>
+                <a:xfrm>
+                  <a:off x="4295932" y="4174499"/>
+                  <a:ext cx="489456" cy="0"/>
+                </a:xfrm>
+                <a:prstGeom prst="line">
+                  <a:avLst/>
+                </a:prstGeom>
+                <a:ln w="28575">
+                  <a:solidFill>
+                    <a:srgbClr val="FF0000"/>
+                  </a:solidFill>
+                </a:ln>
+              </p:spPr>
+              <p:style>
+                <a:lnRef idx="1">
+                  <a:schemeClr val="accent1"/>
+                </a:lnRef>
+                <a:fillRef idx="0">
+                  <a:schemeClr val="accent1"/>
+                </a:fillRef>
+                <a:effectRef idx="0">
+                  <a:schemeClr val="accent1"/>
+                </a:effectRef>
+                <a:fontRef idx="minor">
+                  <a:schemeClr val="tx1"/>
+                </a:fontRef>
+              </p:style>
+            </p:cxnSp>
+            <p:cxnSp>
+              <p:nvCxnSpPr>
+                <p:cNvPr id="80" name="Straight Connector 79">
+                  <a:extLst>
+                    <a:ext uri="{FF2B5EF4-FFF2-40B4-BE49-F238E27FC236}">
+                      <a16:creationId xmlns:a16="http://schemas.microsoft.com/office/drawing/2014/main" id="{57CF822A-CFA2-4E6C-A58C-8FEE0680BA9D}"/>
+                    </a:ext>
+                  </a:extLst>
+                </p:cNvPr>
+                <p:cNvCxnSpPr/>
+                <p:nvPr/>
+              </p:nvCxnSpPr>
+              <p:spPr>
+                <a:xfrm>
+                  <a:off x="5038213" y="4174499"/>
+                  <a:ext cx="489456" cy="0"/>
+                </a:xfrm>
+                <a:prstGeom prst="line">
+                  <a:avLst/>
+                </a:prstGeom>
+                <a:ln w="28575">
+                  <a:solidFill>
+                    <a:srgbClr val="FF0000"/>
+                  </a:solidFill>
+                </a:ln>
+              </p:spPr>
+              <p:style>
+                <a:lnRef idx="1">
+                  <a:schemeClr val="accent1"/>
+                </a:lnRef>
+                <a:fillRef idx="0">
+                  <a:schemeClr val="accent1"/>
+                </a:fillRef>
+                <a:effectRef idx="0">
+                  <a:schemeClr val="accent1"/>
+                </a:effectRef>
+                <a:fontRef idx="minor">
+                  <a:schemeClr val="tx1"/>
+                </a:fontRef>
+              </p:style>
+            </p:cxnSp>
+            <p:cxnSp>
+              <p:nvCxnSpPr>
+                <p:cNvPr id="81" name="Straight Connector 80">
+                  <a:extLst>
+                    <a:ext uri="{FF2B5EF4-FFF2-40B4-BE49-F238E27FC236}">
+                      <a16:creationId xmlns:a16="http://schemas.microsoft.com/office/drawing/2014/main" id="{9DFB92D9-AC52-4CBA-AB43-ADE9575609A1}"/>
+                    </a:ext>
+                  </a:extLst>
+                </p:cNvPr>
+                <p:cNvCxnSpPr/>
+                <p:nvPr/>
+              </p:nvCxnSpPr>
+              <p:spPr>
+                <a:xfrm>
+                  <a:off x="6512403" y="4170601"/>
+                  <a:ext cx="489456" cy="0"/>
+                </a:xfrm>
+                <a:prstGeom prst="line">
+                  <a:avLst/>
+                </a:prstGeom>
+                <a:ln w="28575">
+                  <a:solidFill>
+                    <a:srgbClr val="FF0000"/>
+                  </a:solidFill>
+                </a:ln>
+              </p:spPr>
+              <p:style>
+                <a:lnRef idx="1">
+                  <a:schemeClr val="accent1"/>
+                </a:lnRef>
+                <a:fillRef idx="0">
+                  <a:schemeClr val="accent1"/>
+                </a:fillRef>
+                <a:effectRef idx="0">
+                  <a:schemeClr val="accent1"/>
+                </a:effectRef>
+                <a:fontRef idx="minor">
+                  <a:schemeClr val="tx1"/>
+                </a:fontRef>
+              </p:style>
+            </p:cxnSp>
+            <p:cxnSp>
+              <p:nvCxnSpPr>
+                <p:cNvPr id="82" name="Straight Connector 81">
+                  <a:extLst>
+                    <a:ext uri="{FF2B5EF4-FFF2-40B4-BE49-F238E27FC236}">
+                      <a16:creationId xmlns:a16="http://schemas.microsoft.com/office/drawing/2014/main" id="{F8107FC3-6874-4B89-96B9-1815ACE5BE40}"/>
+                    </a:ext>
+                  </a:extLst>
+                </p:cNvPr>
+                <p:cNvCxnSpPr/>
+                <p:nvPr/>
+              </p:nvCxnSpPr>
+              <p:spPr>
+                <a:xfrm>
+                  <a:off x="2819112" y="4170601"/>
+                  <a:ext cx="489456" cy="0"/>
+                </a:xfrm>
+                <a:prstGeom prst="line">
+                  <a:avLst/>
+                </a:prstGeom>
+                <a:ln w="28575">
+                  <a:solidFill>
+                    <a:srgbClr val="FF0000"/>
+                  </a:solidFill>
+                </a:ln>
+              </p:spPr>
+              <p:style>
+                <a:lnRef idx="1">
+                  <a:schemeClr val="accent1"/>
+                </a:lnRef>
+                <a:fillRef idx="0">
+                  <a:schemeClr val="accent1"/>
+                </a:fillRef>
+                <a:effectRef idx="0">
+                  <a:schemeClr val="accent1"/>
+                </a:effectRef>
+                <a:fontRef idx="minor">
+                  <a:schemeClr val="tx1"/>
+                </a:fontRef>
+              </p:style>
+            </p:cxnSp>
+            <p:cxnSp>
+              <p:nvCxnSpPr>
+                <p:cNvPr id="83" name="Straight Connector 82">
+                  <a:extLst>
+                    <a:ext uri="{FF2B5EF4-FFF2-40B4-BE49-F238E27FC236}">
+                      <a16:creationId xmlns:a16="http://schemas.microsoft.com/office/drawing/2014/main" id="{7FBA52B8-73B9-43E1-8C88-333A0AE9D465}"/>
+                    </a:ext>
+                  </a:extLst>
+                </p:cNvPr>
+                <p:cNvCxnSpPr/>
+                <p:nvPr/>
+              </p:nvCxnSpPr>
+              <p:spPr>
+                <a:xfrm>
+                  <a:off x="2085101" y="4170601"/>
+                  <a:ext cx="489456" cy="0"/>
+                </a:xfrm>
+                <a:prstGeom prst="line">
+                  <a:avLst/>
+                </a:prstGeom>
+                <a:ln w="28575">
+                  <a:solidFill>
+                    <a:srgbClr val="FF0000"/>
+                  </a:solidFill>
+                </a:ln>
+              </p:spPr>
+              <p:style>
+                <a:lnRef idx="1">
+                  <a:schemeClr val="accent1"/>
+                </a:lnRef>
+                <a:fillRef idx="0">
+                  <a:schemeClr val="accent1"/>
+                </a:fillRef>
+                <a:effectRef idx="0">
+                  <a:schemeClr val="accent1"/>
+                </a:effectRef>
+                <a:fontRef idx="minor">
+                  <a:schemeClr val="tx1"/>
+                </a:fontRef>
+              </p:style>
+            </p:cxnSp>
+            <p:cxnSp>
+              <p:nvCxnSpPr>
+                <p:cNvPr id="84" name="Straight Connector 83">
+                  <a:extLst>
+                    <a:ext uri="{FF2B5EF4-FFF2-40B4-BE49-F238E27FC236}">
+                      <a16:creationId xmlns:a16="http://schemas.microsoft.com/office/drawing/2014/main" id="{38D8435C-05B9-4982-92BB-FB04A6815E81}"/>
+                    </a:ext>
+                  </a:extLst>
+                </p:cNvPr>
+                <p:cNvCxnSpPr/>
+                <p:nvPr/>
+              </p:nvCxnSpPr>
+              <p:spPr>
+                <a:xfrm>
+                  <a:off x="1341057" y="4170601"/>
+                  <a:ext cx="489456" cy="0"/>
+                </a:xfrm>
+                <a:prstGeom prst="line">
+                  <a:avLst/>
+                </a:prstGeom>
+                <a:ln w="28575">
+                  <a:solidFill>
+                    <a:srgbClr val="FF0000"/>
+                  </a:solidFill>
+                </a:ln>
+              </p:spPr>
+              <p:style>
+                <a:lnRef idx="1">
+                  <a:schemeClr val="accent1"/>
+                </a:lnRef>
+                <a:fillRef idx="0">
+                  <a:schemeClr val="accent1"/>
+                </a:fillRef>
+                <a:effectRef idx="0">
+                  <a:schemeClr val="accent1"/>
+                </a:effectRef>
+                <a:fontRef idx="minor">
+                  <a:schemeClr val="tx1"/>
+                </a:fontRef>
+              </p:style>
+            </p:cxnSp>
+            <p:cxnSp>
+              <p:nvCxnSpPr>
+                <p:cNvPr id="85" name="Straight Connector 84">
+                  <a:extLst>
+                    <a:ext uri="{FF2B5EF4-FFF2-40B4-BE49-F238E27FC236}">
+                      <a16:creationId xmlns:a16="http://schemas.microsoft.com/office/drawing/2014/main" id="{A072F6C6-05DC-4EEA-9B2A-DE47C1041978}"/>
+                    </a:ext>
+                  </a:extLst>
+                </p:cNvPr>
+                <p:cNvCxnSpPr/>
+                <p:nvPr/>
+              </p:nvCxnSpPr>
+              <p:spPr>
+                <a:xfrm>
+                  <a:off x="5772224" y="4174499"/>
+                  <a:ext cx="489456" cy="0"/>
+                </a:xfrm>
+                <a:prstGeom prst="line">
+                  <a:avLst/>
+                </a:prstGeom>
+                <a:ln w="28575">
+                  <a:solidFill>
+                    <a:srgbClr val="FF0000"/>
+                  </a:solidFill>
+                </a:ln>
+              </p:spPr>
+              <p:style>
+                <a:lnRef idx="1">
+                  <a:schemeClr val="accent1"/>
+                </a:lnRef>
+                <a:fillRef idx="0">
+                  <a:schemeClr val="accent1"/>
+                </a:fillRef>
+                <a:effectRef idx="0">
+                  <a:schemeClr val="accent1"/>
+                </a:effectRef>
+                <a:fontRef idx="minor">
+                  <a:schemeClr val="tx1"/>
+                </a:fontRef>
+              </p:style>
+            </p:cxnSp>
+            <p:cxnSp>
+              <p:nvCxnSpPr>
+                <p:cNvPr id="86" name="Straight Connector 85">
+                  <a:extLst>
+                    <a:ext uri="{FF2B5EF4-FFF2-40B4-BE49-F238E27FC236}">
+                      <a16:creationId xmlns:a16="http://schemas.microsoft.com/office/drawing/2014/main" id="{587EAF95-3958-4C0A-BA05-6BC297D38C68}"/>
+                    </a:ext>
+                  </a:extLst>
+                </p:cNvPr>
+                <p:cNvCxnSpPr/>
+                <p:nvPr/>
+              </p:nvCxnSpPr>
+              <p:spPr>
+                <a:xfrm>
+                  <a:off x="7301515" y="4168160"/>
+                  <a:ext cx="489456" cy="0"/>
+                </a:xfrm>
+                <a:prstGeom prst="line">
+                  <a:avLst/>
+                </a:prstGeom>
+                <a:ln w="28575">
+                  <a:solidFill>
+                    <a:srgbClr val="FF0000"/>
+                  </a:solidFill>
+                </a:ln>
+              </p:spPr>
+              <p:style>
+                <a:lnRef idx="1">
+                  <a:schemeClr val="accent1"/>
+                </a:lnRef>
+                <a:fillRef idx="0">
+                  <a:schemeClr val="accent1"/>
+                </a:fillRef>
+                <a:effectRef idx="0">
+                  <a:schemeClr val="accent1"/>
+                </a:effectRef>
+                <a:fontRef idx="minor">
+                  <a:schemeClr val="tx1"/>
+                </a:fontRef>
+              </p:style>
+            </p:cxnSp>
+            <p:cxnSp>
+              <p:nvCxnSpPr>
+                <p:cNvPr id="87" name="Straight Connector 86">
+                  <a:extLst>
+                    <a:ext uri="{FF2B5EF4-FFF2-40B4-BE49-F238E27FC236}">
+                      <a16:creationId xmlns:a16="http://schemas.microsoft.com/office/drawing/2014/main" id="{6ED161B5-A320-4B29-9E21-33E40D4A4F02}"/>
+                    </a:ext>
+                  </a:extLst>
+                </p:cNvPr>
+                <p:cNvCxnSpPr/>
+                <p:nvPr/>
+              </p:nvCxnSpPr>
+              <p:spPr>
+                <a:xfrm>
+                  <a:off x="8035526" y="4168160"/>
+                  <a:ext cx="489456" cy="0"/>
+                </a:xfrm>
+                <a:prstGeom prst="line">
+                  <a:avLst/>
+                </a:prstGeom>
+                <a:ln w="28575">
+                  <a:solidFill>
+                    <a:srgbClr val="FF0000"/>
+                  </a:solidFill>
+                </a:ln>
+              </p:spPr>
+              <p:style>
+                <a:lnRef idx="1">
+                  <a:schemeClr val="accent1"/>
+                </a:lnRef>
+                <a:fillRef idx="0">
+                  <a:schemeClr val="accent1"/>
+                </a:fillRef>
+                <a:effectRef idx="0">
+                  <a:schemeClr val="accent1"/>
+                </a:effectRef>
+                <a:fontRef idx="minor">
+                  <a:schemeClr val="tx1"/>
+                </a:fontRef>
+              </p:style>
+            </p:cxnSp>
+            <p:cxnSp>
+              <p:nvCxnSpPr>
+                <p:cNvPr id="88" name="Straight Connector 87">
+                  <a:extLst>
+                    <a:ext uri="{FF2B5EF4-FFF2-40B4-BE49-F238E27FC236}">
+                      <a16:creationId xmlns:a16="http://schemas.microsoft.com/office/drawing/2014/main" id="{C416F249-9A01-4437-9816-DD2CB5D24CAE}"/>
+                    </a:ext>
+                  </a:extLst>
+                </p:cNvPr>
+                <p:cNvCxnSpPr/>
+                <p:nvPr/>
+              </p:nvCxnSpPr>
+              <p:spPr>
+                <a:xfrm>
+                  <a:off x="610079" y="4175190"/>
+                  <a:ext cx="489456" cy="0"/>
+                </a:xfrm>
+                <a:prstGeom prst="line">
+                  <a:avLst/>
+                </a:prstGeom>
+                <a:ln w="28575">
+                  <a:solidFill>
+                    <a:srgbClr val="FF0000"/>
+                  </a:solidFill>
+                </a:ln>
+              </p:spPr>
+              <p:style>
+                <a:lnRef idx="1">
+                  <a:schemeClr val="accent1"/>
+                </a:lnRef>
+                <a:fillRef idx="0">
+                  <a:schemeClr val="accent1"/>
+                </a:fillRef>
+                <a:effectRef idx="0">
+                  <a:schemeClr val="accent1"/>
+                </a:effectRef>
+                <a:fontRef idx="minor">
+                  <a:schemeClr val="tx1"/>
+                </a:fontRef>
+              </p:style>
+            </p:cxnSp>
+          </p:grpSp>
+        </p:grpSp>
+        <p:grpSp>
+          <p:nvGrpSpPr>
+            <p:cNvPr id="8" name="Group 7">
+              <a:extLst>
+                <a:ext uri="{FF2B5EF4-FFF2-40B4-BE49-F238E27FC236}">
+                  <a16:creationId xmlns:a16="http://schemas.microsoft.com/office/drawing/2014/main" id="{2B0845DE-7AC3-4897-A89C-5E3297D4E5AA}"/>
+                </a:ext>
+              </a:extLst>
+            </p:cNvPr>
+            <p:cNvGrpSpPr/>
+            <p:nvPr/>
+          </p:nvGrpSpPr>
+          <p:grpSpPr>
+            <a:xfrm>
+              <a:off x="4372957" y="2103464"/>
+              <a:ext cx="482269" cy="420455"/>
+              <a:chOff x="4446109" y="2103464"/>
+              <a:chExt cx="482269" cy="420455"/>
+            </a:xfrm>
+          </p:grpSpPr>
+          <p:sp>
+            <p:nvSpPr>
+              <p:cNvPr id="91" name="AutoShape 174">
+                <a:extLst>
+                  <a:ext uri="{FF2B5EF4-FFF2-40B4-BE49-F238E27FC236}">
+                    <a16:creationId xmlns:a16="http://schemas.microsoft.com/office/drawing/2014/main" id="{69E636F4-8E86-460E-ACC5-4EBFD600D818}"/>
+                  </a:ext>
+                </a:extLst>
+              </p:cNvPr>
+              <p:cNvSpPr>
+                <a:spLocks noChangeArrowheads="1"/>
+              </p:cNvSpPr>
+              <p:nvPr/>
+            </p:nvSpPr>
+            <p:spPr bwMode="auto">
+              <a:xfrm flipV="1">
+                <a:off x="4506392" y="2103464"/>
+                <a:ext cx="361702" cy="228043"/>
+              </a:xfrm>
+              <a:prstGeom prst="triangle">
+                <a:avLst>
+                  <a:gd name="adj" fmla="val 50000"/>
+                </a:avLst>
+              </a:prstGeom>
+              <a:noFill/>
+              <a:ln w="12700">
+                <a:solidFill>
+                  <a:schemeClr val="tx1"/>
+                </a:solidFill>
+                <a:miter lim="800000"/>
+                <a:headEnd type="none" w="lg" len="med"/>
+                <a:tailEnd type="none" w="lg" len="med"/>
+              </a:ln>
+              <a:effectLst/>
+            </p:spPr>
+            <p:txBody>
+              <a:bodyPr anchor="ctr">
+                <a:spAutoFit/>
+              </a:bodyPr>
+              <a:lstStyle/>
+              <a:p>
+                <a:endParaRPr lang="en-US"/>
+              </a:p>
+            </p:txBody>
+          </p:sp>
+          <p:sp>
+            <p:nvSpPr>
+              <p:cNvPr id="92" name="Line 175">
+                <a:extLst>
+                  <a:ext uri="{FF2B5EF4-FFF2-40B4-BE49-F238E27FC236}">
+                    <a16:creationId xmlns:a16="http://schemas.microsoft.com/office/drawing/2014/main" id="{78221ED4-5F24-4459-8402-5BB4FF04BACA}"/>
+                  </a:ext>
+                </a:extLst>
+              </p:cNvPr>
+              <p:cNvSpPr>
+                <a:spLocks noChangeShapeType="1"/>
+              </p:cNvSpPr>
+              <p:nvPr/>
+            </p:nvSpPr>
+            <p:spPr bwMode="auto">
+              <a:xfrm>
+                <a:off x="4446109" y="2395643"/>
+                <a:ext cx="482269" cy="0"/>
+              </a:xfrm>
+              <a:prstGeom prst="line">
+                <a:avLst/>
+              </a:prstGeom>
+              <a:noFill/>
+              <a:ln w="12700">
+                <a:solidFill>
+                  <a:schemeClr val="tx1"/>
+                </a:solidFill>
+                <a:round/>
+                <a:headEnd type="none" w="lg" len="med"/>
+                <a:tailEnd type="none" w="lg" len="med"/>
+              </a:ln>
+              <a:effectLst/>
+            </p:spPr>
+            <p:txBody>
+              <a:bodyPr anchor="ctr">
+                <a:spAutoFit/>
+              </a:bodyPr>
+              <a:lstStyle/>
+              <a:p>
+                <a:endParaRPr lang="en-US"/>
+              </a:p>
+            </p:txBody>
+          </p:sp>
+          <p:sp>
+            <p:nvSpPr>
+              <p:cNvPr id="93" name="Line 176">
+                <a:extLst>
+                  <a:ext uri="{FF2B5EF4-FFF2-40B4-BE49-F238E27FC236}">
+                    <a16:creationId xmlns:a16="http://schemas.microsoft.com/office/drawing/2014/main" id="{C8C1CD32-B047-419B-94C1-94468C09BF49}"/>
+                  </a:ext>
+                </a:extLst>
+              </p:cNvPr>
+              <p:cNvSpPr>
+                <a:spLocks noChangeShapeType="1"/>
+              </p:cNvSpPr>
+              <p:nvPr/>
+            </p:nvSpPr>
+            <p:spPr bwMode="auto">
+              <a:xfrm>
+                <a:off x="4506392" y="2459782"/>
+                <a:ext cx="361702" cy="0"/>
+              </a:xfrm>
+              <a:prstGeom prst="line">
+                <a:avLst/>
+              </a:prstGeom>
+              <a:noFill/>
+              <a:ln w="12700">
+                <a:solidFill>
+                  <a:schemeClr val="tx1"/>
+                </a:solidFill>
+                <a:round/>
+                <a:headEnd type="none" w="lg" len="med"/>
+                <a:tailEnd type="none" w="lg" len="med"/>
+              </a:ln>
+              <a:effectLst/>
+            </p:spPr>
+            <p:txBody>
+              <a:bodyPr anchor="ctr">
+                <a:spAutoFit/>
+              </a:bodyPr>
+              <a:lstStyle/>
+              <a:p>
+                <a:endParaRPr lang="en-US"/>
+              </a:p>
+            </p:txBody>
+          </p:sp>
+          <p:sp>
+            <p:nvSpPr>
+              <p:cNvPr id="94" name="Line 177">
+                <a:extLst>
+                  <a:ext uri="{FF2B5EF4-FFF2-40B4-BE49-F238E27FC236}">
+                    <a16:creationId xmlns:a16="http://schemas.microsoft.com/office/drawing/2014/main" id="{0263AA5E-82E0-4DE5-B1A8-97B6DF03F435}"/>
+                  </a:ext>
+                </a:extLst>
+              </p:cNvPr>
+              <p:cNvSpPr>
+                <a:spLocks noChangeShapeType="1"/>
+              </p:cNvSpPr>
+              <p:nvPr/>
+            </p:nvSpPr>
+            <p:spPr bwMode="auto">
+              <a:xfrm>
+                <a:off x="4576723" y="2523919"/>
+                <a:ext cx="218529" cy="0"/>
+              </a:xfrm>
+              <a:prstGeom prst="line">
+                <a:avLst/>
+              </a:prstGeom>
+              <a:noFill/>
+              <a:ln w="12700">
+                <a:solidFill>
+                  <a:schemeClr val="tx1"/>
+                </a:solidFill>
+                <a:round/>
+                <a:headEnd type="none" w="lg" len="med"/>
+                <a:tailEnd type="none" w="lg" len="med"/>
+              </a:ln>
+              <a:effectLst/>
+            </p:spPr>
+            <p:txBody>
+              <a:bodyPr anchor="ctr">
+                <a:spAutoFit/>
+              </a:bodyPr>
+              <a:lstStyle/>
+              <a:p>
+                <a:endParaRPr lang="en-US"/>
+              </a:p>
+            </p:txBody>
+          </p:sp>
+        </p:grpSp>
+        <p:grpSp>
+          <p:nvGrpSpPr>
+            <p:cNvPr id="95" name="Group 94">
+              <a:extLst>
+                <a:ext uri="{FF2B5EF4-FFF2-40B4-BE49-F238E27FC236}">
+                  <a16:creationId xmlns:a16="http://schemas.microsoft.com/office/drawing/2014/main" id="{6C4BA349-FCC3-4204-8DC3-465EE17CFE92}"/>
+                </a:ext>
+              </a:extLst>
+            </p:cNvPr>
+            <p:cNvGrpSpPr/>
+            <p:nvPr/>
+          </p:nvGrpSpPr>
+          <p:grpSpPr>
+            <a:xfrm>
+              <a:off x="6579535" y="2107587"/>
+              <a:ext cx="482269" cy="420455"/>
+              <a:chOff x="4446109" y="2103464"/>
+              <a:chExt cx="482269" cy="420455"/>
+            </a:xfrm>
+          </p:grpSpPr>
+          <p:sp>
+            <p:nvSpPr>
+              <p:cNvPr id="96" name="AutoShape 174">
+                <a:extLst>
+                  <a:ext uri="{FF2B5EF4-FFF2-40B4-BE49-F238E27FC236}">
+                    <a16:creationId xmlns:a16="http://schemas.microsoft.com/office/drawing/2014/main" id="{B67FDA00-7D32-4A45-B280-91AF61E2E3AE}"/>
+                  </a:ext>
+                </a:extLst>
+              </p:cNvPr>
+              <p:cNvSpPr>
+                <a:spLocks noChangeArrowheads="1"/>
+              </p:cNvSpPr>
+              <p:nvPr/>
+            </p:nvSpPr>
+            <p:spPr bwMode="auto">
+              <a:xfrm flipV="1">
+                <a:off x="4506392" y="2103464"/>
+                <a:ext cx="361702" cy="228043"/>
+              </a:xfrm>
+              <a:prstGeom prst="triangle">
+                <a:avLst>
+                  <a:gd name="adj" fmla="val 50000"/>
+                </a:avLst>
+              </a:prstGeom>
+              <a:noFill/>
+              <a:ln w="12700">
+                <a:solidFill>
+                  <a:schemeClr val="tx1"/>
+                </a:solidFill>
+                <a:miter lim="800000"/>
+                <a:headEnd type="none" w="lg" len="med"/>
+                <a:tailEnd type="none" w="lg" len="med"/>
+              </a:ln>
+              <a:effectLst/>
+            </p:spPr>
+            <p:txBody>
+              <a:bodyPr anchor="ctr">
+                <a:spAutoFit/>
+              </a:bodyPr>
+              <a:lstStyle/>
+              <a:p>
+                <a:endParaRPr lang="en-US"/>
+              </a:p>
+            </p:txBody>
+          </p:sp>
+          <p:sp>
+            <p:nvSpPr>
+              <p:cNvPr id="97" name="Line 175">
+                <a:extLst>
+                  <a:ext uri="{FF2B5EF4-FFF2-40B4-BE49-F238E27FC236}">
+                    <a16:creationId xmlns:a16="http://schemas.microsoft.com/office/drawing/2014/main" id="{BD67BEF0-245C-4DD2-A331-8F0F40097A5D}"/>
+                  </a:ext>
+                </a:extLst>
+              </p:cNvPr>
+              <p:cNvSpPr>
+                <a:spLocks noChangeShapeType="1"/>
+              </p:cNvSpPr>
+              <p:nvPr/>
+            </p:nvSpPr>
+            <p:spPr bwMode="auto">
+              <a:xfrm>
+                <a:off x="4446109" y="2395643"/>
+                <a:ext cx="482269" cy="0"/>
+              </a:xfrm>
+              <a:prstGeom prst="line">
+                <a:avLst/>
+              </a:prstGeom>
+              <a:noFill/>
+              <a:ln w="12700">
+                <a:solidFill>
+                  <a:schemeClr val="tx1"/>
+                </a:solidFill>
+                <a:round/>
+                <a:headEnd type="none" w="lg" len="med"/>
+                <a:tailEnd type="none" w="lg" len="med"/>
+              </a:ln>
+              <a:effectLst/>
+            </p:spPr>
+            <p:txBody>
+              <a:bodyPr anchor="ctr">
+                <a:spAutoFit/>
+              </a:bodyPr>
+              <a:lstStyle/>
+              <a:p>
+                <a:endParaRPr lang="en-US"/>
+              </a:p>
+            </p:txBody>
+          </p:sp>
+          <p:sp>
+            <p:nvSpPr>
+              <p:cNvPr id="98" name="Line 176">
+                <a:extLst>
+                  <a:ext uri="{FF2B5EF4-FFF2-40B4-BE49-F238E27FC236}">
+                    <a16:creationId xmlns:a16="http://schemas.microsoft.com/office/drawing/2014/main" id="{CDA58CEC-D77F-42E4-BBC9-2E0878949CA3}"/>
+                  </a:ext>
+                </a:extLst>
+              </p:cNvPr>
+              <p:cNvSpPr>
+                <a:spLocks noChangeShapeType="1"/>
+              </p:cNvSpPr>
+              <p:nvPr/>
+            </p:nvSpPr>
+            <p:spPr bwMode="auto">
+              <a:xfrm>
+                <a:off x="4506392" y="2459782"/>
+                <a:ext cx="361702" cy="0"/>
+              </a:xfrm>
+              <a:prstGeom prst="line">
+                <a:avLst/>
+              </a:prstGeom>
+              <a:noFill/>
+              <a:ln w="12700">
+                <a:solidFill>
+                  <a:schemeClr val="tx1"/>
+                </a:solidFill>
+                <a:round/>
+                <a:headEnd type="none" w="lg" len="med"/>
+                <a:tailEnd type="none" w="lg" len="med"/>
+              </a:ln>
+              <a:effectLst/>
+            </p:spPr>
+            <p:txBody>
+              <a:bodyPr anchor="ctr">
+                <a:spAutoFit/>
+              </a:bodyPr>
+              <a:lstStyle/>
+              <a:p>
+                <a:endParaRPr lang="en-US"/>
+              </a:p>
+            </p:txBody>
+          </p:sp>
+          <p:sp>
+            <p:nvSpPr>
+              <p:cNvPr id="99" name="Line 177">
+                <a:extLst>
+                  <a:ext uri="{FF2B5EF4-FFF2-40B4-BE49-F238E27FC236}">
+                    <a16:creationId xmlns:a16="http://schemas.microsoft.com/office/drawing/2014/main" id="{CE6C1985-F32A-4982-9E33-25EA74480922}"/>
+                  </a:ext>
+                </a:extLst>
+              </p:cNvPr>
+              <p:cNvSpPr>
+                <a:spLocks noChangeShapeType="1"/>
+              </p:cNvSpPr>
+              <p:nvPr/>
+            </p:nvSpPr>
+            <p:spPr bwMode="auto">
+              <a:xfrm>
+                <a:off x="4576723" y="2523919"/>
+                <a:ext cx="218529" cy="0"/>
+              </a:xfrm>
+              <a:prstGeom prst="line">
+                <a:avLst/>
+              </a:prstGeom>
+              <a:noFill/>
+              <a:ln w="12700">
+                <a:solidFill>
+                  <a:schemeClr val="tx1"/>
+                </a:solidFill>
+                <a:round/>
+                <a:headEnd type="none" w="lg" len="med"/>
+                <a:tailEnd type="none" w="lg" len="med"/>
+              </a:ln>
+              <a:effectLst/>
+            </p:spPr>
+            <p:txBody>
+              <a:bodyPr anchor="ctr">
+                <a:spAutoFit/>
+              </a:bodyPr>
+              <a:lstStyle/>
+              <a:p>
+                <a:endParaRPr lang="en-US"/>
+              </a:p>
+            </p:txBody>
+          </p:sp>
+        </p:grpSp>
+      </p:grpSp>
+    </p:spTree>
+    <p:extLst>
+      <p:ext uri="{BB962C8B-B14F-4D97-AF65-F5344CB8AC3E}">
+        <p14:creationId xmlns:p14="http://schemas.microsoft.com/office/powerpoint/2010/main" val="4131344128"/>
+      </p:ext>
+    </p:extLst>
+  </p:cSld>
+  <p:clrMapOvr>
+    <a:masterClrMapping/>
+  </p:clrMapOvr>
+</p:sld>
+</file>
+
+<file path=ppt/slides/slide4.xml><?xml version="1.0" encoding="utf-8"?>
+<p:sld xmlns:a="http://schemas.openxmlformats.org/drawingml/2006/main" xmlns:r="http://schemas.openxmlformats.org/officeDocument/2006/relationships" xmlns:p="http://schemas.openxmlformats.org/presentationml/2006/main">
+  <p:cSld>
+    <p:spTree>
+      <p:nvGrpSpPr>
+        <p:cNvPr id="1" name=""/>
+        <p:cNvGrpSpPr/>
+        <p:nvPr/>
+      </p:nvGrpSpPr>
+      <p:grpSpPr>
+        <a:xfrm>
+          <a:off x="0" y="0"/>
+          <a:ext cx="0" cy="0"/>
+          <a:chOff x="0" y="0"/>
+          <a:chExt cx="0" cy="0"/>
+        </a:xfrm>
+      </p:grpSpPr>
+      <p:pic>
+        <p:nvPicPr>
+          <p:cNvPr id="3" name="Picture 2">
+            <a:extLst>
+              <a:ext uri="{FF2B5EF4-FFF2-40B4-BE49-F238E27FC236}">
+                <a16:creationId xmlns:a16="http://schemas.microsoft.com/office/drawing/2014/main" id="{76167FA6-20A3-4BCE-B314-217D89CA1D75}"/>
+              </a:ext>
+            </a:extLst>
+          </p:cNvPr>
+          <p:cNvPicPr>
+            <a:picLocks noChangeAspect="1"/>
+          </p:cNvPicPr>
+          <p:nvPr/>
+        </p:nvPicPr>
+        <p:blipFill>
+          <a:blip r:embed="rId2">
+            <a:extLst>
+              <a:ext uri="{28A0092B-C50C-407E-A947-70E740481C1C}">
+                <a14:useLocalDpi xmlns:a14="http://schemas.microsoft.com/office/drawing/2010/main" val="0"/>
+              </a:ext>
+            </a:extLst>
+          </a:blip>
+          <a:stretch>
+            <a:fillRect/>
+          </a:stretch>
+        </p:blipFill>
+        <p:spPr>
+          <a:xfrm>
+            <a:off x="5872480" y="2798064"/>
+            <a:ext cx="1625600" cy="731520"/>
+          </a:xfrm>
+          <a:prstGeom prst="rect">
+            <a:avLst/>
+          </a:prstGeom>
+        </p:spPr>
+      </p:pic>
+    </p:spTree>
+    <p:extLst>
+      <p:ext uri="{BB962C8B-B14F-4D97-AF65-F5344CB8AC3E}">
+        <p14:creationId xmlns:p14="http://schemas.microsoft.com/office/powerpoint/2010/main" val="4010751684"/>
       </p:ext>
     </p:extLst>
   </p:cSld>

</xml_diff>

<commit_message>
Lecture changes to fluids review
</commit_message>
<xml_diff>
--- a/AguaClara Water Treatment Plant Design/Summary Sheets/Diagrams.pptx
+++ b/AguaClara Water Treatment Plant Design/Summary Sheets/Diagrams.pptx
@@ -5400,7 +5400,7 @@
               <a:bodyPr wrap="none" anchor="ctr"/>
               <a:lstStyle/>
               <a:p>
-                <a:endParaRPr lang="en-US"/>
+                <a:endParaRPr lang="en-US" dirty="0"/>
               </a:p>
             </p:txBody>
           </p:sp>
@@ -6904,6 +6904,216 @@
           </p:txBody>
         </p:sp>
       </p:grpSp>
+      <p:sp>
+        <p:nvSpPr>
+          <p:cNvPr id="48" name="Freeform 23">
+            <a:extLst>
+              <a:ext uri="{FF2B5EF4-FFF2-40B4-BE49-F238E27FC236}">
+                <a16:creationId xmlns:a16="http://schemas.microsoft.com/office/drawing/2014/main" id="{C724581E-B26A-4655-A827-11A11C76000C}"/>
+              </a:ext>
+            </a:extLst>
+          </p:cNvPr>
+          <p:cNvSpPr>
+            <a:spLocks/>
+          </p:cNvSpPr>
+          <p:nvPr/>
+        </p:nvSpPr>
+        <p:spPr bwMode="auto">
+          <a:xfrm>
+            <a:off x="2348706" y="3520759"/>
+            <a:ext cx="4406900" cy="774700"/>
+          </a:xfrm>
+          <a:custGeom>
+            <a:avLst/>
+            <a:gdLst>
+              <a:gd name="T0" fmla="*/ 0 w 2776"/>
+              <a:gd name="T1" fmla="*/ 546100 h 488"/>
+              <a:gd name="T2" fmla="*/ 2209800 w 2776"/>
+              <a:gd name="T3" fmla="*/ 546100 h 488"/>
+              <a:gd name="T4" fmla="*/ 2209800 w 2776"/>
+              <a:gd name="T5" fmla="*/ 774700 h 488"/>
+              <a:gd name="T6" fmla="*/ 4406900 w 2776"/>
+              <a:gd name="T7" fmla="*/ 774700 h 488"/>
+              <a:gd name="T8" fmla="*/ 4406900 w 2776"/>
+              <a:gd name="T9" fmla="*/ 0 h 488"/>
+              <a:gd name="T10" fmla="*/ 2209800 w 2776"/>
+              <a:gd name="T11" fmla="*/ 0 h 488"/>
+              <a:gd name="T12" fmla="*/ 2209800 w 2776"/>
+              <a:gd name="T13" fmla="*/ 241300 h 488"/>
+              <a:gd name="T14" fmla="*/ 0 w 2776"/>
+              <a:gd name="T15" fmla="*/ 241300 h 488"/>
+              <a:gd name="T16" fmla="*/ 0 60000 65536"/>
+              <a:gd name="T17" fmla="*/ 0 60000 65536"/>
+              <a:gd name="T18" fmla="*/ 0 60000 65536"/>
+              <a:gd name="T19" fmla="*/ 0 60000 65536"/>
+              <a:gd name="T20" fmla="*/ 0 60000 65536"/>
+              <a:gd name="T21" fmla="*/ 0 60000 65536"/>
+              <a:gd name="T22" fmla="*/ 0 60000 65536"/>
+              <a:gd name="T23" fmla="*/ 0 60000 65536"/>
+              <a:gd name="T24" fmla="*/ 0 w 2776"/>
+              <a:gd name="T25" fmla="*/ 0 h 488"/>
+              <a:gd name="T26" fmla="*/ 2776 w 2776"/>
+              <a:gd name="T27" fmla="*/ 488 h 488"/>
+            </a:gdLst>
+            <a:ahLst/>
+            <a:cxnLst>
+              <a:cxn ang="T16">
+                <a:pos x="T0" y="T1"/>
+              </a:cxn>
+              <a:cxn ang="T17">
+                <a:pos x="T2" y="T3"/>
+              </a:cxn>
+              <a:cxn ang="T18">
+                <a:pos x="T4" y="T5"/>
+              </a:cxn>
+              <a:cxn ang="T19">
+                <a:pos x="T6" y="T7"/>
+              </a:cxn>
+              <a:cxn ang="T20">
+                <a:pos x="T8" y="T9"/>
+              </a:cxn>
+              <a:cxn ang="T21">
+                <a:pos x="T10" y="T11"/>
+              </a:cxn>
+              <a:cxn ang="T22">
+                <a:pos x="T12" y="T13"/>
+              </a:cxn>
+              <a:cxn ang="T23">
+                <a:pos x="T14" y="T15"/>
+              </a:cxn>
+            </a:cxnLst>
+            <a:rect l="T24" t="T25" r="T26" b="T27"/>
+            <a:pathLst>
+              <a:path w="2776" h="488">
+                <a:moveTo>
+                  <a:pt x="0" y="344"/>
+                </a:moveTo>
+                <a:lnTo>
+                  <a:pt x="1392" y="344"/>
+                </a:lnTo>
+                <a:lnTo>
+                  <a:pt x="1392" y="488"/>
+                </a:lnTo>
+                <a:lnTo>
+                  <a:pt x="2776" y="488"/>
+                </a:lnTo>
+                <a:lnTo>
+                  <a:pt x="2776" y="0"/>
+                </a:lnTo>
+                <a:lnTo>
+                  <a:pt x="1392" y="0"/>
+                </a:lnTo>
+                <a:lnTo>
+                  <a:pt x="1392" y="152"/>
+                </a:lnTo>
+                <a:lnTo>
+                  <a:pt x="0" y="152"/>
+                </a:lnTo>
+              </a:path>
+            </a:pathLst>
+          </a:custGeom>
+          <a:solidFill>
+            <a:schemeClr val="hlink"/>
+          </a:solidFill>
+          <a:ln w="12700" cap="flat" cmpd="sng">
+            <a:noFill/>
+            <a:prstDash val="solid"/>
+            <a:round/>
+            <a:headEnd type="none" w="sm" len="sm"/>
+            <a:tailEnd type="none" w="lg" len="med"/>
+          </a:ln>
+        </p:spPr>
+        <p:txBody>
+          <a:bodyPr wrap="none" anchor="ctr"/>
+          <a:lstStyle/>
+          <a:p>
+            <a:endParaRPr lang="en-US" dirty="0"/>
+          </a:p>
+        </p:txBody>
+      </p:sp>
+      <p:graphicFrame>
+        <p:nvGraphicFramePr>
+          <p:cNvPr id="5" name="Table 4">
+            <a:extLst>
+              <a:ext uri="{FF2B5EF4-FFF2-40B4-BE49-F238E27FC236}">
+                <a16:creationId xmlns:a16="http://schemas.microsoft.com/office/drawing/2014/main" id="{93B444A1-0D38-45F1-843E-704BEB145C32}"/>
+              </a:ext>
+            </a:extLst>
+          </p:cNvPr>
+          <p:cNvGraphicFramePr>
+            <a:graphicFrameLocks noGrp="1"/>
+          </p:cNvGraphicFramePr>
+          <p:nvPr>
+            <p:extLst>
+              <p:ext uri="{D42A27DB-BD31-4B8C-83A1-F6EECF244321}">
+                <p14:modId xmlns:p14="http://schemas.microsoft.com/office/powerpoint/2010/main" val="3596286709"/>
+              </p:ext>
+            </p:extLst>
+          </p:nvPr>
+        </p:nvGraphicFramePr>
+        <p:xfrm>
+          <a:off x="5773190" y="5528576"/>
+          <a:ext cx="4635730" cy="365760"/>
+        </p:xfrm>
+        <a:graphic>
+          <a:graphicData uri="http://schemas.openxmlformats.org/drawingml/2006/table">
+            <a:tbl>
+              <a:tblPr/>
+              <a:tblGrid>
+                <a:gridCol w="4635730">
+                  <a:extLst>
+                    <a:ext uri="{9D8B030D-6E8A-4147-A177-3AD203B41FA5}">
+                      <a16:colId xmlns:a16="http://schemas.microsoft.com/office/drawing/2014/main" val="4136114503"/>
+                    </a:ext>
+                  </a:extLst>
+                </a:gridCol>
+              </a:tblGrid>
+              <a:tr h="194044">
+                <a:tc>
+                  <a:txBody>
+                    <a:bodyPr/>
+                    <a:lstStyle/>
+                    <a:p>
+                      <a:endParaRPr lang="en-US" dirty="0"/>
+                    </a:p>
+                  </a:txBody>
+                  <a:tcPr>
+                    <a:lnL w="76200" cmpd="sng">
+                      <a:solidFill>
+                        <a:schemeClr val="tx1"/>
+                      </a:solidFill>
+                      <a:prstDash val="sysDash"/>
+                    </a:lnL>
+                    <a:lnR w="76200" cmpd="sng">
+                      <a:solidFill>
+                        <a:schemeClr val="tx1"/>
+                      </a:solidFill>
+                      <a:prstDash val="sysDash"/>
+                    </a:lnR>
+                    <a:lnT w="76200" cmpd="sng">
+                      <a:solidFill>
+                        <a:schemeClr val="tx1"/>
+                      </a:solidFill>
+                      <a:prstDash val="sysDash"/>
+                    </a:lnT>
+                    <a:lnB w="76200" cmpd="sng">
+                      <a:solidFill>
+                        <a:schemeClr val="tx1"/>
+                      </a:solidFill>
+                      <a:prstDash val="sysDash"/>
+                    </a:lnB>
+                  </a:tcPr>
+                </a:tc>
+                <a:extLst>
+                  <a:ext uri="{0D108BD9-81ED-4DB2-BD59-A6C34878D82A}">
+                    <a16:rowId xmlns:a16="http://schemas.microsoft.com/office/drawing/2014/main" val="1285885046"/>
+                  </a:ext>
+                </a:extLst>
+              </a:tr>
+            </a:tbl>
+          </a:graphicData>
+        </a:graphic>
+      </p:graphicFrame>
     </p:spTree>
     <p:extLst>
       <p:ext uri="{BB962C8B-B14F-4D97-AF65-F5344CB8AC3E}">
@@ -8354,8 +8564,8 @@
               </a:p>
             </p:txBody>
           </p:sp>
-          <mc:AlternateContent xmlns:mc="http://schemas.openxmlformats.org/markup-compatibility/2006">
-            <mc:Choice xmlns:a14="http://schemas.microsoft.com/office/drawing/2010/main" Requires="a14">
+          <mc:AlternateContent xmlns:mc="http://schemas.openxmlformats.org/markup-compatibility/2006" xmlns:a14="http://schemas.microsoft.com/office/drawing/2010/main">
+            <mc:Choice Requires="a14">
               <p:sp>
                 <p:nvSpPr>
                   <p:cNvPr id="61" name="Rectangle 60">
@@ -8416,7 +8626,7 @@
                 </p:txBody>
               </p:sp>
             </mc:Choice>
-            <mc:Fallback>
+            <mc:Fallback xmlns="">
               <p:sp>
                 <p:nvSpPr>
                   <p:cNvPr id="61" name="Rectangle 60">

</xml_diff>

<commit_message>
altered orifice equation diagrams
</commit_message>
<xml_diff>
--- a/AguaClara Water Treatment Plant Design/Summary Sheets/Diagrams.pptx
+++ b/AguaClara Water Treatment Plant Design/Summary Sheets/Diagrams.pptx
@@ -9,8 +9,7 @@
     <p:sldId id="257" r:id="rId3"/>
     <p:sldId id="258" r:id="rId4"/>
     <p:sldId id="259" r:id="rId5"/>
-    <p:sldId id="260" r:id="rId6"/>
-    <p:sldId id="261" r:id="rId7"/>
+    <p:sldId id="261" r:id="rId6"/>
   </p:sldIdLst>
   <p:sldSz cx="12192000" cy="6858000"/>
   <p:notesSz cx="6858000" cy="9144000"/>
@@ -4466,52 +4465,6 @@
                       </a:p>
                     </p:txBody>
                   </p:sp>
-                  <p:sp>
-                    <p:nvSpPr>
-                      <p:cNvPr id="30" name="Arrow: Up 29">
-                        <a:extLst>
-                          <a:ext uri="{FF2B5EF4-FFF2-40B4-BE49-F238E27FC236}">
-                            <a16:creationId xmlns:a16="http://schemas.microsoft.com/office/drawing/2014/main" id="{2D51BD65-5F71-4556-995C-2301D7549D5C}"/>
-                          </a:ext>
-                        </a:extLst>
-                      </p:cNvPr>
-                      <p:cNvSpPr/>
-                      <p:nvPr/>
-                    </p:nvSpPr>
-                    <p:spPr>
-                      <a:xfrm>
-                        <a:off x="5257003" y="3692113"/>
-                        <a:ext cx="189505" cy="1200682"/>
-                      </a:xfrm>
-                      <a:prstGeom prst="upArrow">
-                        <a:avLst/>
-                      </a:prstGeom>
-                    </p:spPr>
-                    <p:style>
-                      <a:lnRef idx="2">
-                        <a:schemeClr val="accent1">
-                          <a:shade val="50000"/>
-                        </a:schemeClr>
-                      </a:lnRef>
-                      <a:fillRef idx="1">
-                        <a:schemeClr val="accent1"/>
-                      </a:fillRef>
-                      <a:effectRef idx="0">
-                        <a:schemeClr val="accent1"/>
-                      </a:effectRef>
-                      <a:fontRef idx="minor">
-                        <a:schemeClr val="lt1"/>
-                      </a:fontRef>
-                    </p:style>
-                    <p:txBody>
-                      <a:bodyPr rtlCol="0" anchor="ctr"/>
-                      <a:lstStyle/>
-                      <a:p>
-                        <a:pPr algn="ctr"/>
-                        <a:endParaRPr lang="en-US"/>
-                      </a:p>
-                    </p:txBody>
-                  </p:sp>
                 </p:grpSp>
               </p:grpSp>
               <p:sp>
@@ -4865,6 +4818,51 @@
           </p:grpSp>
         </p:grpSp>
       </p:grpSp>
+      <p:cxnSp>
+        <p:nvCxnSpPr>
+          <p:cNvPr id="37" name="Straight Arrow Connector 36">
+            <a:extLst>
+              <a:ext uri="{FF2B5EF4-FFF2-40B4-BE49-F238E27FC236}">
+                <a16:creationId xmlns:a16="http://schemas.microsoft.com/office/drawing/2014/main" id="{96693F92-883D-441A-9357-57756DF3AF3B}"/>
+              </a:ext>
+            </a:extLst>
+          </p:cNvPr>
+          <p:cNvCxnSpPr>
+            <a:cxnSpLocks/>
+          </p:cNvCxnSpPr>
+          <p:nvPr/>
+        </p:nvCxnSpPr>
+        <p:spPr>
+          <a:xfrm>
+            <a:off x="6096000" y="3429000"/>
+            <a:ext cx="0" cy="838200"/>
+          </a:xfrm>
+          <a:prstGeom prst="straightConnector1">
+            <a:avLst/>
+          </a:prstGeom>
+          <a:ln w="19050">
+            <a:solidFill>
+              <a:schemeClr val="tx1"/>
+            </a:solidFill>
+            <a:headEnd type="triangle" w="lg" len="lg"/>
+            <a:tailEnd type="none" w="lg" len="lg"/>
+          </a:ln>
+        </p:spPr>
+        <p:style>
+          <a:lnRef idx="1">
+            <a:schemeClr val="accent1"/>
+          </a:lnRef>
+          <a:fillRef idx="0">
+            <a:schemeClr val="accent1"/>
+          </a:fillRef>
+          <a:effectRef idx="0">
+            <a:schemeClr val="accent1"/>
+          </a:effectRef>
+          <a:fontRef idx="minor">
+            <a:schemeClr val="tx1"/>
+          </a:fontRef>
+        </p:style>
+      </p:cxnSp>
     </p:spTree>
     <p:extLst>
       <p:ext uri="{BB962C8B-B14F-4D97-AF65-F5344CB8AC3E}">
@@ -6786,10 +6784,10 @@
       </p:grpSpPr>
       <p:grpSp>
         <p:nvGrpSpPr>
-          <p:cNvPr id="5" name="Group 4">
+          <p:cNvPr id="2" name="Group 1">
             <a:extLst>
               <a:ext uri="{FF2B5EF4-FFF2-40B4-BE49-F238E27FC236}">
-                <a16:creationId xmlns:a16="http://schemas.microsoft.com/office/drawing/2014/main" id="{BBF012EA-8769-4A35-A09A-DDAFBEE27533}"/>
+                <a16:creationId xmlns:a16="http://schemas.microsoft.com/office/drawing/2014/main" id="{74B9016D-11DB-4CD8-9118-27CFF251A34E}"/>
               </a:ext>
             </a:extLst>
           </p:cNvPr>
@@ -6798,7 +6796,7 @@
         </p:nvGrpSpPr>
         <p:grpSpPr>
           <a:xfrm>
-            <a:off x="990600" y="1534669"/>
+            <a:off x="990600" y="1557798"/>
             <a:ext cx="8633936" cy="4004802"/>
             <a:chOff x="990600" y="1534669"/>
             <a:chExt cx="8633936" cy="4004802"/>
@@ -8332,42 +8330,1288 @@
           <a:chExt cx="0" cy="0"/>
         </a:xfrm>
       </p:grpSpPr>
-      <p:pic>
-        <p:nvPicPr>
-          <p:cNvPr id="3" name="Picture 2">
+      <p:grpSp>
+        <p:nvGrpSpPr>
+          <p:cNvPr id="40" name="Group 39">
             <a:extLst>
               <a:ext uri="{FF2B5EF4-FFF2-40B4-BE49-F238E27FC236}">
-                <a16:creationId xmlns:a16="http://schemas.microsoft.com/office/drawing/2014/main" id="{76167FA6-20A3-4BCE-B314-217D89CA1D75}"/>
+                <a16:creationId xmlns:a16="http://schemas.microsoft.com/office/drawing/2014/main" id="{D33025CC-DC65-4CA8-A9CB-66011752C1A2}"/>
               </a:ext>
             </a:extLst>
           </p:cNvPr>
-          <p:cNvPicPr>
-            <a:picLocks noChangeAspect="1"/>
-          </p:cNvPicPr>
+          <p:cNvGrpSpPr/>
           <p:nvPr/>
-        </p:nvPicPr>
-        <p:blipFill>
-          <a:blip r:embed="rId2">
-            <a:extLst>
-              <a:ext uri="{28A0092B-C50C-407E-A947-70E740481C1C}">
-                <a14:useLocalDpi xmlns:a14="http://schemas.microsoft.com/office/drawing/2010/main" val="0"/>
-              </a:ext>
-            </a:extLst>
-          </a:blip>
-          <a:stretch>
-            <a:fillRect/>
-          </a:stretch>
-        </p:blipFill>
-        <p:spPr>
+        </p:nvGrpSpPr>
+        <p:grpSpPr>
           <a:xfrm>
-            <a:off x="5872480" y="2798064"/>
-            <a:ext cx="1625600" cy="731520"/>
+            <a:off x="1960438" y="1127328"/>
+            <a:ext cx="5043487" cy="3597072"/>
+            <a:chOff x="1960438" y="1127328"/>
+            <a:chExt cx="5043487" cy="3597072"/>
           </a:xfrm>
-          <a:prstGeom prst="rect">
-            <a:avLst/>
-          </a:prstGeom>
-        </p:spPr>
-      </p:pic>
+        </p:grpSpPr>
+        <p:sp>
+          <p:nvSpPr>
+            <p:cNvPr id="4" name="Freeform 6">
+              <a:extLst>
+                <a:ext uri="{FF2B5EF4-FFF2-40B4-BE49-F238E27FC236}">
+                  <a16:creationId xmlns:a16="http://schemas.microsoft.com/office/drawing/2014/main" id="{57C7CB09-8C87-4DA8-BFE7-4720504CA68C}"/>
+                </a:ext>
+              </a:extLst>
+            </p:cNvPr>
+            <p:cNvSpPr>
+              <a:spLocks/>
+            </p:cNvSpPr>
+            <p:nvPr/>
+          </p:nvSpPr>
+          <p:spPr bwMode="auto">
+            <a:xfrm>
+              <a:off x="2362200" y="1524000"/>
+              <a:ext cx="2152192" cy="3200400"/>
+            </a:xfrm>
+            <a:custGeom>
+              <a:avLst/>
+              <a:gdLst/>
+              <a:ahLst/>
+              <a:cxnLst>
+                <a:cxn ang="0">
+                  <a:pos x="0" y="0"/>
+                </a:cxn>
+                <a:cxn ang="0">
+                  <a:pos x="0" y="528"/>
+                </a:cxn>
+                <a:cxn ang="0">
+                  <a:pos x="3216" y="528"/>
+                </a:cxn>
+                <a:cxn ang="0">
+                  <a:pos x="3216" y="0"/>
+                </a:cxn>
+              </a:cxnLst>
+              <a:rect l="0" t="0" r="r" b="b"/>
+              <a:pathLst>
+                <a:path w="3216" h="528">
+                  <a:moveTo>
+                    <a:pt x="0" y="0"/>
+                  </a:moveTo>
+                  <a:lnTo>
+                    <a:pt x="0" y="528"/>
+                  </a:lnTo>
+                  <a:lnTo>
+                    <a:pt x="3216" y="528"/>
+                  </a:lnTo>
+                  <a:lnTo>
+                    <a:pt x="3216" y="0"/>
+                  </a:lnTo>
+                </a:path>
+              </a:pathLst>
+            </a:custGeom>
+            <a:solidFill>
+              <a:schemeClr val="hlink"/>
+            </a:solidFill>
+            <a:ln w="57150" cap="flat" cmpd="sng">
+              <a:solidFill>
+                <a:schemeClr val="tx1"/>
+              </a:solidFill>
+              <a:prstDash val="solid"/>
+              <a:round/>
+              <a:headEnd type="none" w="lg" len="med"/>
+              <a:tailEnd type="none" w="lg" len="med"/>
+            </a:ln>
+            <a:effectLst/>
+          </p:spPr>
+          <p:txBody>
+            <a:bodyPr wrap="square" anchor="ctr">
+              <a:spAutoFit/>
+            </a:bodyPr>
+            <a:lstStyle/>
+            <a:p>
+              <a:endParaRPr lang="en-US"/>
+            </a:p>
+          </p:txBody>
+        </p:sp>
+        <p:sp>
+          <p:nvSpPr>
+            <p:cNvPr id="5" name="AutoShape 13">
+              <a:extLst>
+                <a:ext uri="{FF2B5EF4-FFF2-40B4-BE49-F238E27FC236}">
+                  <a16:creationId xmlns:a16="http://schemas.microsoft.com/office/drawing/2014/main" id="{E44A676A-D9DC-402C-BB38-49ADE6046E1D}"/>
+                </a:ext>
+              </a:extLst>
+            </p:cNvPr>
+            <p:cNvSpPr>
+              <a:spLocks noChangeArrowheads="1"/>
+            </p:cNvSpPr>
+            <p:nvPr/>
+          </p:nvSpPr>
+          <p:spPr bwMode="auto">
+            <a:xfrm rot="16200000">
+              <a:off x="4684776" y="2721695"/>
+              <a:ext cx="749808" cy="1280160"/>
+            </a:xfrm>
+            <a:custGeom>
+              <a:avLst/>
+              <a:gdLst>
+                <a:gd name="G0" fmla="+- 6871 0 0"/>
+                <a:gd name="G1" fmla="+- 21600 0 6871"/>
+                <a:gd name="G2" fmla="*/ 6871 1 2"/>
+                <a:gd name="G3" fmla="+- 21600 0 G2"/>
+                <a:gd name="G4" fmla="+/ 6871 21600 2"/>
+                <a:gd name="G5" fmla="+/ G1 0 2"/>
+                <a:gd name="G6" fmla="*/ 21600 21600 6871"/>
+                <a:gd name="G7" fmla="*/ G6 1 2"/>
+                <a:gd name="G8" fmla="+- 21600 0 G7"/>
+                <a:gd name="G9" fmla="*/ 21600 1 2"/>
+                <a:gd name="G10" fmla="+- 6871 0 G9"/>
+                <a:gd name="G11" fmla="?: G10 G8 0"/>
+                <a:gd name="G12" fmla="?: G10 G7 21600"/>
+                <a:gd name="T0" fmla="*/ 18164 w 21600"/>
+                <a:gd name="T1" fmla="*/ 10800 h 21600"/>
+                <a:gd name="T2" fmla="*/ 10800 w 21600"/>
+                <a:gd name="T3" fmla="*/ 21600 h 21600"/>
+                <a:gd name="T4" fmla="*/ 3436 w 21600"/>
+                <a:gd name="T5" fmla="*/ 10800 h 21600"/>
+                <a:gd name="T6" fmla="*/ 10800 w 21600"/>
+                <a:gd name="T7" fmla="*/ 0 h 21600"/>
+                <a:gd name="T8" fmla="*/ 5236 w 21600"/>
+                <a:gd name="T9" fmla="*/ 5236 h 21600"/>
+                <a:gd name="T10" fmla="*/ 16364 w 21600"/>
+                <a:gd name="T11" fmla="*/ 16364 h 21600"/>
+              </a:gdLst>
+              <a:ahLst/>
+              <a:cxnLst>
+                <a:cxn ang="0">
+                  <a:pos x="T0" y="T1"/>
+                </a:cxn>
+                <a:cxn ang="0">
+                  <a:pos x="T2" y="T3"/>
+                </a:cxn>
+                <a:cxn ang="0">
+                  <a:pos x="T4" y="T5"/>
+                </a:cxn>
+                <a:cxn ang="0">
+                  <a:pos x="T6" y="T7"/>
+                </a:cxn>
+              </a:cxnLst>
+              <a:rect l="T8" t="T9" r="T10" b="T11"/>
+              <a:pathLst>
+                <a:path w="21600" h="21600">
+                  <a:moveTo>
+                    <a:pt x="0" y="0"/>
+                  </a:moveTo>
+                  <a:lnTo>
+                    <a:pt x="6871" y="21600"/>
+                  </a:lnTo>
+                  <a:lnTo>
+                    <a:pt x="14729" y="21600"/>
+                  </a:lnTo>
+                  <a:lnTo>
+                    <a:pt x="21600" y="0"/>
+                  </a:lnTo>
+                  <a:close/>
+                </a:path>
+              </a:pathLst>
+            </a:custGeom>
+            <a:solidFill>
+              <a:schemeClr val="hlink"/>
+            </a:solidFill>
+            <a:ln w="12700">
+              <a:noFill/>
+              <a:miter lim="800000"/>
+              <a:headEnd type="none" w="lg" len="med"/>
+              <a:tailEnd type="none" w="lg" len="med"/>
+            </a:ln>
+            <a:effectLst/>
+          </p:spPr>
+          <p:txBody>
+            <a:bodyPr wrap="square" anchor="ctr">
+              <a:spAutoFit/>
+            </a:bodyPr>
+            <a:lstStyle/>
+            <a:p>
+              <a:endParaRPr lang="en-US"/>
+            </a:p>
+          </p:txBody>
+        </p:sp>
+        <p:grpSp>
+          <p:nvGrpSpPr>
+            <p:cNvPr id="6" name="Group 5">
+              <a:extLst>
+                <a:ext uri="{FF2B5EF4-FFF2-40B4-BE49-F238E27FC236}">
+                  <a16:creationId xmlns:a16="http://schemas.microsoft.com/office/drawing/2014/main" id="{4DA08D80-1A6A-442B-AB77-32A50E5443E3}"/>
+                </a:ext>
+              </a:extLst>
+            </p:cNvPr>
+            <p:cNvGrpSpPr>
+              <a:grpSpLocks/>
+            </p:cNvGrpSpPr>
+            <p:nvPr/>
+          </p:nvGrpSpPr>
+          <p:grpSpPr bwMode="auto">
+            <a:xfrm rot="16200000">
+              <a:off x="5087599" y="2392723"/>
+              <a:ext cx="740664" cy="1924262"/>
+              <a:chOff x="2480" y="2033"/>
+              <a:chExt cx="459" cy="1395"/>
+            </a:xfrm>
+          </p:grpSpPr>
+          <p:sp>
+            <p:nvSpPr>
+              <p:cNvPr id="7" name="Freeform 8">
+                <a:extLst>
+                  <a:ext uri="{FF2B5EF4-FFF2-40B4-BE49-F238E27FC236}">
+                    <a16:creationId xmlns:a16="http://schemas.microsoft.com/office/drawing/2014/main" id="{E003F3A7-1CE0-4A77-B1FC-E62855274BD7}"/>
+                  </a:ext>
+                </a:extLst>
+              </p:cNvPr>
+              <p:cNvSpPr>
+                <a:spLocks/>
+              </p:cNvSpPr>
+              <p:nvPr/>
+            </p:nvSpPr>
+            <p:spPr bwMode="auto">
+              <a:xfrm>
+                <a:off x="2480" y="2033"/>
+                <a:ext cx="147" cy="1395"/>
+              </a:xfrm>
+              <a:custGeom>
+                <a:avLst/>
+                <a:gdLst/>
+                <a:ahLst/>
+                <a:cxnLst>
+                  <a:cxn ang="0">
+                    <a:pos x="0" y="0"/>
+                  </a:cxn>
+                  <a:cxn ang="0">
+                    <a:pos x="111" y="232"/>
+                  </a:cxn>
+                  <a:cxn ang="0">
+                    <a:pos x="141" y="1395"/>
+                  </a:cxn>
+                </a:cxnLst>
+                <a:rect l="0" t="0" r="r" b="b"/>
+                <a:pathLst>
+                  <a:path w="147" h="1395">
+                    <a:moveTo>
+                      <a:pt x="0" y="0"/>
+                    </a:moveTo>
+                    <a:cubicBezTo>
+                      <a:pt x="87" y="0"/>
+                      <a:pt x="106" y="174"/>
+                      <a:pt x="111" y="232"/>
+                    </a:cubicBezTo>
+                    <a:cubicBezTo>
+                      <a:pt x="116" y="290"/>
+                      <a:pt x="147" y="1084"/>
+                      <a:pt x="141" y="1395"/>
+                    </a:cubicBezTo>
+                  </a:path>
+                </a:pathLst>
+              </a:custGeom>
+              <a:solidFill>
+                <a:schemeClr val="bg1"/>
+              </a:solidFill>
+              <a:ln w="12700" cap="flat" cmpd="sng">
+                <a:solidFill>
+                  <a:schemeClr val="hlink"/>
+                </a:solidFill>
+                <a:prstDash val="solid"/>
+                <a:round/>
+                <a:headEnd type="none" w="lg" len="med"/>
+                <a:tailEnd type="none" w="lg" len="med"/>
+              </a:ln>
+              <a:effectLst/>
+            </p:spPr>
+            <p:txBody>
+              <a:bodyPr wrap="none" anchor="ctr">
+                <a:spAutoFit/>
+              </a:bodyPr>
+              <a:lstStyle/>
+              <a:p>
+                <a:endParaRPr lang="en-US"/>
+              </a:p>
+            </p:txBody>
+          </p:sp>
+          <p:sp>
+            <p:nvSpPr>
+              <p:cNvPr id="8" name="Freeform 15">
+                <a:extLst>
+                  <a:ext uri="{FF2B5EF4-FFF2-40B4-BE49-F238E27FC236}">
+                    <a16:creationId xmlns:a16="http://schemas.microsoft.com/office/drawing/2014/main" id="{4D1E1D5E-7373-4D02-9C84-1740AE2E30B7}"/>
+                  </a:ext>
+                </a:extLst>
+              </p:cNvPr>
+              <p:cNvSpPr>
+                <a:spLocks/>
+              </p:cNvSpPr>
+              <p:nvPr/>
+            </p:nvSpPr>
+            <p:spPr bwMode="auto">
+              <a:xfrm flipH="1">
+                <a:off x="2792" y="2033"/>
+                <a:ext cx="147" cy="1395"/>
+              </a:xfrm>
+              <a:custGeom>
+                <a:avLst/>
+                <a:gdLst/>
+                <a:ahLst/>
+                <a:cxnLst>
+                  <a:cxn ang="0">
+                    <a:pos x="0" y="0"/>
+                  </a:cxn>
+                  <a:cxn ang="0">
+                    <a:pos x="111" y="232"/>
+                  </a:cxn>
+                  <a:cxn ang="0">
+                    <a:pos x="141" y="1395"/>
+                  </a:cxn>
+                </a:cxnLst>
+                <a:rect l="0" t="0" r="r" b="b"/>
+                <a:pathLst>
+                  <a:path w="147" h="1395">
+                    <a:moveTo>
+                      <a:pt x="0" y="0"/>
+                    </a:moveTo>
+                    <a:cubicBezTo>
+                      <a:pt x="87" y="0"/>
+                      <a:pt x="106" y="174"/>
+                      <a:pt x="111" y="232"/>
+                    </a:cubicBezTo>
+                    <a:cubicBezTo>
+                      <a:pt x="116" y="290"/>
+                      <a:pt x="147" y="1084"/>
+                      <a:pt x="141" y="1395"/>
+                    </a:cubicBezTo>
+                  </a:path>
+                </a:pathLst>
+              </a:custGeom>
+              <a:solidFill>
+                <a:schemeClr val="bg1"/>
+              </a:solidFill>
+              <a:ln w="12700" cap="flat" cmpd="sng">
+                <a:solidFill>
+                  <a:schemeClr val="hlink"/>
+                </a:solidFill>
+                <a:prstDash val="solid"/>
+                <a:round/>
+                <a:headEnd type="none" w="lg" len="med"/>
+                <a:tailEnd type="none" w="lg" len="med"/>
+              </a:ln>
+              <a:effectLst/>
+            </p:spPr>
+            <p:txBody>
+              <a:bodyPr wrap="none" anchor="ctr">
+                <a:spAutoFit/>
+              </a:bodyPr>
+              <a:lstStyle/>
+              <a:p>
+                <a:endParaRPr lang="en-US"/>
+              </a:p>
+            </p:txBody>
+          </p:sp>
+        </p:grpSp>
+        <p:sp>
+          <p:nvSpPr>
+            <p:cNvPr id="9" name="Rectangle 8">
+              <a:extLst>
+                <a:ext uri="{FF2B5EF4-FFF2-40B4-BE49-F238E27FC236}">
+                  <a16:creationId xmlns:a16="http://schemas.microsoft.com/office/drawing/2014/main" id="{F574AE4C-12A3-4433-9E2E-8244525C9549}"/>
+                </a:ext>
+              </a:extLst>
+            </p:cNvPr>
+            <p:cNvSpPr/>
+            <p:nvPr/>
+          </p:nvSpPr>
+          <p:spPr>
+            <a:xfrm>
+              <a:off x="5598350" y="3011376"/>
+              <a:ext cx="1405575" cy="508920"/>
+            </a:xfrm>
+            <a:prstGeom prst="rect">
+              <a:avLst/>
+            </a:prstGeom>
+            <a:solidFill>
+              <a:schemeClr val="bg1"/>
+            </a:solidFill>
+            <a:ln>
+              <a:solidFill>
+                <a:schemeClr val="bg1"/>
+              </a:solidFill>
+            </a:ln>
+          </p:spPr>
+          <p:style>
+            <a:lnRef idx="2">
+              <a:schemeClr val="accent1">
+                <a:shade val="50000"/>
+              </a:schemeClr>
+            </a:lnRef>
+            <a:fillRef idx="1">
+              <a:schemeClr val="accent1"/>
+            </a:fillRef>
+            <a:effectRef idx="0">
+              <a:schemeClr val="accent1"/>
+            </a:effectRef>
+            <a:fontRef idx="minor">
+              <a:schemeClr val="lt1"/>
+            </a:fontRef>
+          </p:style>
+          <p:txBody>
+            <a:bodyPr rtlCol="0" anchor="ctr"/>
+            <a:lstStyle/>
+            <a:p>
+              <a:pPr algn="ctr"/>
+              <a:endParaRPr lang="en-US">
+                <a:ln>
+                  <a:solidFill>
+                    <a:schemeClr val="bg1"/>
+                  </a:solidFill>
+                </a:ln>
+                <a:solidFill>
+                  <a:schemeClr val="bg1"/>
+                </a:solidFill>
+              </a:endParaRPr>
+            </a:p>
+          </p:txBody>
+        </p:sp>
+        <p:cxnSp>
+          <p:nvCxnSpPr>
+            <p:cNvPr id="10" name="Straight Arrow Connector 9">
+              <a:extLst>
+                <a:ext uri="{FF2B5EF4-FFF2-40B4-BE49-F238E27FC236}">
+                  <a16:creationId xmlns:a16="http://schemas.microsoft.com/office/drawing/2014/main" id="{E0C69688-DDD1-429C-B973-3EE6BC93FB7E}"/>
+                </a:ext>
+              </a:extLst>
+            </p:cNvPr>
+            <p:cNvCxnSpPr>
+              <a:cxnSpLocks/>
+            </p:cNvCxnSpPr>
+            <p:nvPr/>
+          </p:nvCxnSpPr>
+          <p:spPr>
+            <a:xfrm>
+              <a:off x="4895032" y="1524000"/>
+              <a:ext cx="0" cy="1804248"/>
+            </a:xfrm>
+            <a:prstGeom prst="straightConnector1">
+              <a:avLst/>
+            </a:prstGeom>
+            <a:ln w="19050">
+              <a:solidFill>
+                <a:schemeClr val="tx1"/>
+              </a:solidFill>
+              <a:headEnd type="triangle" w="lg" len="lg"/>
+              <a:tailEnd type="triangle" w="lg" len="lg"/>
+            </a:ln>
+          </p:spPr>
+          <p:style>
+            <a:lnRef idx="1">
+              <a:schemeClr val="accent1"/>
+            </a:lnRef>
+            <a:fillRef idx="0">
+              <a:schemeClr val="accent1"/>
+            </a:fillRef>
+            <a:effectRef idx="0">
+              <a:schemeClr val="accent1"/>
+            </a:effectRef>
+            <a:fontRef idx="minor">
+              <a:schemeClr val="tx1"/>
+            </a:fontRef>
+          </p:style>
+        </p:cxnSp>
+        <mc:AlternateContent xmlns:mc="http://schemas.openxmlformats.org/markup-compatibility/2006">
+          <mc:Choice xmlns:a14="http://schemas.microsoft.com/office/drawing/2010/main" Requires="a14">
+            <p:sp>
+              <p:nvSpPr>
+                <p:cNvPr id="12" name="Rectangle 11">
+                  <a:extLst>
+                    <a:ext uri="{FF2B5EF4-FFF2-40B4-BE49-F238E27FC236}">
+                      <a16:creationId xmlns:a16="http://schemas.microsoft.com/office/drawing/2014/main" id="{545FB6F4-777A-4930-A154-05E02116D6CF}"/>
+                    </a:ext>
+                  </a:extLst>
+                </p:cNvPr>
+                <p:cNvSpPr/>
+                <p:nvPr/>
+              </p:nvSpPr>
+              <p:spPr>
+                <a:xfrm>
+                  <a:off x="4572000" y="2158899"/>
+                  <a:ext cx="646064" cy="461665"/>
+                </a:xfrm>
+                <a:prstGeom prst="rect">
+                  <a:avLst/>
+                </a:prstGeom>
+                <a:solidFill>
+                  <a:schemeClr val="bg1"/>
+                </a:solidFill>
+              </p:spPr>
+              <p:txBody>
+                <a:bodyPr wrap="square">
+                  <a:spAutoFit/>
+                </a:bodyPr>
+                <a:lstStyle/>
+                <a:p>
+                  <a:pPr/>
+                  <a14:m>
+                    <m:oMathPara xmlns:m="http://schemas.openxmlformats.org/officeDocument/2006/math">
+                      <m:oMathParaPr>
+                        <m:jc m:val="centerGroup"/>
+                      </m:oMathParaPr>
+                      <m:oMath xmlns:m="http://schemas.openxmlformats.org/officeDocument/2006/math">
+                        <m:r>
+                          <a:rPr lang="en-US" sz="2400" i="1">
+                            <a:latin typeface="Cambria Math"/>
+                          </a:rPr>
+                          <m:t>𝛥</m:t>
+                        </m:r>
+                        <m:r>
+                          <a:rPr lang="en-US" sz="2400" i="1">
+                            <a:latin typeface="Cambria Math"/>
+                          </a:rPr>
+                          <m:t>h</m:t>
+                        </m:r>
+                      </m:oMath>
+                    </m:oMathPara>
+                  </a14:m>
+                  <a:endParaRPr lang="en-US" sz="2400" dirty="0">
+                    <a:latin typeface="Times New Roman" panose="02020603050405020304" pitchFamily="18" charset="0"/>
+                    <a:cs typeface="Times New Roman" panose="02020603050405020304" pitchFamily="18" charset="0"/>
+                  </a:endParaRPr>
+                </a:p>
+              </p:txBody>
+            </p:sp>
+          </mc:Choice>
+          <mc:Fallback>
+            <p:sp>
+              <p:nvSpPr>
+                <p:cNvPr id="12" name="Rectangle 11">
+                  <a:extLst>
+                    <a:ext uri="{FF2B5EF4-FFF2-40B4-BE49-F238E27FC236}">
+                      <a16:creationId xmlns:a16="http://schemas.microsoft.com/office/drawing/2014/main" id="{545FB6F4-777A-4930-A154-05E02116D6CF}"/>
+                    </a:ext>
+                  </a:extLst>
+                </p:cNvPr>
+                <p:cNvSpPr>
+                  <a:spLocks noRot="1" noChangeAspect="1" noMove="1" noResize="1" noEditPoints="1" noAdjustHandles="1" noChangeArrowheads="1" noChangeShapeType="1" noTextEdit="1"/>
+                </p:cNvSpPr>
+                <p:nvPr/>
+              </p:nvSpPr>
+              <p:spPr>
+                <a:xfrm>
+                  <a:off x="4572000" y="2158899"/>
+                  <a:ext cx="646064" cy="461665"/>
+                </a:xfrm>
+                <a:prstGeom prst="rect">
+                  <a:avLst/>
+                </a:prstGeom>
+                <a:blipFill>
+                  <a:blip r:embed="rId4"/>
+                  <a:stretch>
+                    <a:fillRect/>
+                  </a:stretch>
+                </a:blipFill>
+              </p:spPr>
+              <p:txBody>
+                <a:bodyPr/>
+                <a:lstStyle/>
+                <a:p>
+                  <a:r>
+                    <a:rPr lang="en-US">
+                      <a:noFill/>
+                    </a:rPr>
+                    <a:t> </a:t>
+                  </a:r>
+                </a:p>
+              </p:txBody>
+            </p:sp>
+          </mc:Fallback>
+        </mc:AlternateContent>
+        <p:grpSp>
+          <p:nvGrpSpPr>
+            <p:cNvPr id="13" name="Group 12">
+              <a:extLst>
+                <a:ext uri="{FF2B5EF4-FFF2-40B4-BE49-F238E27FC236}">
+                  <a16:creationId xmlns:a16="http://schemas.microsoft.com/office/drawing/2014/main" id="{EA9E03FD-BCAA-462D-A6C4-B19647011DF4}"/>
+                </a:ext>
+              </a:extLst>
+            </p:cNvPr>
+            <p:cNvGrpSpPr/>
+            <p:nvPr/>
+          </p:nvGrpSpPr>
+          <p:grpSpPr>
+            <a:xfrm>
+              <a:off x="3406847" y="1292516"/>
+              <a:ext cx="482269" cy="420455"/>
+              <a:chOff x="4446109" y="2103464"/>
+              <a:chExt cx="482269" cy="420455"/>
+            </a:xfrm>
+          </p:grpSpPr>
+          <p:sp>
+            <p:nvSpPr>
+              <p:cNvPr id="14" name="AutoShape 174">
+                <a:extLst>
+                  <a:ext uri="{FF2B5EF4-FFF2-40B4-BE49-F238E27FC236}">
+                    <a16:creationId xmlns:a16="http://schemas.microsoft.com/office/drawing/2014/main" id="{56EFD6BF-292F-40DF-B258-F43A90D892CB}"/>
+                  </a:ext>
+                </a:extLst>
+              </p:cNvPr>
+              <p:cNvSpPr>
+                <a:spLocks noChangeArrowheads="1"/>
+              </p:cNvSpPr>
+              <p:nvPr/>
+            </p:nvSpPr>
+            <p:spPr bwMode="auto">
+              <a:xfrm flipV="1">
+                <a:off x="4506392" y="2103464"/>
+                <a:ext cx="361702" cy="228043"/>
+              </a:xfrm>
+              <a:prstGeom prst="triangle">
+                <a:avLst>
+                  <a:gd name="adj" fmla="val 50000"/>
+                </a:avLst>
+              </a:prstGeom>
+              <a:noFill/>
+              <a:ln w="12700">
+                <a:solidFill>
+                  <a:schemeClr val="tx1"/>
+                </a:solidFill>
+                <a:miter lim="800000"/>
+                <a:headEnd type="none" w="lg" len="med"/>
+                <a:tailEnd type="none" w="lg" len="med"/>
+              </a:ln>
+              <a:effectLst/>
+            </p:spPr>
+            <p:txBody>
+              <a:bodyPr anchor="ctr">
+                <a:spAutoFit/>
+              </a:bodyPr>
+              <a:lstStyle/>
+              <a:p>
+                <a:endParaRPr lang="en-US"/>
+              </a:p>
+            </p:txBody>
+          </p:sp>
+          <p:sp>
+            <p:nvSpPr>
+              <p:cNvPr id="15" name="Line 175">
+                <a:extLst>
+                  <a:ext uri="{FF2B5EF4-FFF2-40B4-BE49-F238E27FC236}">
+                    <a16:creationId xmlns:a16="http://schemas.microsoft.com/office/drawing/2014/main" id="{D3B90883-7651-4669-9F16-25B26B0C4AB5}"/>
+                  </a:ext>
+                </a:extLst>
+              </p:cNvPr>
+              <p:cNvSpPr>
+                <a:spLocks noChangeShapeType="1"/>
+              </p:cNvSpPr>
+              <p:nvPr/>
+            </p:nvSpPr>
+            <p:spPr bwMode="auto">
+              <a:xfrm>
+                <a:off x="4446109" y="2395643"/>
+                <a:ext cx="482269" cy="0"/>
+              </a:xfrm>
+              <a:prstGeom prst="line">
+                <a:avLst/>
+              </a:prstGeom>
+              <a:noFill/>
+              <a:ln w="12700">
+                <a:solidFill>
+                  <a:schemeClr val="tx1"/>
+                </a:solidFill>
+                <a:round/>
+                <a:headEnd type="none" w="lg" len="med"/>
+                <a:tailEnd type="none" w="lg" len="med"/>
+              </a:ln>
+              <a:effectLst/>
+            </p:spPr>
+            <p:txBody>
+              <a:bodyPr anchor="ctr">
+                <a:spAutoFit/>
+              </a:bodyPr>
+              <a:lstStyle/>
+              <a:p>
+                <a:endParaRPr lang="en-US"/>
+              </a:p>
+            </p:txBody>
+          </p:sp>
+          <p:sp>
+            <p:nvSpPr>
+              <p:cNvPr id="16" name="Line 176">
+                <a:extLst>
+                  <a:ext uri="{FF2B5EF4-FFF2-40B4-BE49-F238E27FC236}">
+                    <a16:creationId xmlns:a16="http://schemas.microsoft.com/office/drawing/2014/main" id="{01FA9449-E78B-4BF7-B218-7190FC3DED7C}"/>
+                  </a:ext>
+                </a:extLst>
+              </p:cNvPr>
+              <p:cNvSpPr>
+                <a:spLocks noChangeShapeType="1"/>
+              </p:cNvSpPr>
+              <p:nvPr/>
+            </p:nvSpPr>
+            <p:spPr bwMode="auto">
+              <a:xfrm>
+                <a:off x="4506392" y="2459782"/>
+                <a:ext cx="361702" cy="0"/>
+              </a:xfrm>
+              <a:prstGeom prst="line">
+                <a:avLst/>
+              </a:prstGeom>
+              <a:noFill/>
+              <a:ln w="12700">
+                <a:solidFill>
+                  <a:schemeClr val="tx1"/>
+                </a:solidFill>
+                <a:round/>
+                <a:headEnd type="none" w="lg" len="med"/>
+                <a:tailEnd type="none" w="lg" len="med"/>
+              </a:ln>
+              <a:effectLst/>
+            </p:spPr>
+            <p:txBody>
+              <a:bodyPr anchor="ctr">
+                <a:spAutoFit/>
+              </a:bodyPr>
+              <a:lstStyle/>
+              <a:p>
+                <a:endParaRPr lang="en-US"/>
+              </a:p>
+            </p:txBody>
+          </p:sp>
+          <p:sp>
+            <p:nvSpPr>
+              <p:cNvPr id="17" name="Line 177">
+                <a:extLst>
+                  <a:ext uri="{FF2B5EF4-FFF2-40B4-BE49-F238E27FC236}">
+                    <a16:creationId xmlns:a16="http://schemas.microsoft.com/office/drawing/2014/main" id="{BE0340DA-996F-4A74-B664-787686F309E6}"/>
+                  </a:ext>
+                </a:extLst>
+              </p:cNvPr>
+              <p:cNvSpPr>
+                <a:spLocks noChangeShapeType="1"/>
+              </p:cNvSpPr>
+              <p:nvPr/>
+            </p:nvSpPr>
+            <p:spPr bwMode="auto">
+              <a:xfrm>
+                <a:off x="4576723" y="2523919"/>
+                <a:ext cx="218529" cy="0"/>
+              </a:xfrm>
+              <a:prstGeom prst="line">
+                <a:avLst/>
+              </a:prstGeom>
+              <a:noFill/>
+              <a:ln w="12700">
+                <a:solidFill>
+                  <a:schemeClr val="tx1"/>
+                </a:solidFill>
+                <a:round/>
+                <a:headEnd type="none" w="lg" len="med"/>
+                <a:tailEnd type="none" w="lg" len="med"/>
+              </a:ln>
+              <a:effectLst/>
+            </p:spPr>
+            <p:txBody>
+              <a:bodyPr anchor="ctr">
+                <a:spAutoFit/>
+              </a:bodyPr>
+              <a:lstStyle/>
+              <a:p>
+                <a:endParaRPr lang="en-US"/>
+              </a:p>
+            </p:txBody>
+          </p:sp>
+        </p:grpSp>
+        <p:cxnSp>
+          <p:nvCxnSpPr>
+            <p:cNvPr id="18" name="Straight Connector 17">
+              <a:extLst>
+                <a:ext uri="{FF2B5EF4-FFF2-40B4-BE49-F238E27FC236}">
+                  <a16:creationId xmlns:a16="http://schemas.microsoft.com/office/drawing/2014/main" id="{139A2A25-BB33-4400-8532-774662A60B48}"/>
+                </a:ext>
+              </a:extLst>
+            </p:cNvPr>
+            <p:cNvCxnSpPr>
+              <a:cxnSpLocks/>
+            </p:cNvCxnSpPr>
+            <p:nvPr/>
+          </p:nvCxnSpPr>
+          <p:spPr>
+            <a:xfrm>
+              <a:off x="1968909" y="1520559"/>
+              <a:ext cx="3136491" cy="0"/>
+            </a:xfrm>
+            <a:prstGeom prst="line">
+              <a:avLst/>
+            </a:prstGeom>
+            <a:ln w="28575">
+              <a:solidFill>
+                <a:schemeClr val="bg2">
+                  <a:lumMod val="25000"/>
+                </a:schemeClr>
+              </a:solidFill>
+              <a:prstDash val="dash"/>
+            </a:ln>
+          </p:spPr>
+          <p:style>
+            <a:lnRef idx="1">
+              <a:schemeClr val="accent1"/>
+            </a:lnRef>
+            <a:fillRef idx="0">
+              <a:schemeClr val="accent1"/>
+            </a:fillRef>
+            <a:effectRef idx="0">
+              <a:schemeClr val="accent1"/>
+            </a:effectRef>
+            <a:fontRef idx="minor">
+              <a:schemeClr val="tx1"/>
+            </a:fontRef>
+          </p:style>
+        </p:cxnSp>
+        <p:cxnSp>
+          <p:nvCxnSpPr>
+            <p:cNvPr id="19" name="Straight Connector 18">
+              <a:extLst>
+                <a:ext uri="{FF2B5EF4-FFF2-40B4-BE49-F238E27FC236}">
+                  <a16:creationId xmlns:a16="http://schemas.microsoft.com/office/drawing/2014/main" id="{10A300E1-DA87-4A73-B804-ADDCD474C4D9}"/>
+                </a:ext>
+              </a:extLst>
+            </p:cNvPr>
+            <p:cNvCxnSpPr>
+              <a:cxnSpLocks/>
+            </p:cNvCxnSpPr>
+            <p:nvPr/>
+          </p:nvCxnSpPr>
+          <p:spPr>
+            <a:xfrm>
+              <a:off x="1960438" y="3340045"/>
+              <a:ext cx="3144962" cy="0"/>
+            </a:xfrm>
+            <a:prstGeom prst="line">
+              <a:avLst/>
+            </a:prstGeom>
+            <a:ln w="28575">
+              <a:solidFill>
+                <a:schemeClr val="bg2">
+                  <a:lumMod val="25000"/>
+                </a:schemeClr>
+              </a:solidFill>
+              <a:prstDash val="dash"/>
+            </a:ln>
+          </p:spPr>
+          <p:style>
+            <a:lnRef idx="1">
+              <a:schemeClr val="accent1"/>
+            </a:lnRef>
+            <a:fillRef idx="0">
+              <a:schemeClr val="accent1"/>
+            </a:fillRef>
+            <a:effectRef idx="0">
+              <a:schemeClr val="accent1"/>
+            </a:effectRef>
+            <a:fontRef idx="minor">
+              <a:schemeClr val="tx1"/>
+            </a:fontRef>
+          </p:style>
+        </p:cxnSp>
+        <p:sp>
+          <p:nvSpPr>
+            <p:cNvPr id="25" name="Left Brace 24">
+              <a:extLst>
+                <a:ext uri="{FF2B5EF4-FFF2-40B4-BE49-F238E27FC236}">
+                  <a16:creationId xmlns:a16="http://schemas.microsoft.com/office/drawing/2014/main" id="{6C94C8F7-1CAB-4725-A903-4153E8FD808A}"/>
+                </a:ext>
+              </a:extLst>
+            </p:cNvPr>
+            <p:cNvSpPr/>
+            <p:nvPr/>
+          </p:nvSpPr>
+          <p:spPr>
+            <a:xfrm>
+              <a:off x="4196657" y="2965141"/>
+              <a:ext cx="163714" cy="749808"/>
+            </a:xfrm>
+            <a:prstGeom prst="leftBrace">
+              <a:avLst>
+                <a:gd name="adj1" fmla="val 8333"/>
+                <a:gd name="adj2" fmla="val 70359"/>
+              </a:avLst>
+            </a:prstGeom>
+            <a:ln w="57150">
+              <a:solidFill>
+                <a:schemeClr val="tx1"/>
+              </a:solidFill>
+            </a:ln>
+          </p:spPr>
+          <p:style>
+            <a:lnRef idx="1">
+              <a:schemeClr val="accent1"/>
+            </a:lnRef>
+            <a:fillRef idx="0">
+              <a:schemeClr val="accent1"/>
+            </a:fillRef>
+            <a:effectRef idx="0">
+              <a:schemeClr val="accent1"/>
+            </a:effectRef>
+            <a:fontRef idx="minor">
+              <a:schemeClr val="tx1"/>
+            </a:fontRef>
+          </p:style>
+          <p:txBody>
+            <a:bodyPr rtlCol="0" anchor="ctr"/>
+            <a:lstStyle/>
+            <a:p>
+              <a:pPr algn="ctr"/>
+              <a:endParaRPr lang="en-US"/>
+            </a:p>
+          </p:txBody>
+        </p:sp>
+        <p:sp>
+          <p:nvSpPr>
+            <p:cNvPr id="26" name="Left Brace 25">
+              <a:extLst>
+                <a:ext uri="{FF2B5EF4-FFF2-40B4-BE49-F238E27FC236}">
+                  <a16:creationId xmlns:a16="http://schemas.microsoft.com/office/drawing/2014/main" id="{C0D793E5-915D-460F-9352-46FEFCA987F3}"/>
+                </a:ext>
+              </a:extLst>
+            </p:cNvPr>
+            <p:cNvSpPr/>
+            <p:nvPr/>
+          </p:nvSpPr>
+          <p:spPr>
+            <a:xfrm rot="10800000">
+              <a:off x="5776065" y="3194271"/>
+              <a:ext cx="163714" cy="323683"/>
+            </a:xfrm>
+            <a:prstGeom prst="leftBrace">
+              <a:avLst>
+                <a:gd name="adj1" fmla="val 8333"/>
+                <a:gd name="adj2" fmla="val 47728"/>
+              </a:avLst>
+            </a:prstGeom>
+            <a:ln w="57150">
+              <a:solidFill>
+                <a:schemeClr val="tx1"/>
+              </a:solidFill>
+            </a:ln>
+          </p:spPr>
+          <p:style>
+            <a:lnRef idx="1">
+              <a:schemeClr val="accent1"/>
+            </a:lnRef>
+            <a:fillRef idx="0">
+              <a:schemeClr val="accent1"/>
+            </a:fillRef>
+            <a:effectRef idx="0">
+              <a:schemeClr val="accent1"/>
+            </a:effectRef>
+            <a:fontRef idx="minor">
+              <a:schemeClr val="tx1"/>
+            </a:fontRef>
+          </p:style>
+          <p:txBody>
+            <a:bodyPr rtlCol="0" anchor="ctr"/>
+            <a:lstStyle/>
+            <a:p>
+              <a:pPr algn="ctr"/>
+              <a:endParaRPr lang="en-US"/>
+            </a:p>
+          </p:txBody>
+        </p:sp>
+        <p:pic>
+          <p:nvPicPr>
+            <p:cNvPr id="28" name="Picture 27">
+              <a:extLst>
+                <a:ext uri="{FF2B5EF4-FFF2-40B4-BE49-F238E27FC236}">
+                  <a16:creationId xmlns:a16="http://schemas.microsoft.com/office/drawing/2014/main" id="{974F2EE0-4D52-4CFC-8401-B2ABA73DB98B}"/>
+                </a:ext>
+              </a:extLst>
+            </p:cNvPr>
+            <p:cNvPicPr>
+              <a:picLocks noChangeAspect="1"/>
+            </p:cNvPicPr>
+            <p:nvPr>
+              <p:custDataLst>
+                <p:tags r:id="rId1"/>
+              </p:custDataLst>
+            </p:nvPr>
+          </p:nvPicPr>
+          <p:blipFill>
+            <a:blip r:embed="rId5">
+              <a:extLst>
+                <a:ext uri="{28A0092B-C50C-407E-A947-70E740481C1C}">
+                  <a14:useLocalDpi xmlns:a14="http://schemas.microsoft.com/office/drawing/2010/main" val="0"/>
+                </a:ext>
+              </a:extLst>
+            </a:blip>
+            <a:stretch>
+              <a:fillRect/>
+            </a:stretch>
+          </p:blipFill>
+          <p:spPr>
+            <a:xfrm>
+              <a:off x="3053417" y="3410743"/>
+              <a:ext cx="839619" cy="246857"/>
+            </a:xfrm>
+            <a:prstGeom prst="rect">
+              <a:avLst/>
+            </a:prstGeom>
+          </p:spPr>
+        </p:pic>
+        <p:pic>
+          <p:nvPicPr>
+            <p:cNvPr id="31" name="Picture 30">
+              <a:extLst>
+                <a:ext uri="{FF2B5EF4-FFF2-40B4-BE49-F238E27FC236}">
+                  <a16:creationId xmlns:a16="http://schemas.microsoft.com/office/drawing/2014/main" id="{508DF1B1-30CE-474A-AA8E-AC2FDAFA07B5}"/>
+                </a:ext>
+              </a:extLst>
+            </p:cNvPr>
+            <p:cNvPicPr>
+              <a:picLocks noChangeAspect="1"/>
+            </p:cNvPicPr>
+            <p:nvPr>
+              <p:custDataLst>
+                <p:tags r:id="rId2"/>
+              </p:custDataLst>
+            </p:nvPr>
+          </p:nvPicPr>
+          <p:blipFill>
+            <a:blip r:embed="rId6">
+              <a:extLst>
+                <a:ext uri="{28A0092B-C50C-407E-A947-70E740481C1C}">
+                  <a14:useLocalDpi xmlns:a14="http://schemas.microsoft.com/office/drawing/2010/main" val="0"/>
+                </a:ext>
+              </a:extLst>
+            </a:blip>
+            <a:stretch>
+              <a:fillRect/>
+            </a:stretch>
+          </p:blipFill>
+          <p:spPr>
+            <a:xfrm>
+              <a:off x="6233210" y="3293391"/>
+              <a:ext cx="396190" cy="211809"/>
+            </a:xfrm>
+            <a:prstGeom prst="rect">
+              <a:avLst/>
+            </a:prstGeom>
+          </p:spPr>
+        </p:pic>
+        <p:sp>
+          <p:nvSpPr>
+            <p:cNvPr id="32" name="Oval 31">
+              <a:extLst>
+                <a:ext uri="{FF2B5EF4-FFF2-40B4-BE49-F238E27FC236}">
+                  <a16:creationId xmlns:a16="http://schemas.microsoft.com/office/drawing/2014/main" id="{2E85CA06-1F90-41B0-A61A-B407B248C33B}"/>
+                </a:ext>
+              </a:extLst>
+            </p:cNvPr>
+            <p:cNvSpPr/>
+            <p:nvPr/>
+          </p:nvSpPr>
+          <p:spPr bwMode="auto">
+            <a:xfrm>
+              <a:off x="2892952" y="1459927"/>
+              <a:ext cx="121264" cy="121264"/>
+            </a:xfrm>
+            <a:prstGeom prst="ellipse">
+              <a:avLst/>
+            </a:prstGeom>
+            <a:solidFill>
+              <a:srgbClr val="C00000"/>
+            </a:solidFill>
+            <a:ln w="12700" cap="flat" cmpd="sng" algn="ctr">
+              <a:solidFill>
+                <a:srgbClr val="C00000"/>
+              </a:solidFill>
+              <a:prstDash val="solid"/>
+              <a:round/>
+              <a:headEnd type="none" w="lg" len="med"/>
+              <a:tailEnd type="none" w="lg" len="med"/>
+            </a:ln>
+            <a:effectLst/>
+          </p:spPr>
+          <p:txBody>
+            <a:bodyPr vert="horz" wrap="square" lIns="91440" tIns="45720" rIns="91440" bIns="45720" numCol="1" rtlCol="0" anchor="ctr" anchorCtr="0" compatLnSpc="1">
+              <a:prstTxWarp prst="textNoShape">
+                <a:avLst/>
+              </a:prstTxWarp>
+              <a:spAutoFit/>
+            </a:bodyPr>
+            <a:lstStyle/>
+            <a:p>
+              <a:pPr marL="0" marR="0" indent="0" algn="l" defTabSz="914400" rtl="0" eaLnBrk="1" fontAlgn="base" latinLnBrk="0" hangingPunct="1">
+                <a:lnSpc>
+                  <a:spcPct val="100000"/>
+                </a:lnSpc>
+                <a:spcBef>
+                  <a:spcPct val="0"/>
+                </a:spcBef>
+                <a:spcAft>
+                  <a:spcPct val="0"/>
+                </a:spcAft>
+                <a:buClrTx/>
+                <a:buSzTx/>
+                <a:buFontTx/>
+                <a:buNone/>
+                <a:tabLst/>
+              </a:pPr>
+              <a:endParaRPr kumimoji="0" lang="en-US" sz="1800" b="0" i="0" u="none" strike="noStrike" cap="none" normalizeH="0" baseline="0">
+                <a:ln>
+                  <a:noFill/>
+                </a:ln>
+                <a:solidFill>
+                  <a:schemeClr val="tx1"/>
+                </a:solidFill>
+                <a:effectLst/>
+                <a:latin typeface="Century Gothic" pitchFamily="34" charset="0"/>
+                <a:cs typeface="Arial" charset="0"/>
+              </a:endParaRPr>
+            </a:p>
+          </p:txBody>
+        </p:sp>
+        <p:sp>
+          <p:nvSpPr>
+            <p:cNvPr id="33" name="Oval 32">
+              <a:extLst>
+                <a:ext uri="{FF2B5EF4-FFF2-40B4-BE49-F238E27FC236}">
+                  <a16:creationId xmlns:a16="http://schemas.microsoft.com/office/drawing/2014/main" id="{33C1F4DB-A784-4924-8747-DC035D397677}"/>
+                </a:ext>
+              </a:extLst>
+            </p:cNvPr>
+            <p:cNvSpPr/>
+            <p:nvPr/>
+          </p:nvSpPr>
+          <p:spPr bwMode="auto">
+            <a:xfrm>
+              <a:off x="5536283" y="3307736"/>
+              <a:ext cx="121264" cy="121264"/>
+            </a:xfrm>
+            <a:prstGeom prst="ellipse">
+              <a:avLst/>
+            </a:prstGeom>
+            <a:solidFill>
+              <a:srgbClr val="C00000"/>
+            </a:solidFill>
+            <a:ln w="12700" cap="flat" cmpd="sng" algn="ctr">
+              <a:solidFill>
+                <a:srgbClr val="C00000"/>
+              </a:solidFill>
+              <a:prstDash val="solid"/>
+              <a:round/>
+              <a:headEnd type="none" w="lg" len="med"/>
+              <a:tailEnd type="none" w="lg" len="med"/>
+            </a:ln>
+            <a:effectLst/>
+          </p:spPr>
+          <p:txBody>
+            <a:bodyPr vert="horz" wrap="square" lIns="91440" tIns="45720" rIns="91440" bIns="45720" numCol="1" rtlCol="0" anchor="ctr" anchorCtr="0" compatLnSpc="1">
+              <a:prstTxWarp prst="textNoShape">
+                <a:avLst/>
+              </a:prstTxWarp>
+              <a:spAutoFit/>
+            </a:bodyPr>
+            <a:lstStyle/>
+            <a:p>
+              <a:pPr marL="0" marR="0" indent="0" algn="l" defTabSz="914400" rtl="0" eaLnBrk="1" fontAlgn="base" latinLnBrk="0" hangingPunct="1">
+                <a:lnSpc>
+                  <a:spcPct val="100000"/>
+                </a:lnSpc>
+                <a:spcBef>
+                  <a:spcPct val="0"/>
+                </a:spcBef>
+                <a:spcAft>
+                  <a:spcPct val="0"/>
+                </a:spcAft>
+                <a:buClrTx/>
+                <a:buSzTx/>
+                <a:buFontTx/>
+                <a:buNone/>
+                <a:tabLst/>
+              </a:pPr>
+              <a:endParaRPr kumimoji="0" lang="en-US" sz="1800" b="0" i="0" u="none" strike="noStrike" cap="none" normalizeH="0" baseline="0">
+                <a:ln>
+                  <a:noFill/>
+                </a:ln>
+                <a:solidFill>
+                  <a:schemeClr val="tx1"/>
+                </a:solidFill>
+                <a:effectLst/>
+                <a:latin typeface="Century Gothic" pitchFamily="34" charset="0"/>
+                <a:cs typeface="Arial" charset="0"/>
+              </a:endParaRPr>
+            </a:p>
+          </p:txBody>
+        </p:sp>
+        <p:sp>
+          <p:nvSpPr>
+            <p:cNvPr id="38" name="TextBox 37">
+              <a:extLst>
+                <a:ext uri="{FF2B5EF4-FFF2-40B4-BE49-F238E27FC236}">
+                  <a16:creationId xmlns:a16="http://schemas.microsoft.com/office/drawing/2014/main" id="{F0228B13-6CE8-4A92-8EC1-FB8D324DCD82}"/>
+                </a:ext>
+              </a:extLst>
+            </p:cNvPr>
+            <p:cNvSpPr txBox="1"/>
+            <p:nvPr/>
+          </p:nvSpPr>
+          <p:spPr>
+            <a:xfrm>
+              <a:off x="2802650" y="1127328"/>
+              <a:ext cx="317716" cy="369332"/>
+            </a:xfrm>
+            <a:prstGeom prst="rect">
+              <a:avLst/>
+            </a:prstGeom>
+            <a:noFill/>
+          </p:spPr>
+          <p:txBody>
+            <a:bodyPr wrap="none" rtlCol="0">
+              <a:spAutoFit/>
+            </a:bodyPr>
+            <a:lstStyle/>
+            <a:p>
+              <a:r>
+                <a:rPr lang="en-US" dirty="0"/>
+                <a:t>A</a:t>
+              </a:r>
+            </a:p>
+          </p:txBody>
+        </p:sp>
+        <p:sp>
+          <p:nvSpPr>
+            <p:cNvPr id="39" name="TextBox 38">
+              <a:extLst>
+                <a:ext uri="{FF2B5EF4-FFF2-40B4-BE49-F238E27FC236}">
+                  <a16:creationId xmlns:a16="http://schemas.microsoft.com/office/drawing/2014/main" id="{C49789DA-CDBA-4756-991D-066838BBDFA2}"/>
+                </a:ext>
+              </a:extLst>
+            </p:cNvPr>
+            <p:cNvSpPr txBox="1"/>
+            <p:nvPr/>
+          </p:nvSpPr>
+          <p:spPr>
+            <a:xfrm>
+              <a:off x="5404978" y="2754868"/>
+              <a:ext cx="309700" cy="369332"/>
+            </a:xfrm>
+            <a:prstGeom prst="rect">
+              <a:avLst/>
+            </a:prstGeom>
+            <a:noFill/>
+          </p:spPr>
+          <p:txBody>
+            <a:bodyPr wrap="none" rtlCol="0">
+              <a:spAutoFit/>
+            </a:bodyPr>
+            <a:lstStyle/>
+            <a:p>
+              <a:r>
+                <a:rPr lang="en-US" dirty="0"/>
+                <a:t>B</a:t>
+              </a:r>
+            </a:p>
+          </p:txBody>
+        </p:sp>
+      </p:grpSp>
     </p:spTree>
     <p:extLst>
       <p:ext uri="{BB962C8B-B14F-4D97-AF65-F5344CB8AC3E}">
@@ -8382,36 +9626,6 @@
 </file>
 
 <file path=ppt/slides/slide5.xml><?xml version="1.0" encoding="utf-8"?>
-<p:sld xmlns:a="http://schemas.openxmlformats.org/drawingml/2006/main" xmlns:r="http://schemas.openxmlformats.org/officeDocument/2006/relationships" xmlns:p="http://schemas.openxmlformats.org/presentationml/2006/main">
-  <p:cSld>
-    <p:spTree>
-      <p:nvGrpSpPr>
-        <p:cNvPr id="1" name=""/>
-        <p:cNvGrpSpPr/>
-        <p:nvPr/>
-      </p:nvGrpSpPr>
-      <p:grpSpPr>
-        <a:xfrm>
-          <a:off x="0" y="0"/>
-          <a:ext cx="0" cy="0"/>
-          <a:chOff x="0" y="0"/>
-          <a:chExt cx="0" cy="0"/>
-        </a:xfrm>
-      </p:grpSpPr>
-    </p:spTree>
-    <p:extLst>
-      <p:ext uri="{BB962C8B-B14F-4D97-AF65-F5344CB8AC3E}">
-        <p14:creationId xmlns:p14="http://schemas.microsoft.com/office/powerpoint/2010/main" val="2275991695"/>
-      </p:ext>
-    </p:extLst>
-  </p:cSld>
-  <p:clrMapOvr>
-    <a:masterClrMapping/>
-  </p:clrMapOvr>
-</p:sld>
-</file>
-
-<file path=ppt/slides/slide6.xml><?xml version="1.0" encoding="utf-8"?>
 <p:sld xmlns:a="http://schemas.openxmlformats.org/drawingml/2006/main" xmlns:r="http://schemas.openxmlformats.org/officeDocument/2006/relationships" xmlns:p="http://schemas.openxmlformats.org/presentationml/2006/main">
   <p:cSld>
     <p:spTree>
@@ -10007,6 +11221,44 @@
 </p:sld>
 </file>
 
+<file path=ppt/tags/tag1.xml><?xml version="1.0" encoding="utf-8"?>
+<p:tagLst xmlns:a="http://schemas.openxmlformats.org/drawingml/2006/main" xmlns:r="http://schemas.openxmlformats.org/officeDocument/2006/relationships" xmlns:p="http://schemas.openxmlformats.org/presentationml/2006/main">
+  <p:tag name="OUTPUTDPI" val="1200"/>
+  <p:tag name="ORIGINALHEIGHT" val="121.4848"/>
+  <p:tag name="ORIGINALWIDTH" val="413.1983"/>
+  <p:tag name="LATEXADDIN" val="\documentclass{article}&#10;\usepackage{amsmath}&#10;\usepackage{xcolor}&#10;\pagestyle{empty}&#10;\begin{document}&#10;&#10;\definecolor{Monred}{RGB}{172,0,0}&#10;&#10;&#10;$$D_{orifice}$$&#10;&#10;\end{document}"/>
+  <p:tag name="IGUANATEXSIZE" val="20"/>
+  <p:tag name="IGUANATEXCURSOR" val="151"/>
+  <p:tag name="TRANSPARENCY" val="True"/>
+  <p:tag name="FILENAME" val=""/>
+  <p:tag name="LATEXENGINEID" val="0"/>
+  <p:tag name="TEMPFOLDER" val="c:\temp\"/>
+  <p:tag name="LATEXFORMHEIGHT" val="312"/>
+  <p:tag name="LATEXFORMWIDTH" val="384"/>
+  <p:tag name="LATEXFORMWRAP" val="True"/>
+  <p:tag name="BITMAPVECTOR" val="0"/>
+</p:tagLst>
+</file>
+
+<file path=ppt/tags/tag2.xml><?xml version="1.0" encoding="utf-8"?>
+<p:tagLst xmlns:a="http://schemas.openxmlformats.org/drawingml/2006/main" xmlns:r="http://schemas.openxmlformats.org/officeDocument/2006/relationships" xmlns:p="http://schemas.openxmlformats.org/presentationml/2006/main">
+  <p:tag name="OUTPUTDPI" val="1200"/>
+  <p:tag name="ORIGINALHEIGHT" val="104.237"/>
+  <p:tag name="ORIGINALWIDTH" val="194.9756"/>
+  <p:tag name="LATEXADDIN" val="\documentclass{article}&#10;\usepackage{amsmath}&#10;\usepackage{xcolor}&#10;\pagestyle{empty}&#10;\begin{document}&#10;&#10;\definecolor{Monred}{RGB}{172,0,0}&#10;&#10;&#10;$$D_{vc}$$&#10;&#10;\end{document}"/>
+  <p:tag name="IGUANATEXSIZE" val="20"/>
+  <p:tag name="IGUANATEXCURSOR" val="145"/>
+  <p:tag name="TRANSPARENCY" val="True"/>
+  <p:tag name="FILENAME" val=""/>
+  <p:tag name="LATEXENGINEID" val="0"/>
+  <p:tag name="TEMPFOLDER" val="c:\temp\"/>
+  <p:tag name="LATEXFORMHEIGHT" val="312"/>
+  <p:tag name="LATEXFORMWIDTH" val="384"/>
+  <p:tag name="LATEXFORMWRAP" val="True"/>
+  <p:tag name="BITMAPVECTOR" val="0"/>
+</p:tagLst>
+</file>
+
 <file path=ppt/theme/theme1.xml><?xml version="1.0" encoding="utf-8"?>
 <a:theme xmlns:a="http://schemas.openxmlformats.org/drawingml/2006/main" name="Office Theme">
   <a:themeElements>

</xml_diff>

<commit_message>
How to explain a tank with a valve?
</commit_message>
<xml_diff>
--- a/AguaClara Water Treatment Plant Design/Summary Sheets/Diagrams.pptx
+++ b/AguaClara Water Treatment Plant Design/Summary Sheets/Diagrams.pptx
@@ -275,7 +275,7 @@
           <a:p>
             <a:fld id="{21D1E3DE-262E-49AD-8F92-4417FBCF3DA3}" type="datetimeFigureOut">
               <a:rPr lang="en-US" smtClean="0"/>
-              <a:t>4/12/2018</a:t>
+              <a:t>4/15/2018</a:t>
             </a:fld>
             <a:endParaRPr lang="en-US"/>
           </a:p>
@@ -473,7 +473,7 @@
           <a:p>
             <a:fld id="{21D1E3DE-262E-49AD-8F92-4417FBCF3DA3}" type="datetimeFigureOut">
               <a:rPr lang="en-US" smtClean="0"/>
-              <a:t>4/12/2018</a:t>
+              <a:t>4/15/2018</a:t>
             </a:fld>
             <a:endParaRPr lang="en-US"/>
           </a:p>
@@ -681,7 +681,7 @@
           <a:p>
             <a:fld id="{21D1E3DE-262E-49AD-8F92-4417FBCF3DA3}" type="datetimeFigureOut">
               <a:rPr lang="en-US" smtClean="0"/>
-              <a:t>4/12/2018</a:t>
+              <a:t>4/15/2018</a:t>
             </a:fld>
             <a:endParaRPr lang="en-US"/>
           </a:p>
@@ -879,7 +879,7 @@
           <a:p>
             <a:fld id="{21D1E3DE-262E-49AD-8F92-4417FBCF3DA3}" type="datetimeFigureOut">
               <a:rPr lang="en-US" smtClean="0"/>
-              <a:t>4/12/2018</a:t>
+              <a:t>4/15/2018</a:t>
             </a:fld>
             <a:endParaRPr lang="en-US"/>
           </a:p>
@@ -1154,7 +1154,7 @@
           <a:p>
             <a:fld id="{21D1E3DE-262E-49AD-8F92-4417FBCF3DA3}" type="datetimeFigureOut">
               <a:rPr lang="en-US" smtClean="0"/>
-              <a:t>4/12/2018</a:t>
+              <a:t>4/15/2018</a:t>
             </a:fld>
             <a:endParaRPr lang="en-US"/>
           </a:p>
@@ -1419,7 +1419,7 @@
           <a:p>
             <a:fld id="{21D1E3DE-262E-49AD-8F92-4417FBCF3DA3}" type="datetimeFigureOut">
               <a:rPr lang="en-US" smtClean="0"/>
-              <a:t>4/12/2018</a:t>
+              <a:t>4/15/2018</a:t>
             </a:fld>
             <a:endParaRPr lang="en-US"/>
           </a:p>
@@ -1831,7 +1831,7 @@
           <a:p>
             <a:fld id="{21D1E3DE-262E-49AD-8F92-4417FBCF3DA3}" type="datetimeFigureOut">
               <a:rPr lang="en-US" smtClean="0"/>
-              <a:t>4/12/2018</a:t>
+              <a:t>4/15/2018</a:t>
             </a:fld>
             <a:endParaRPr lang="en-US"/>
           </a:p>
@@ -1972,7 +1972,7 @@
           <a:p>
             <a:fld id="{21D1E3DE-262E-49AD-8F92-4417FBCF3DA3}" type="datetimeFigureOut">
               <a:rPr lang="en-US" smtClean="0"/>
-              <a:t>4/12/2018</a:t>
+              <a:t>4/15/2018</a:t>
             </a:fld>
             <a:endParaRPr lang="en-US"/>
           </a:p>
@@ -2085,7 +2085,7 @@
           <a:p>
             <a:fld id="{21D1E3DE-262E-49AD-8F92-4417FBCF3DA3}" type="datetimeFigureOut">
               <a:rPr lang="en-US" smtClean="0"/>
-              <a:t>4/12/2018</a:t>
+              <a:t>4/15/2018</a:t>
             </a:fld>
             <a:endParaRPr lang="en-US"/>
           </a:p>
@@ -2396,7 +2396,7 @@
           <a:p>
             <a:fld id="{21D1E3DE-262E-49AD-8F92-4417FBCF3DA3}" type="datetimeFigureOut">
               <a:rPr lang="en-US" smtClean="0"/>
-              <a:t>4/12/2018</a:t>
+              <a:t>4/15/2018</a:t>
             </a:fld>
             <a:endParaRPr lang="en-US"/>
           </a:p>
@@ -2684,7 +2684,7 @@
           <a:p>
             <a:fld id="{21D1E3DE-262E-49AD-8F92-4417FBCF3DA3}" type="datetimeFigureOut">
               <a:rPr lang="en-US" smtClean="0"/>
-              <a:t>4/12/2018</a:t>
+              <a:t>4/15/2018</a:t>
             </a:fld>
             <a:endParaRPr lang="en-US"/>
           </a:p>
@@ -2925,7 +2925,7 @@
           <a:p>
             <a:fld id="{21D1E3DE-262E-49AD-8F92-4417FBCF3DA3}" type="datetimeFigureOut">
               <a:rPr lang="en-US" smtClean="0"/>
-              <a:t>4/12/2018</a:t>
+              <a:t>4/15/2018</a:t>
             </a:fld>
             <a:endParaRPr lang="en-US"/>
           </a:p>
@@ -11179,7 +11179,7 @@
                   <a:avLst/>
                 </a:prstGeom>
                 <a:blipFill dpi="0" rotWithShape="1">
-                  <a:blip r:embed="rId6" cstate="print"/>
+                  <a:blip r:embed="rId10" cstate="print"/>
                   <a:srcRect/>
                   <a:tile tx="0" ty="0" sx="100000" sy="100000" flip="none" algn="tl"/>
                 </a:blipFill>
@@ -11226,7 +11226,7 @@
                   <a:avLst/>
                 </a:prstGeom>
                 <a:blipFill dpi="0" rotWithShape="1">
-                  <a:blip r:embed="rId6" cstate="print"/>
+                  <a:blip r:embed="rId10" cstate="print"/>
                   <a:srcRect/>
                   <a:tile tx="0" ty="0" sx="100000" sy="100000" flip="none" algn="tl"/>
                 </a:blipFill>
@@ -11324,7 +11324,7 @@
                   </a:pathLst>
                 </a:custGeom>
                 <a:blipFill dpi="0" rotWithShape="1">
-                  <a:blip r:embed="rId6" cstate="print"/>
+                  <a:blip r:embed="rId10" cstate="print"/>
                   <a:srcRect/>
                   <a:tile tx="0" ty="0" sx="100000" sy="100000" flip="none" algn="tl"/>
                 </a:blipFill>
@@ -11514,7 +11514,7 @@
                   <a:avLst/>
                 </a:prstGeom>
                 <a:blipFill dpi="0" rotWithShape="1">
-                  <a:blip r:embed="rId6" cstate="print"/>
+                  <a:blip r:embed="rId10" cstate="print"/>
                   <a:srcRect/>
                   <a:tile tx="0" ty="0" sx="100000" sy="100000" flip="none" algn="tl"/>
                 </a:blipFill>
@@ -12199,7 +12199,7 @@
                   </a:pathLst>
                 </a:custGeom>
                 <a:blipFill dpi="0" rotWithShape="1">
-                  <a:blip r:embed="rId6" cstate="print"/>
+                  <a:blip r:embed="rId10" cstate="print"/>
                   <a:srcRect/>
                   <a:tile tx="0" ty="0" sx="100000" sy="100000" flip="none" algn="tl"/>
                 </a:blipFill>
@@ -12299,7 +12299,7 @@
                   </a:pathLst>
                 </a:custGeom>
                 <a:blipFill dpi="0" rotWithShape="1">
-                  <a:blip r:embed="rId6" cstate="print"/>
+                  <a:blip r:embed="rId10" cstate="print"/>
                   <a:srcRect/>
                   <a:tile tx="0" ty="0" sx="100000" sy="100000" flip="none" algn="tl"/>
                 </a:blipFill>
@@ -12478,7 +12478,7 @@
                     </a:pathLst>
                   </a:custGeom>
                   <a:blipFill dpi="0" rotWithShape="1">
-                    <a:blip r:embed="rId6" cstate="print"/>
+                    <a:blip r:embed="rId10" cstate="print"/>
                     <a:srcRect/>
                     <a:tile tx="0" ty="0" sx="100000" sy="100000" flip="none" algn="tl"/>
                   </a:blipFill>
@@ -14667,7 +14667,7 @@
                   <a:avLst/>
                 </a:prstGeom>
                 <a:blipFill dpi="0" rotWithShape="1">
-                  <a:blip r:embed="rId6" cstate="print"/>
+                  <a:blip r:embed="rId10" cstate="print"/>
                   <a:srcRect/>
                   <a:tile tx="0" ty="0" sx="100000" sy="100000" flip="none" algn="tl"/>
                 </a:blipFill>
@@ -14714,7 +14714,7 @@
                   <a:avLst/>
                 </a:prstGeom>
                 <a:blipFill dpi="0" rotWithShape="1">
-                  <a:blip r:embed="rId6" cstate="print"/>
+                  <a:blip r:embed="rId10" cstate="print"/>
                   <a:srcRect/>
                   <a:tile tx="0" ty="0" sx="100000" sy="100000" flip="none" algn="tl"/>
                 </a:blipFill>
@@ -14812,7 +14812,7 @@
                   </a:pathLst>
                 </a:custGeom>
                 <a:blipFill dpi="0" rotWithShape="1">
-                  <a:blip r:embed="rId6" cstate="print"/>
+                  <a:blip r:embed="rId10" cstate="print"/>
                   <a:srcRect/>
                   <a:tile tx="0" ty="0" sx="100000" sy="100000" flip="none" algn="tl"/>
                 </a:blipFill>
@@ -15002,7 +15002,7 @@
                   <a:avLst/>
                 </a:prstGeom>
                 <a:blipFill dpi="0" rotWithShape="1">
-                  <a:blip r:embed="rId6" cstate="print"/>
+                  <a:blip r:embed="rId10" cstate="print"/>
                   <a:srcRect/>
                   <a:tile tx="0" ty="0" sx="100000" sy="100000" flip="none" algn="tl"/>
                 </a:blipFill>
@@ -15687,7 +15687,7 @@
                   </a:pathLst>
                 </a:custGeom>
                 <a:blipFill dpi="0" rotWithShape="1">
-                  <a:blip r:embed="rId6" cstate="print"/>
+                  <a:blip r:embed="rId10" cstate="print"/>
                   <a:srcRect/>
                   <a:tile tx="0" ty="0" sx="100000" sy="100000" flip="none" algn="tl"/>
                 </a:blipFill>
@@ -15787,7 +15787,7 @@
                   </a:pathLst>
                 </a:custGeom>
                 <a:blipFill dpi="0" rotWithShape="1">
-                  <a:blip r:embed="rId6" cstate="print"/>
+                  <a:blip r:embed="rId10" cstate="print"/>
                   <a:srcRect/>
                   <a:tile tx="0" ty="0" sx="100000" sy="100000" flip="none" algn="tl"/>
                 </a:blipFill>
@@ -15966,7 +15966,7 @@
                     </a:pathLst>
                   </a:custGeom>
                   <a:blipFill dpi="0" rotWithShape="1">
-                    <a:blip r:embed="rId6" cstate="print"/>
+                    <a:blip r:embed="rId10" cstate="print"/>
                     <a:srcRect/>
                     <a:tile tx="0" ty="0" sx="100000" sy="100000" flip="none" algn="tl"/>
                   </a:blipFill>
@@ -17748,12 +17748,12 @@
                 </p:cNvPicPr>
                 <p:nvPr>
                   <p:custDataLst>
-                    <p:tags r:id="rId4"/>
+                    <p:tags r:id="rId8"/>
                   </p:custDataLst>
                 </p:nvPr>
               </p:nvPicPr>
               <p:blipFill>
-                <a:blip r:embed="rId7">
+                <a:blip r:embed="rId11">
                   <a:extLst>
                     <a:ext uri="{28A0092B-C50C-407E-A947-70E740481C1C}">
                       <a14:useLocalDpi xmlns:a14="http://schemas.microsoft.com/office/drawing/2010/main" val="0"/>
@@ -18008,12 +18008,12 @@
               </p:cNvPicPr>
               <p:nvPr>
                 <p:custDataLst>
-                  <p:tags r:id="rId2"/>
+                  <p:tags r:id="rId6"/>
                 </p:custDataLst>
               </p:nvPr>
             </p:nvPicPr>
             <p:blipFill>
-              <a:blip r:embed="rId8">
+              <a:blip r:embed="rId12">
                 <a:extLst>
                   <a:ext uri="{28A0092B-C50C-407E-A947-70E740481C1C}">
                     <a14:useLocalDpi xmlns:a14="http://schemas.microsoft.com/office/drawing/2010/main" val="0"/>
@@ -18051,12 +18051,12 @@
               </p:cNvPicPr>
               <p:nvPr>
                 <p:custDataLst>
-                  <p:tags r:id="rId3"/>
+                  <p:tags r:id="rId7"/>
                 </p:custDataLst>
               </p:nvPr>
             </p:nvPicPr>
             <p:blipFill>
-              <a:blip r:embed="rId9">
+              <a:blip r:embed="rId13">
                 <a:extLst>
                   <a:ext uri="{28A0092B-C50C-407E-A947-70E740481C1C}">
                     <a14:useLocalDpi xmlns:a14="http://schemas.microsoft.com/office/drawing/2010/main" val="0"/>
@@ -18095,12 +18095,12 @@
             </p:cNvPicPr>
             <p:nvPr>
               <p:custDataLst>
-                <p:tags r:id="rId1"/>
+                <p:tags r:id="rId5"/>
               </p:custDataLst>
             </p:nvPr>
           </p:nvPicPr>
           <p:blipFill>
-            <a:blip r:embed="rId10">
+            <a:blip r:embed="rId14">
               <a:extLst>
                 <a:ext uri="{28A0092B-C50C-407E-A947-70E740481C1C}">
                   <a14:useLocalDpi xmlns:a14="http://schemas.microsoft.com/office/drawing/2010/main" val="0"/>
@@ -18125,6 +18125,3881 @@
           </p:spPr>
         </p:pic>
       </p:grpSp>
+      <p:grpSp>
+        <p:nvGrpSpPr>
+          <p:cNvPr id="3" name="Group 2">
+            <a:extLst>
+              <a:ext uri="{FF2B5EF4-FFF2-40B4-BE49-F238E27FC236}">
+                <a16:creationId xmlns:a16="http://schemas.microsoft.com/office/drawing/2014/main" id="{EAC43AD0-9B9C-4265-BBE6-3ECCD482CA92}"/>
+              </a:ext>
+            </a:extLst>
+          </p:cNvPr>
+          <p:cNvGrpSpPr/>
+          <p:nvPr/>
+        </p:nvGrpSpPr>
+        <p:grpSpPr>
+          <a:xfrm>
+            <a:off x="-507728" y="4447979"/>
+            <a:ext cx="7396568" cy="4322120"/>
+            <a:chOff x="-507728" y="4447979"/>
+            <a:chExt cx="7396568" cy="4322120"/>
+          </a:xfrm>
+        </p:grpSpPr>
+        <p:grpSp>
+          <p:nvGrpSpPr>
+            <p:cNvPr id="2" name="Group 1">
+              <a:extLst>
+                <a:ext uri="{FF2B5EF4-FFF2-40B4-BE49-F238E27FC236}">
+                  <a16:creationId xmlns:a16="http://schemas.microsoft.com/office/drawing/2014/main" id="{B6679E52-9F67-40C5-9172-2C198C74E21E}"/>
+                </a:ext>
+              </a:extLst>
+            </p:cNvPr>
+            <p:cNvGrpSpPr/>
+            <p:nvPr/>
+          </p:nvGrpSpPr>
+          <p:grpSpPr>
+            <a:xfrm>
+              <a:off x="-507728" y="4447979"/>
+              <a:ext cx="7396568" cy="4322120"/>
+              <a:chOff x="-910340" y="4773088"/>
+              <a:chExt cx="7396568" cy="4322120"/>
+            </a:xfrm>
+          </p:grpSpPr>
+          <p:grpSp>
+            <p:nvGrpSpPr>
+              <p:cNvPr id="134" name="Group 133">
+                <a:extLst>
+                  <a:ext uri="{FF2B5EF4-FFF2-40B4-BE49-F238E27FC236}">
+                    <a16:creationId xmlns:a16="http://schemas.microsoft.com/office/drawing/2014/main" id="{1D5F86DC-7ED1-4414-A547-C0B0B39214C7}"/>
+                  </a:ext>
+                </a:extLst>
+              </p:cNvPr>
+              <p:cNvGrpSpPr/>
+              <p:nvPr/>
+            </p:nvGrpSpPr>
+            <p:grpSpPr>
+              <a:xfrm>
+                <a:off x="-910340" y="4773088"/>
+                <a:ext cx="7396568" cy="4322120"/>
+                <a:chOff x="-1175738" y="-345384"/>
+                <a:chExt cx="7396568" cy="4322120"/>
+              </a:xfrm>
+            </p:grpSpPr>
+            <p:grpSp>
+              <p:nvGrpSpPr>
+                <p:cNvPr id="135" name="Group 134">
+                  <a:extLst>
+                    <a:ext uri="{FF2B5EF4-FFF2-40B4-BE49-F238E27FC236}">
+                      <a16:creationId xmlns:a16="http://schemas.microsoft.com/office/drawing/2014/main" id="{B807E9C9-4802-474A-AC29-2B205797394A}"/>
+                    </a:ext>
+                  </a:extLst>
+                </p:cNvPr>
+                <p:cNvGrpSpPr/>
+                <p:nvPr/>
+              </p:nvGrpSpPr>
+              <p:grpSpPr>
+                <a:xfrm>
+                  <a:off x="-806742" y="-345384"/>
+                  <a:ext cx="6598091" cy="3698063"/>
+                  <a:chOff x="-441478" y="1556988"/>
+                  <a:chExt cx="6598091" cy="3698063"/>
+                </a:xfrm>
+              </p:grpSpPr>
+              <p:grpSp>
+                <p:nvGrpSpPr>
+                  <p:cNvPr id="137" name="Group 136">
+                    <a:extLst>
+                      <a:ext uri="{FF2B5EF4-FFF2-40B4-BE49-F238E27FC236}">
+                        <a16:creationId xmlns:a16="http://schemas.microsoft.com/office/drawing/2014/main" id="{35C96589-AC85-4D5C-889C-61C1FD6D26AF}"/>
+                      </a:ext>
+                    </a:extLst>
+                  </p:cNvPr>
+                  <p:cNvGrpSpPr/>
+                  <p:nvPr/>
+                </p:nvGrpSpPr>
+                <p:grpSpPr>
+                  <a:xfrm>
+                    <a:off x="380376" y="1556988"/>
+                    <a:ext cx="4415277" cy="3317875"/>
+                    <a:chOff x="4635061" y="1787525"/>
+                    <a:chExt cx="4415277" cy="3317875"/>
+                  </a:xfrm>
+                </p:grpSpPr>
+                <p:sp>
+                  <p:nvSpPr>
+                    <p:cNvPr id="142" name="Line 6 3">
+                      <a:extLst>
+                        <a:ext uri="{FF2B5EF4-FFF2-40B4-BE49-F238E27FC236}">
+                          <a16:creationId xmlns:a16="http://schemas.microsoft.com/office/drawing/2014/main" id="{599ECDD9-79BF-43B5-B54C-B108243472C4}"/>
+                        </a:ext>
+                      </a:extLst>
+                    </p:cNvPr>
+                    <p:cNvSpPr>
+                      <a:spLocks noChangeShapeType="1"/>
+                    </p:cNvSpPr>
+                    <p:nvPr/>
+                  </p:nvSpPr>
+                  <p:spPr bwMode="auto">
+                    <a:xfrm>
+                      <a:off x="4953000" y="2509838"/>
+                      <a:ext cx="0" cy="1681162"/>
+                    </a:xfrm>
+                    <a:prstGeom prst="line">
+                      <a:avLst/>
+                    </a:prstGeom>
+                    <a:noFill/>
+                    <a:ln w="28575">
+                      <a:solidFill>
+                        <a:schemeClr val="tx1"/>
+                      </a:solidFill>
+                      <a:round/>
+                      <a:headEnd type="triangle" w="lg" len="med"/>
+                      <a:tailEnd type="triangle" w="lg" len="med"/>
+                    </a:ln>
+                    <a:effectLst/>
+                  </p:spPr>
+                  <p:txBody>
+                    <a:bodyPr wrap="none" anchor="ctr"/>
+                    <a:lstStyle/>
+                    <a:p>
+                      <a:endParaRPr lang="en-US" dirty="0"/>
+                    </a:p>
+                  </p:txBody>
+                </p:sp>
+                <p:sp>
+                  <p:nvSpPr>
+                    <p:cNvPr id="143" name="Line 19 2">
+                      <a:extLst>
+                        <a:ext uri="{FF2B5EF4-FFF2-40B4-BE49-F238E27FC236}">
+                          <a16:creationId xmlns:a16="http://schemas.microsoft.com/office/drawing/2014/main" id="{04F167FC-8C6B-4D5D-A224-213FD06492B2}"/>
+                        </a:ext>
+                      </a:extLst>
+                    </p:cNvPr>
+                    <p:cNvSpPr>
+                      <a:spLocks noChangeShapeType="1"/>
+                    </p:cNvSpPr>
+                    <p:nvPr/>
+                  </p:nvSpPr>
+                  <p:spPr bwMode="auto">
+                    <a:xfrm>
+                      <a:off x="5532438" y="3998913"/>
+                      <a:ext cx="0" cy="455612"/>
+                    </a:xfrm>
+                    <a:prstGeom prst="line">
+                      <a:avLst/>
+                    </a:prstGeom>
+                    <a:noFill/>
+                    <a:ln w="38100">
+                      <a:solidFill>
+                        <a:schemeClr val="folHlink"/>
+                      </a:solidFill>
+                      <a:prstDash val="sysDot"/>
+                      <a:round/>
+                      <a:headEnd type="none" w="lg" len="med"/>
+                      <a:tailEnd type="none" w="lg" len="med"/>
+                    </a:ln>
+                    <a:effectLst/>
+                  </p:spPr>
+                  <p:txBody>
+                    <a:bodyPr anchor="ctr">
+                      <a:spAutoFit/>
+                    </a:bodyPr>
+                    <a:lstStyle/>
+                    <a:p>
+                      <a:endParaRPr lang="en-US"/>
+                    </a:p>
+                  </p:txBody>
+                </p:sp>
+                <p:sp>
+                  <p:nvSpPr>
+                    <p:cNvPr id="144" name="Rectangle 137 2" descr="Granite">
+                      <a:extLst>
+                        <a:ext uri="{FF2B5EF4-FFF2-40B4-BE49-F238E27FC236}">
+                          <a16:creationId xmlns:a16="http://schemas.microsoft.com/office/drawing/2014/main" id="{C10EE6DF-16CF-4E94-BDD8-83122418949D}"/>
+                        </a:ext>
+                      </a:extLst>
+                    </p:cNvPr>
+                    <p:cNvSpPr>
+                      <a:spLocks noChangeArrowheads="1"/>
+                    </p:cNvSpPr>
+                    <p:nvPr/>
+                  </p:nvSpPr>
+                  <p:spPr bwMode="auto">
+                    <a:xfrm>
+                      <a:off x="8261965" y="2253059"/>
+                      <a:ext cx="192713" cy="1515999"/>
+                    </a:xfrm>
+                    <a:prstGeom prst="rect">
+                      <a:avLst/>
+                    </a:prstGeom>
+                    <a:blipFill dpi="0" rotWithShape="1">
+                      <a:blip r:embed="rId10" cstate="print"/>
+                      <a:srcRect/>
+                      <a:tile tx="0" ty="0" sx="100000" sy="100000" flip="none" algn="tl"/>
+                    </a:blipFill>
+                    <a:ln w="12700">
+                      <a:solidFill>
+                        <a:schemeClr val="tx1"/>
+                      </a:solidFill>
+                      <a:miter lim="800000"/>
+                      <a:headEnd type="none" w="lg" len="med"/>
+                      <a:tailEnd type="none" w="lg" len="med"/>
+                    </a:ln>
+                    <a:effectLst/>
+                  </p:spPr>
+                  <p:txBody>
+                    <a:bodyPr anchor="ctr">
+                      <a:spAutoFit/>
+                    </a:bodyPr>
+                    <a:lstStyle/>
+                    <a:p>
+                      <a:endParaRPr lang="en-US"/>
+                    </a:p>
+                  </p:txBody>
+                </p:sp>
+                <p:sp>
+                  <p:nvSpPr>
+                    <p:cNvPr id="145" name="Rectangle 138 2" descr="Granite">
+                      <a:extLst>
+                        <a:ext uri="{FF2B5EF4-FFF2-40B4-BE49-F238E27FC236}">
+                          <a16:creationId xmlns:a16="http://schemas.microsoft.com/office/drawing/2014/main" id="{99FCFD39-A0DD-4B4E-B614-5945B2A06A34}"/>
+                        </a:ext>
+                      </a:extLst>
+                    </p:cNvPr>
+                    <p:cNvSpPr>
+                      <a:spLocks noChangeArrowheads="1"/>
+                    </p:cNvSpPr>
+                    <p:nvPr/>
+                  </p:nvSpPr>
+                  <p:spPr bwMode="auto">
+                    <a:xfrm>
+                      <a:off x="6919540" y="2253059"/>
+                      <a:ext cx="192713" cy="1515999"/>
+                    </a:xfrm>
+                    <a:prstGeom prst="rect">
+                      <a:avLst/>
+                    </a:prstGeom>
+                    <a:blipFill dpi="0" rotWithShape="1">
+                      <a:blip r:embed="rId10" cstate="print"/>
+                      <a:srcRect/>
+                      <a:tile tx="0" ty="0" sx="100000" sy="100000" flip="none" algn="tl"/>
+                    </a:blipFill>
+                    <a:ln w="12700">
+                      <a:solidFill>
+                        <a:schemeClr val="tx1"/>
+                      </a:solidFill>
+                      <a:miter lim="800000"/>
+                      <a:headEnd type="none" w="lg" len="med"/>
+                      <a:tailEnd type="none" w="lg" len="med"/>
+                    </a:ln>
+                    <a:effectLst/>
+                  </p:spPr>
+                  <p:txBody>
+                    <a:bodyPr anchor="ctr">
+                      <a:spAutoFit/>
+                    </a:bodyPr>
+                    <a:lstStyle/>
+                    <a:p>
+                      <a:endParaRPr lang="en-US" dirty="0"/>
+                    </a:p>
+                  </p:txBody>
+                </p:sp>
+                <p:sp>
+                  <p:nvSpPr>
+                    <p:cNvPr id="146" name="Freeform 139 2" descr="Granite">
+                      <a:extLst>
+                        <a:ext uri="{FF2B5EF4-FFF2-40B4-BE49-F238E27FC236}">
+                          <a16:creationId xmlns:a16="http://schemas.microsoft.com/office/drawing/2014/main" id="{0551B2C5-BD3E-4D28-9754-B5E8CF64C874}"/>
+                        </a:ext>
+                      </a:extLst>
+                    </p:cNvPr>
+                    <p:cNvSpPr>
+                      <a:spLocks/>
+                    </p:cNvSpPr>
+                    <p:nvPr/>
+                  </p:nvSpPr>
+                  <p:spPr bwMode="auto">
+                    <a:xfrm>
+                      <a:off x="6031525" y="3688001"/>
+                      <a:ext cx="2752737" cy="346139"/>
+                    </a:xfrm>
+                    <a:custGeom>
+                      <a:avLst/>
+                      <a:gdLst/>
+                      <a:ahLst/>
+                      <a:cxnLst>
+                        <a:cxn ang="0">
+                          <a:pos x="2514" y="314"/>
+                        </a:cxn>
+                        <a:cxn ang="0">
+                          <a:pos x="2514" y="72"/>
+                        </a:cxn>
+                        <a:cxn ang="0">
+                          <a:pos x="121" y="74"/>
+                        </a:cxn>
+                        <a:cxn ang="0">
+                          <a:pos x="121" y="0"/>
+                        </a:cxn>
+                        <a:cxn ang="0">
+                          <a:pos x="0" y="0"/>
+                        </a:cxn>
+                        <a:cxn ang="0">
+                          <a:pos x="0" y="316"/>
+                        </a:cxn>
+                        <a:cxn ang="0">
+                          <a:pos x="2514" y="314"/>
+                        </a:cxn>
+                      </a:cxnLst>
+                      <a:rect l="0" t="0" r="r" b="b"/>
+                      <a:pathLst>
+                        <a:path w="2514" h="316">
+                          <a:moveTo>
+                            <a:pt x="2514" y="314"/>
+                          </a:moveTo>
+                          <a:lnTo>
+                            <a:pt x="2514" y="72"/>
+                          </a:lnTo>
+                          <a:lnTo>
+                            <a:pt x="121" y="74"/>
+                          </a:lnTo>
+                          <a:lnTo>
+                            <a:pt x="121" y="0"/>
+                          </a:lnTo>
+                          <a:lnTo>
+                            <a:pt x="0" y="0"/>
+                          </a:lnTo>
+                          <a:lnTo>
+                            <a:pt x="0" y="316"/>
+                          </a:lnTo>
+                          <a:lnTo>
+                            <a:pt x="2514" y="314"/>
+                          </a:lnTo>
+                        </a:path>
+                      </a:pathLst>
+                    </a:custGeom>
+                    <a:blipFill dpi="0" rotWithShape="1">
+                      <a:blip r:embed="rId10" cstate="print"/>
+                      <a:srcRect/>
+                      <a:tile tx="0" ty="0" sx="100000" sy="100000" flip="none" algn="tl"/>
+                    </a:blipFill>
+                    <a:ln w="12700" cap="flat" cmpd="sng">
+                      <a:solidFill>
+                        <a:schemeClr val="tx1"/>
+                      </a:solidFill>
+                      <a:prstDash val="solid"/>
+                      <a:round/>
+                      <a:headEnd type="none" w="lg" len="med"/>
+                      <a:tailEnd type="none" w="lg" len="med"/>
+                    </a:ln>
+                    <a:effectLst/>
+                  </p:spPr>
+                  <p:txBody>
+                    <a:bodyPr wrap="none" anchor="ctr">
+                      <a:spAutoFit/>
+                    </a:bodyPr>
+                    <a:lstStyle/>
+                    <a:p>
+                      <a:endParaRPr lang="en-US" dirty="0"/>
+                    </a:p>
+                  </p:txBody>
+                </p:sp>
+                <p:sp>
+                  <p:nvSpPr>
+                    <p:cNvPr id="147" name="Freeform 141 2">
+                      <a:extLst>
+                        <a:ext uri="{FF2B5EF4-FFF2-40B4-BE49-F238E27FC236}">
+                          <a16:creationId xmlns:a16="http://schemas.microsoft.com/office/drawing/2014/main" id="{419A3D4C-4180-4D02-A0E9-7CA2D6E63ADC}"/>
+                        </a:ext>
+                      </a:extLst>
+                    </p:cNvPr>
+                    <p:cNvSpPr>
+                      <a:spLocks/>
+                    </p:cNvSpPr>
+                    <p:nvPr/>
+                  </p:nvSpPr>
+                  <p:spPr bwMode="auto">
+                    <a:xfrm>
+                      <a:off x="5642813" y="3645281"/>
+                      <a:ext cx="1664344" cy="538925"/>
+                    </a:xfrm>
+                    <a:custGeom>
+                      <a:avLst/>
+                      <a:gdLst/>
+                      <a:ahLst/>
+                      <a:cxnLst>
+                        <a:cxn ang="0">
+                          <a:pos x="1520" y="0"/>
+                        </a:cxn>
+                        <a:cxn ang="0">
+                          <a:pos x="1520" y="492"/>
+                        </a:cxn>
+                        <a:cxn ang="0">
+                          <a:pos x="0" y="492"/>
+                        </a:cxn>
+                      </a:cxnLst>
+                      <a:rect l="0" t="0" r="r" b="b"/>
+                      <a:pathLst>
+                        <a:path w="1520" h="492">
+                          <a:moveTo>
+                            <a:pt x="1520" y="0"/>
+                          </a:moveTo>
+                          <a:lnTo>
+                            <a:pt x="1520" y="492"/>
+                          </a:lnTo>
+                          <a:lnTo>
+                            <a:pt x="0" y="492"/>
+                          </a:lnTo>
+                        </a:path>
+                      </a:pathLst>
+                    </a:custGeom>
+                    <a:noFill/>
+                    <a:ln w="12700" cap="flat" cmpd="sng">
+                      <a:solidFill>
+                        <a:schemeClr val="tx1"/>
+                      </a:solidFill>
+                      <a:prstDash val="solid"/>
+                      <a:round/>
+                      <a:headEnd type="none" w="lg" len="med"/>
+                      <a:tailEnd type="none" w="lg" len="med"/>
+                    </a:ln>
+                    <a:effectLst/>
+                  </p:spPr>
+                  <p:txBody>
+                    <a:bodyPr wrap="none" anchor="ctr">
+                      <a:spAutoFit/>
+                    </a:bodyPr>
+                    <a:lstStyle/>
+                    <a:p>
+                      <a:endParaRPr lang="en-US"/>
+                    </a:p>
+                  </p:txBody>
+                </p:sp>
+                <p:sp>
+                  <p:nvSpPr>
+                    <p:cNvPr id="148" name="Freeform 142 2">
+                      <a:extLst>
+                        <a:ext uri="{FF2B5EF4-FFF2-40B4-BE49-F238E27FC236}">
+                          <a16:creationId xmlns:a16="http://schemas.microsoft.com/office/drawing/2014/main" id="{4338DF6C-0DF4-4937-A733-47592DCB2CAA}"/>
+                        </a:ext>
+                      </a:extLst>
+                    </p:cNvPr>
+                    <p:cNvSpPr>
+                      <a:spLocks/>
+                    </p:cNvSpPr>
+                    <p:nvPr/>
+                  </p:nvSpPr>
+                  <p:spPr bwMode="auto">
+                    <a:xfrm>
+                      <a:off x="5638434" y="3636518"/>
+                      <a:ext cx="1716902" cy="600266"/>
+                    </a:xfrm>
+                    <a:custGeom>
+                      <a:avLst/>
+                      <a:gdLst/>
+                      <a:ahLst/>
+                      <a:cxnLst>
+                        <a:cxn ang="0">
+                          <a:pos x="1520" y="0"/>
+                        </a:cxn>
+                        <a:cxn ang="0">
+                          <a:pos x="1520" y="492"/>
+                        </a:cxn>
+                        <a:cxn ang="0">
+                          <a:pos x="0" y="492"/>
+                        </a:cxn>
+                      </a:cxnLst>
+                      <a:rect l="0" t="0" r="r" b="b"/>
+                      <a:pathLst>
+                        <a:path w="1520" h="492">
+                          <a:moveTo>
+                            <a:pt x="1520" y="0"/>
+                          </a:moveTo>
+                          <a:lnTo>
+                            <a:pt x="1520" y="492"/>
+                          </a:lnTo>
+                          <a:lnTo>
+                            <a:pt x="0" y="492"/>
+                          </a:lnTo>
+                        </a:path>
+                      </a:pathLst>
+                    </a:custGeom>
+                    <a:noFill/>
+                    <a:ln w="12700" cap="flat" cmpd="sng">
+                      <a:solidFill>
+                        <a:schemeClr val="tx1"/>
+                      </a:solidFill>
+                      <a:prstDash val="solid"/>
+                      <a:round/>
+                      <a:headEnd type="none" w="lg" len="med"/>
+                      <a:tailEnd type="none" w="lg" len="med"/>
+                    </a:ln>
+                    <a:effectLst/>
+                  </p:spPr>
+                  <p:txBody>
+                    <a:bodyPr anchor="ctr">
+                      <a:spAutoFit/>
+                    </a:bodyPr>
+                    <a:lstStyle/>
+                    <a:p>
+                      <a:endParaRPr lang="en-US"/>
+                    </a:p>
+                  </p:txBody>
+                </p:sp>
+                <p:sp>
+                  <p:nvSpPr>
+                    <p:cNvPr id="149" name="Rectangle 143 2" descr="Granite">
+                      <a:extLst>
+                        <a:ext uri="{FF2B5EF4-FFF2-40B4-BE49-F238E27FC236}">
+                          <a16:creationId xmlns:a16="http://schemas.microsoft.com/office/drawing/2014/main" id="{FC521B69-1B7D-49FA-B8EC-9AE7572BD58A}"/>
+                        </a:ext>
+                      </a:extLst>
+                    </p:cNvPr>
+                    <p:cNvSpPr>
+                      <a:spLocks noChangeArrowheads="1"/>
+                    </p:cNvSpPr>
+                    <p:nvPr/>
+                  </p:nvSpPr>
+                  <p:spPr bwMode="auto">
+                    <a:xfrm>
+                      <a:off x="8305763" y="4036330"/>
+                      <a:ext cx="280311" cy="797433"/>
+                    </a:xfrm>
+                    <a:prstGeom prst="rect">
+                      <a:avLst/>
+                    </a:prstGeom>
+                    <a:blipFill dpi="0" rotWithShape="1">
+                      <a:blip r:embed="rId10" cstate="print"/>
+                      <a:srcRect/>
+                      <a:tile tx="0" ty="0" sx="100000" sy="100000" flip="none" algn="tl"/>
+                    </a:blipFill>
+                    <a:ln w="12700">
+                      <a:solidFill>
+                        <a:schemeClr val="tx1"/>
+                      </a:solidFill>
+                      <a:miter lim="800000"/>
+                      <a:headEnd type="none" w="lg" len="med"/>
+                      <a:tailEnd type="none" w="lg" len="med"/>
+                    </a:ln>
+                    <a:effectLst/>
+                  </p:spPr>
+                  <p:txBody>
+                    <a:bodyPr anchor="ctr">
+                      <a:spAutoFit/>
+                    </a:bodyPr>
+                    <a:lstStyle/>
+                    <a:p>
+                      <a:endParaRPr lang="en-US"/>
+                    </a:p>
+                  </p:txBody>
+                </p:sp>
+                <p:grpSp>
+                  <p:nvGrpSpPr>
+                    <p:cNvPr id="150" name="Group 152">
+                      <a:extLst>
+                        <a:ext uri="{FF2B5EF4-FFF2-40B4-BE49-F238E27FC236}">
+                          <a16:creationId xmlns:a16="http://schemas.microsoft.com/office/drawing/2014/main" id="{566F31DD-E054-41B8-9914-52BC77FE2485}"/>
+                        </a:ext>
+                      </a:extLst>
+                    </p:cNvPr>
+                    <p:cNvGrpSpPr>
+                      <a:grpSpLocks/>
+                    </p:cNvGrpSpPr>
+                    <p:nvPr/>
+                  </p:nvGrpSpPr>
+                  <p:grpSpPr bwMode="auto">
+                    <a:xfrm flipH="1">
+                      <a:off x="5507038" y="4179824"/>
+                      <a:ext cx="135775" cy="135827"/>
+                      <a:chOff x="4380" y="3764"/>
+                      <a:chExt cx="388" cy="388"/>
+                    </a:xfrm>
+                  </p:grpSpPr>
+                  <p:sp>
+                    <p:nvSpPr>
+                      <p:cNvPr id="285" name="Arc 153 2">
+                        <a:extLst>
+                          <a:ext uri="{FF2B5EF4-FFF2-40B4-BE49-F238E27FC236}">
+                            <a16:creationId xmlns:a16="http://schemas.microsoft.com/office/drawing/2014/main" id="{1CD0E70E-61C0-4E9A-AF44-E712D60AE6A7}"/>
+                          </a:ext>
+                        </a:extLst>
+                      </p:cNvPr>
+                      <p:cNvSpPr>
+                        <a:spLocks/>
+                      </p:cNvSpPr>
+                      <p:nvPr/>
+                    </p:nvSpPr>
+                    <p:spPr bwMode="auto">
+                      <a:xfrm>
+                        <a:off x="4380" y="3764"/>
+                        <a:ext cx="388" cy="388"/>
+                      </a:xfrm>
+                      <a:custGeom>
+                        <a:avLst/>
+                        <a:gdLst>
+                          <a:gd name="G0" fmla="+- 0 0 0"/>
+                          <a:gd name="G1" fmla="+- 21600 0 0"/>
+                          <a:gd name="G2" fmla="+- 21600 0 0"/>
+                          <a:gd name="T0" fmla="*/ 0 w 21600"/>
+                          <a:gd name="T1" fmla="*/ 0 h 21600"/>
+                          <a:gd name="T2" fmla="*/ 21600 w 21600"/>
+                          <a:gd name="T3" fmla="*/ 21600 h 21600"/>
+                          <a:gd name="T4" fmla="*/ 0 w 21600"/>
+                          <a:gd name="T5" fmla="*/ 21600 h 21600"/>
+                        </a:gdLst>
+                        <a:ahLst/>
+                        <a:cxnLst>
+                          <a:cxn ang="0">
+                            <a:pos x="T0" y="T1"/>
+                          </a:cxn>
+                          <a:cxn ang="0">
+                            <a:pos x="T2" y="T3"/>
+                          </a:cxn>
+                          <a:cxn ang="0">
+                            <a:pos x="T4" y="T5"/>
+                          </a:cxn>
+                        </a:cxnLst>
+                        <a:rect l="0" t="0" r="r" b="b"/>
+                        <a:pathLst>
+                          <a:path w="21600" h="21600" fill="none" extrusionOk="0">
+                            <a:moveTo>
+                              <a:pt x="-1" y="0"/>
+                            </a:moveTo>
+                            <a:cubicBezTo>
+                              <a:pt x="11929" y="0"/>
+                              <a:pt x="21600" y="9670"/>
+                              <a:pt x="21600" y="21600"/>
+                            </a:cubicBezTo>
+                          </a:path>
+                          <a:path w="21600" h="21600" stroke="0" extrusionOk="0">
+                            <a:moveTo>
+                              <a:pt x="-1" y="0"/>
+                            </a:moveTo>
+                            <a:cubicBezTo>
+                              <a:pt x="11929" y="0"/>
+                              <a:pt x="21600" y="9670"/>
+                              <a:pt x="21600" y="21600"/>
+                            </a:cubicBezTo>
+                            <a:lnTo>
+                              <a:pt x="0" y="21600"/>
+                            </a:lnTo>
+                            <a:close/>
+                          </a:path>
+                        </a:pathLst>
+                      </a:custGeom>
+                      <a:noFill/>
+                      <a:ln w="12700">
+                        <a:solidFill>
+                          <a:schemeClr val="tx1"/>
+                        </a:solidFill>
+                        <a:round/>
+                        <a:headEnd type="none" w="lg" len="med"/>
+                        <a:tailEnd type="none" w="lg" len="med"/>
+                      </a:ln>
+                      <a:effectLst/>
+                    </p:spPr>
+                    <p:txBody>
+                      <a:bodyPr anchor="ctr">
+                        <a:spAutoFit/>
+                      </a:bodyPr>
+                      <a:lstStyle/>
+                      <a:p>
+                        <a:endParaRPr lang="en-US"/>
+                      </a:p>
+                    </p:txBody>
+                  </p:sp>
+                  <p:sp>
+                    <p:nvSpPr>
+                      <p:cNvPr id="286" name="Arc 154 2">
+                        <a:extLst>
+                          <a:ext uri="{FF2B5EF4-FFF2-40B4-BE49-F238E27FC236}">
+                            <a16:creationId xmlns:a16="http://schemas.microsoft.com/office/drawing/2014/main" id="{2588E1CE-C6DC-49B2-9D7E-0EC9EE79B8DF}"/>
+                          </a:ext>
+                        </a:extLst>
+                      </p:cNvPr>
+                      <p:cNvSpPr>
+                        <a:spLocks/>
+                      </p:cNvSpPr>
+                      <p:nvPr/>
+                    </p:nvSpPr>
+                    <p:spPr bwMode="auto">
+                      <a:xfrm>
+                        <a:off x="4380" y="3924"/>
+                        <a:ext cx="228" cy="228"/>
+                      </a:xfrm>
+                      <a:custGeom>
+                        <a:avLst/>
+                        <a:gdLst>
+                          <a:gd name="G0" fmla="+- 0 0 0"/>
+                          <a:gd name="G1" fmla="+- 21600 0 0"/>
+                          <a:gd name="G2" fmla="+- 21600 0 0"/>
+                          <a:gd name="T0" fmla="*/ 0 w 21600"/>
+                          <a:gd name="T1" fmla="*/ 0 h 21600"/>
+                          <a:gd name="T2" fmla="*/ 21600 w 21600"/>
+                          <a:gd name="T3" fmla="*/ 21600 h 21600"/>
+                          <a:gd name="T4" fmla="*/ 0 w 21600"/>
+                          <a:gd name="T5" fmla="*/ 21600 h 21600"/>
+                        </a:gdLst>
+                        <a:ahLst/>
+                        <a:cxnLst>
+                          <a:cxn ang="0">
+                            <a:pos x="T0" y="T1"/>
+                          </a:cxn>
+                          <a:cxn ang="0">
+                            <a:pos x="T2" y="T3"/>
+                          </a:cxn>
+                          <a:cxn ang="0">
+                            <a:pos x="T4" y="T5"/>
+                          </a:cxn>
+                        </a:cxnLst>
+                        <a:rect l="0" t="0" r="r" b="b"/>
+                        <a:pathLst>
+                          <a:path w="21600" h="21600" fill="none" extrusionOk="0">
+                            <a:moveTo>
+                              <a:pt x="-1" y="0"/>
+                            </a:moveTo>
+                            <a:cubicBezTo>
+                              <a:pt x="11929" y="0"/>
+                              <a:pt x="21600" y="9670"/>
+                              <a:pt x="21600" y="21600"/>
+                            </a:cubicBezTo>
+                          </a:path>
+                          <a:path w="21600" h="21600" stroke="0" extrusionOk="0">
+                            <a:moveTo>
+                              <a:pt x="-1" y="0"/>
+                            </a:moveTo>
+                            <a:cubicBezTo>
+                              <a:pt x="11929" y="0"/>
+                              <a:pt x="21600" y="9670"/>
+                              <a:pt x="21600" y="21600"/>
+                            </a:cubicBezTo>
+                            <a:lnTo>
+                              <a:pt x="0" y="21600"/>
+                            </a:lnTo>
+                            <a:close/>
+                          </a:path>
+                        </a:pathLst>
+                      </a:custGeom>
+                      <a:noFill/>
+                      <a:ln w="12700">
+                        <a:solidFill>
+                          <a:schemeClr val="tx1"/>
+                        </a:solidFill>
+                        <a:round/>
+                        <a:headEnd type="none" w="lg" len="med"/>
+                        <a:tailEnd type="none" w="lg" len="med"/>
+                      </a:ln>
+                      <a:effectLst/>
+                    </p:spPr>
+                    <p:txBody>
+                      <a:bodyPr anchor="ctr">
+                        <a:spAutoFit/>
+                      </a:bodyPr>
+                      <a:lstStyle/>
+                      <a:p>
+                        <a:endParaRPr lang="en-US"/>
+                      </a:p>
+                    </p:txBody>
+                  </p:sp>
+                </p:grpSp>
+                <p:sp>
+                  <p:nvSpPr>
+                    <p:cNvPr id="151" name="Oval 155 2">
+                      <a:extLst>
+                        <a:ext uri="{FF2B5EF4-FFF2-40B4-BE49-F238E27FC236}">
+                          <a16:creationId xmlns:a16="http://schemas.microsoft.com/office/drawing/2014/main" id="{E3287FE1-ABA5-480F-8201-81BD08CC8D82}"/>
+                        </a:ext>
+                      </a:extLst>
+                    </p:cNvPr>
+                    <p:cNvSpPr>
+                      <a:spLocks noChangeArrowheads="1"/>
+                    </p:cNvSpPr>
+                    <p:nvPr/>
+                  </p:nvSpPr>
+                  <p:spPr bwMode="auto">
+                    <a:xfrm>
+                      <a:off x="5517988" y="4355084"/>
+                      <a:ext cx="31754" cy="31766"/>
+                    </a:xfrm>
+                    <a:prstGeom prst="ellipse">
+                      <a:avLst/>
+                    </a:prstGeom>
+                    <a:solidFill>
+                      <a:schemeClr val="tx1"/>
+                    </a:solidFill>
+                    <a:ln w="12700">
+                      <a:solidFill>
+                        <a:schemeClr val="hlink"/>
+                      </a:solidFill>
+                      <a:round/>
+                      <a:headEnd type="none" w="lg" len="med"/>
+                      <a:tailEnd type="none" w="lg" len="med"/>
+                    </a:ln>
+                    <a:effectLst/>
+                  </p:spPr>
+                  <p:txBody>
+                    <a:bodyPr anchor="ctr">
+                      <a:spAutoFit/>
+                    </a:bodyPr>
+                    <a:lstStyle/>
+                    <a:p>
+                      <a:endParaRPr lang="en-US"/>
+                    </a:p>
+                  </p:txBody>
+                </p:sp>
+                <p:sp>
+                  <p:nvSpPr>
+                    <p:cNvPr id="152" name="Oval 156 2">
+                      <a:extLst>
+                        <a:ext uri="{FF2B5EF4-FFF2-40B4-BE49-F238E27FC236}">
+                          <a16:creationId xmlns:a16="http://schemas.microsoft.com/office/drawing/2014/main" id="{DFC8DDE3-62BC-4B52-AEC6-CA071D8F2FF7}"/>
+                        </a:ext>
+                      </a:extLst>
+                    </p:cNvPr>
+                    <p:cNvSpPr>
+                      <a:spLocks noChangeArrowheads="1"/>
+                    </p:cNvSpPr>
+                    <p:nvPr/>
+                  </p:nvSpPr>
+                  <p:spPr bwMode="auto">
+                    <a:xfrm>
+                      <a:off x="5521273" y="4483243"/>
+                      <a:ext cx="31754" cy="31766"/>
+                    </a:xfrm>
+                    <a:prstGeom prst="ellipse">
+                      <a:avLst/>
+                    </a:prstGeom>
+                    <a:solidFill>
+                      <a:schemeClr val="tx1"/>
+                    </a:solidFill>
+                    <a:ln w="12700">
+                      <a:solidFill>
+                        <a:schemeClr val="hlink"/>
+                      </a:solidFill>
+                      <a:round/>
+                      <a:headEnd type="none" w="lg" len="med"/>
+                      <a:tailEnd type="none" w="lg" len="med"/>
+                    </a:ln>
+                    <a:effectLst/>
+                  </p:spPr>
+                  <p:txBody>
+                    <a:bodyPr anchor="ctr">
+                      <a:spAutoFit/>
+                    </a:bodyPr>
+                    <a:lstStyle/>
+                    <a:p>
+                      <a:endParaRPr lang="en-US"/>
+                    </a:p>
+                  </p:txBody>
+                </p:sp>
+                <p:sp>
+                  <p:nvSpPr>
+                    <p:cNvPr id="153" name="Oval 157 2">
+                      <a:extLst>
+                        <a:ext uri="{FF2B5EF4-FFF2-40B4-BE49-F238E27FC236}">
+                          <a16:creationId xmlns:a16="http://schemas.microsoft.com/office/drawing/2014/main" id="{1BE2FC5A-5EA6-4F86-AF64-2BC8EEA2DDAA}"/>
+                        </a:ext>
+                      </a:extLst>
+                    </p:cNvPr>
+                    <p:cNvSpPr>
+                      <a:spLocks noChangeArrowheads="1"/>
+                    </p:cNvSpPr>
+                    <p:nvPr/>
+                  </p:nvSpPr>
+                  <p:spPr bwMode="auto">
+                    <a:xfrm>
+                      <a:off x="5524557" y="4673839"/>
+                      <a:ext cx="31754" cy="31766"/>
+                    </a:xfrm>
+                    <a:prstGeom prst="ellipse">
+                      <a:avLst/>
+                    </a:prstGeom>
+                    <a:solidFill>
+                      <a:schemeClr val="tx1"/>
+                    </a:solidFill>
+                    <a:ln w="12700">
+                      <a:solidFill>
+                        <a:schemeClr val="hlink"/>
+                      </a:solidFill>
+                      <a:round/>
+                      <a:headEnd type="none" w="lg" len="med"/>
+                      <a:tailEnd type="none" w="lg" len="med"/>
+                    </a:ln>
+                    <a:effectLst/>
+                  </p:spPr>
+                  <p:txBody>
+                    <a:bodyPr anchor="ctr">
+                      <a:spAutoFit/>
+                    </a:bodyPr>
+                    <a:lstStyle/>
+                    <a:p>
+                      <a:endParaRPr lang="en-US"/>
+                    </a:p>
+                  </p:txBody>
+                </p:sp>
+                <p:sp>
+                  <p:nvSpPr>
+                    <p:cNvPr id="154" name="Oval 158 2">
+                      <a:extLst>
+                        <a:ext uri="{FF2B5EF4-FFF2-40B4-BE49-F238E27FC236}">
+                          <a16:creationId xmlns:a16="http://schemas.microsoft.com/office/drawing/2014/main" id="{3BE64999-CD51-4654-9C2A-B8DCBC09EFF7}"/>
+                        </a:ext>
+                      </a:extLst>
+                    </p:cNvPr>
+                    <p:cNvSpPr>
+                      <a:spLocks noChangeArrowheads="1"/>
+                    </p:cNvSpPr>
+                    <p:nvPr/>
+                  </p:nvSpPr>
+                  <p:spPr bwMode="auto">
+                    <a:xfrm>
+                      <a:off x="5527842" y="4917012"/>
+                      <a:ext cx="31754" cy="31766"/>
+                    </a:xfrm>
+                    <a:prstGeom prst="ellipse">
+                      <a:avLst/>
+                    </a:prstGeom>
+                    <a:solidFill>
+                      <a:schemeClr val="tx1"/>
+                    </a:solidFill>
+                    <a:ln w="12700">
+                      <a:solidFill>
+                        <a:schemeClr val="hlink"/>
+                      </a:solidFill>
+                      <a:round/>
+                      <a:headEnd type="none" w="lg" len="med"/>
+                      <a:tailEnd type="none" w="lg" len="med"/>
+                    </a:ln>
+                    <a:effectLst/>
+                  </p:spPr>
+                  <p:txBody>
+                    <a:bodyPr anchor="ctr">
+                      <a:spAutoFit/>
+                    </a:bodyPr>
+                    <a:lstStyle/>
+                    <a:p>
+                      <a:endParaRPr lang="en-US"/>
+                    </a:p>
+                  </p:txBody>
+                </p:sp>
+                <p:grpSp>
+                  <p:nvGrpSpPr>
+                    <p:cNvPr id="155" name="Group 159">
+                      <a:extLst>
+                        <a:ext uri="{FF2B5EF4-FFF2-40B4-BE49-F238E27FC236}">
+                          <a16:creationId xmlns:a16="http://schemas.microsoft.com/office/drawing/2014/main" id="{F0FCCA76-C11F-48EE-BF80-E54A1646C98A}"/>
+                        </a:ext>
+                      </a:extLst>
+                    </p:cNvPr>
+                    <p:cNvGrpSpPr>
+                      <a:grpSpLocks/>
+                    </p:cNvGrpSpPr>
+                    <p:nvPr/>
+                  </p:nvGrpSpPr>
+                  <p:grpSpPr bwMode="auto">
+                    <a:xfrm>
+                      <a:off x="5655953" y="4103148"/>
+                      <a:ext cx="153295" cy="133636"/>
+                      <a:chOff x="1668" y="3538"/>
+                      <a:chExt cx="140" cy="122"/>
+                    </a:xfrm>
+                  </p:grpSpPr>
+                  <p:sp>
+                    <p:nvSpPr>
+                      <p:cNvPr id="281" name="AutoShape 160 2">
+                        <a:extLst>
+                          <a:ext uri="{FF2B5EF4-FFF2-40B4-BE49-F238E27FC236}">
+                            <a16:creationId xmlns:a16="http://schemas.microsoft.com/office/drawing/2014/main" id="{C6CD71AE-0974-4178-9F64-63A09F5D2260}"/>
+                          </a:ext>
+                        </a:extLst>
+                      </p:cNvPr>
+                      <p:cNvSpPr>
+                        <a:spLocks noChangeArrowheads="1"/>
+                      </p:cNvSpPr>
+                      <p:nvPr/>
+                    </p:nvSpPr>
+                    <p:spPr bwMode="auto">
+                      <a:xfrm>
+                        <a:off x="1668" y="3538"/>
+                        <a:ext cx="140" cy="32"/>
+                      </a:xfrm>
+                      <a:prstGeom prst="roundRect">
+                        <a:avLst>
+                          <a:gd name="adj" fmla="val 16667"/>
+                        </a:avLst>
+                      </a:prstGeom>
+                      <a:noFill/>
+                      <a:ln w="12700">
+                        <a:solidFill>
+                          <a:schemeClr val="tx1"/>
+                        </a:solidFill>
+                        <a:round/>
+                        <a:headEnd type="none" w="lg" len="med"/>
+                        <a:tailEnd type="none" w="lg" len="med"/>
+                      </a:ln>
+                      <a:effectLst/>
+                    </p:spPr>
+                    <p:txBody>
+                      <a:bodyPr anchor="ctr">
+                        <a:spAutoFit/>
+                      </a:bodyPr>
+                      <a:lstStyle/>
+                      <a:p>
+                        <a:endParaRPr lang="en-US"/>
+                      </a:p>
+                    </p:txBody>
+                  </p:sp>
+                  <p:sp>
+                    <p:nvSpPr>
+                      <p:cNvPr id="282" name="Line 161 2">
+                        <a:extLst>
+                          <a:ext uri="{FF2B5EF4-FFF2-40B4-BE49-F238E27FC236}">
+                            <a16:creationId xmlns:a16="http://schemas.microsoft.com/office/drawing/2014/main" id="{E9BD4818-F6E4-4205-BC05-14F10BADAB9E}"/>
+                          </a:ext>
+                        </a:extLst>
+                      </p:cNvPr>
+                      <p:cNvSpPr>
+                        <a:spLocks noChangeShapeType="1"/>
+                      </p:cNvSpPr>
+                      <p:nvPr/>
+                    </p:nvSpPr>
+                    <p:spPr bwMode="auto">
+                      <a:xfrm>
+                        <a:off x="1699" y="3612"/>
+                        <a:ext cx="78" cy="45"/>
+                      </a:xfrm>
+                      <a:prstGeom prst="line">
+                        <a:avLst/>
+                      </a:prstGeom>
+                      <a:noFill/>
+                      <a:ln w="12700">
+                        <a:solidFill>
+                          <a:schemeClr val="tx1"/>
+                        </a:solidFill>
+                        <a:round/>
+                        <a:headEnd type="none" w="lg" len="med"/>
+                        <a:tailEnd type="none" w="lg" len="med"/>
+                      </a:ln>
+                      <a:effectLst/>
+                    </p:spPr>
+                    <p:txBody>
+                      <a:bodyPr wrap="none" anchor="ctr">
+                        <a:spAutoFit/>
+                      </a:bodyPr>
+                      <a:lstStyle/>
+                      <a:p>
+                        <a:endParaRPr lang="en-US"/>
+                      </a:p>
+                    </p:txBody>
+                  </p:sp>
+                  <p:sp>
+                    <p:nvSpPr>
+                      <p:cNvPr id="283" name="Line 162 2">
+                        <a:extLst>
+                          <a:ext uri="{FF2B5EF4-FFF2-40B4-BE49-F238E27FC236}">
+                            <a16:creationId xmlns:a16="http://schemas.microsoft.com/office/drawing/2014/main" id="{BD5A2348-208F-45A9-BD59-E16F56D1F38A}"/>
+                          </a:ext>
+                        </a:extLst>
+                      </p:cNvPr>
+                      <p:cNvSpPr>
+                        <a:spLocks noChangeShapeType="1"/>
+                      </p:cNvSpPr>
+                      <p:nvPr/>
+                    </p:nvSpPr>
+                    <p:spPr bwMode="auto">
+                      <a:xfrm flipH="1">
+                        <a:off x="1699" y="3612"/>
+                        <a:ext cx="78" cy="45"/>
+                      </a:xfrm>
+                      <a:prstGeom prst="line">
+                        <a:avLst/>
+                      </a:prstGeom>
+                      <a:noFill/>
+                      <a:ln w="12700">
+                        <a:solidFill>
+                          <a:schemeClr val="tx1"/>
+                        </a:solidFill>
+                        <a:round/>
+                        <a:headEnd type="none" w="lg" len="med"/>
+                        <a:tailEnd type="none" w="lg" len="med"/>
+                      </a:ln>
+                      <a:effectLst/>
+                    </p:spPr>
+                    <p:txBody>
+                      <a:bodyPr wrap="none" anchor="ctr">
+                        <a:spAutoFit/>
+                      </a:bodyPr>
+                      <a:lstStyle/>
+                      <a:p>
+                        <a:endParaRPr lang="en-US"/>
+                      </a:p>
+                    </p:txBody>
+                  </p:sp>
+                  <p:sp>
+                    <p:nvSpPr>
+                      <p:cNvPr id="284" name="Line 163 2">
+                        <a:extLst>
+                          <a:ext uri="{FF2B5EF4-FFF2-40B4-BE49-F238E27FC236}">
+                            <a16:creationId xmlns:a16="http://schemas.microsoft.com/office/drawing/2014/main" id="{A69E7DC1-A426-4138-A2B8-A3D8A8DB2F6F}"/>
+                          </a:ext>
+                        </a:extLst>
+                      </p:cNvPr>
+                      <p:cNvSpPr>
+                        <a:spLocks noChangeShapeType="1"/>
+                      </p:cNvSpPr>
+                      <p:nvPr/>
+                    </p:nvSpPr>
+                    <p:spPr bwMode="auto">
+                      <a:xfrm flipH="1" flipV="1">
+                        <a:off x="1737" y="3567"/>
+                        <a:ext cx="3" cy="93"/>
+                      </a:xfrm>
+                      <a:prstGeom prst="line">
+                        <a:avLst/>
+                      </a:prstGeom>
+                      <a:noFill/>
+                      <a:ln w="28575">
+                        <a:solidFill>
+                          <a:schemeClr val="tx1"/>
+                        </a:solidFill>
+                        <a:round/>
+                        <a:headEnd type="none" w="lg" len="med"/>
+                        <a:tailEnd type="none" w="lg" len="med"/>
+                      </a:ln>
+                      <a:effectLst/>
+                    </p:spPr>
+                    <p:txBody>
+                      <a:bodyPr wrap="none" anchor="ctr">
+                        <a:spAutoFit/>
+                      </a:bodyPr>
+                      <a:lstStyle/>
+                      <a:p>
+                        <a:endParaRPr lang="en-US"/>
+                      </a:p>
+                    </p:txBody>
+                  </p:sp>
+                </p:grpSp>
+                <p:sp>
+                  <p:nvSpPr>
+                    <p:cNvPr id="156" name="Freeform 169 2" descr="Granite">
+                      <a:extLst>
+                        <a:ext uri="{FF2B5EF4-FFF2-40B4-BE49-F238E27FC236}">
+                          <a16:creationId xmlns:a16="http://schemas.microsoft.com/office/drawing/2014/main" id="{26B1CE31-F3C9-4092-A793-28BF39DD0DDC}"/>
+                        </a:ext>
+                      </a:extLst>
+                    </p:cNvPr>
+                    <p:cNvSpPr>
+                      <a:spLocks/>
+                    </p:cNvSpPr>
+                    <p:nvPr/>
+                  </p:nvSpPr>
+                  <p:spPr bwMode="auto">
+                    <a:xfrm>
+                      <a:off x="6919540" y="1989074"/>
+                      <a:ext cx="367908" cy="262890"/>
+                    </a:xfrm>
+                    <a:custGeom>
+                      <a:avLst/>
+                      <a:gdLst/>
+                      <a:ahLst/>
+                      <a:cxnLst>
+                        <a:cxn ang="0">
+                          <a:pos x="0" y="240"/>
+                        </a:cxn>
+                        <a:cxn ang="0">
+                          <a:pos x="336" y="240"/>
+                        </a:cxn>
+                        <a:cxn ang="0">
+                          <a:pos x="336" y="0"/>
+                        </a:cxn>
+                        <a:cxn ang="0">
+                          <a:pos x="192" y="0"/>
+                        </a:cxn>
+                        <a:cxn ang="0">
+                          <a:pos x="192" y="96"/>
+                        </a:cxn>
+                        <a:cxn ang="0">
+                          <a:pos x="0" y="96"/>
+                        </a:cxn>
+                        <a:cxn ang="0">
+                          <a:pos x="0" y="240"/>
+                        </a:cxn>
+                      </a:cxnLst>
+                      <a:rect l="0" t="0" r="r" b="b"/>
+                      <a:pathLst>
+                        <a:path w="336" h="240">
+                          <a:moveTo>
+                            <a:pt x="0" y="240"/>
+                          </a:moveTo>
+                          <a:lnTo>
+                            <a:pt x="336" y="240"/>
+                          </a:lnTo>
+                          <a:lnTo>
+                            <a:pt x="336" y="0"/>
+                          </a:lnTo>
+                          <a:lnTo>
+                            <a:pt x="192" y="0"/>
+                          </a:lnTo>
+                          <a:lnTo>
+                            <a:pt x="192" y="96"/>
+                          </a:lnTo>
+                          <a:lnTo>
+                            <a:pt x="0" y="96"/>
+                          </a:lnTo>
+                          <a:lnTo>
+                            <a:pt x="0" y="240"/>
+                          </a:lnTo>
+                          <a:close/>
+                        </a:path>
+                      </a:pathLst>
+                    </a:custGeom>
+                    <a:blipFill dpi="0" rotWithShape="1">
+                      <a:blip r:embed="rId10" cstate="print"/>
+                      <a:srcRect/>
+                      <a:tile tx="0" ty="0" sx="100000" sy="100000" flip="none" algn="tl"/>
+                    </a:blipFill>
+                    <a:ln w="12700" cap="flat" cmpd="sng">
+                      <a:solidFill>
+                        <a:schemeClr val="tx1"/>
+                      </a:solidFill>
+                      <a:prstDash val="solid"/>
+                      <a:round/>
+                      <a:headEnd type="none" w="lg" len="med"/>
+                      <a:tailEnd type="none" w="lg" len="med"/>
+                    </a:ln>
+                    <a:effectLst/>
+                  </p:spPr>
+                  <p:txBody>
+                    <a:bodyPr wrap="none" anchor="ctr">
+                      <a:spAutoFit/>
+                    </a:bodyPr>
+                    <a:lstStyle/>
+                    <a:p>
+                      <a:endParaRPr lang="en-US"/>
+                    </a:p>
+                  </p:txBody>
+                </p:sp>
+                <p:sp>
+                  <p:nvSpPr>
+                    <p:cNvPr id="157" name="Freeform 170 2" descr="Granite">
+                      <a:extLst>
+                        <a:ext uri="{FF2B5EF4-FFF2-40B4-BE49-F238E27FC236}">
+                          <a16:creationId xmlns:a16="http://schemas.microsoft.com/office/drawing/2014/main" id="{303FADD2-5F47-4DA7-9416-694BACBEF9F3}"/>
+                        </a:ext>
+                      </a:extLst>
+                    </p:cNvPr>
+                    <p:cNvSpPr>
+                      <a:spLocks/>
+                    </p:cNvSpPr>
+                    <p:nvPr/>
+                  </p:nvSpPr>
+                  <p:spPr bwMode="auto">
+                    <a:xfrm flipH="1">
+                      <a:off x="8086771" y="1989074"/>
+                      <a:ext cx="367908" cy="262890"/>
+                    </a:xfrm>
+                    <a:custGeom>
+                      <a:avLst/>
+                      <a:gdLst/>
+                      <a:ahLst/>
+                      <a:cxnLst>
+                        <a:cxn ang="0">
+                          <a:pos x="0" y="240"/>
+                        </a:cxn>
+                        <a:cxn ang="0">
+                          <a:pos x="336" y="240"/>
+                        </a:cxn>
+                        <a:cxn ang="0">
+                          <a:pos x="336" y="0"/>
+                        </a:cxn>
+                        <a:cxn ang="0">
+                          <a:pos x="192" y="0"/>
+                        </a:cxn>
+                        <a:cxn ang="0">
+                          <a:pos x="192" y="96"/>
+                        </a:cxn>
+                        <a:cxn ang="0">
+                          <a:pos x="0" y="96"/>
+                        </a:cxn>
+                        <a:cxn ang="0">
+                          <a:pos x="0" y="240"/>
+                        </a:cxn>
+                      </a:cxnLst>
+                      <a:rect l="0" t="0" r="r" b="b"/>
+                      <a:pathLst>
+                        <a:path w="336" h="240">
+                          <a:moveTo>
+                            <a:pt x="0" y="240"/>
+                          </a:moveTo>
+                          <a:lnTo>
+                            <a:pt x="336" y="240"/>
+                          </a:lnTo>
+                          <a:lnTo>
+                            <a:pt x="336" y="0"/>
+                          </a:lnTo>
+                          <a:lnTo>
+                            <a:pt x="192" y="0"/>
+                          </a:lnTo>
+                          <a:lnTo>
+                            <a:pt x="192" y="96"/>
+                          </a:lnTo>
+                          <a:lnTo>
+                            <a:pt x="0" y="96"/>
+                          </a:lnTo>
+                          <a:lnTo>
+                            <a:pt x="0" y="240"/>
+                          </a:lnTo>
+                          <a:close/>
+                        </a:path>
+                      </a:pathLst>
+                    </a:custGeom>
+                    <a:blipFill dpi="0" rotWithShape="1">
+                      <a:blip r:embed="rId10" cstate="print"/>
+                      <a:srcRect/>
+                      <a:tile tx="0" ty="0" sx="100000" sy="100000" flip="none" algn="tl"/>
+                    </a:blipFill>
+                    <a:ln w="12700" cap="flat" cmpd="sng">
+                      <a:solidFill>
+                        <a:schemeClr val="tx1"/>
+                      </a:solidFill>
+                      <a:prstDash val="solid"/>
+                      <a:round/>
+                      <a:headEnd type="none" w="lg" len="med"/>
+                      <a:tailEnd type="none" w="lg" len="med"/>
+                    </a:ln>
+                    <a:effectLst/>
+                  </p:spPr>
+                  <p:txBody>
+                    <a:bodyPr wrap="none" anchor="ctr">
+                      <a:spAutoFit/>
+                    </a:bodyPr>
+                    <a:lstStyle/>
+                    <a:p>
+                      <a:endParaRPr lang="en-US"/>
+                    </a:p>
+                  </p:txBody>
+                </p:sp>
+                <p:grpSp>
+                  <p:nvGrpSpPr>
+                    <p:cNvPr id="158" name="Group 171">
+                      <a:extLst>
+                        <a:ext uri="{FF2B5EF4-FFF2-40B4-BE49-F238E27FC236}">
+                          <a16:creationId xmlns:a16="http://schemas.microsoft.com/office/drawing/2014/main" id="{F4766AB4-9C6D-4CF2-93E3-05EED29251F4}"/>
+                        </a:ext>
+                      </a:extLst>
+                    </p:cNvPr>
+                    <p:cNvGrpSpPr>
+                      <a:grpSpLocks/>
+                    </p:cNvGrpSpPr>
+                    <p:nvPr/>
+                  </p:nvGrpSpPr>
+                  <p:grpSpPr bwMode="auto">
+                    <a:xfrm>
+                      <a:off x="7009327" y="1787525"/>
+                      <a:ext cx="1357754" cy="263985"/>
+                      <a:chOff x="932" y="2975"/>
+                      <a:chExt cx="1312" cy="241"/>
+                    </a:xfrm>
+                  </p:grpSpPr>
+                  <p:sp>
+                    <p:nvSpPr>
+                      <p:cNvPr id="279" name="AutoShape 172 2">
+                        <a:extLst>
+                          <a:ext uri="{FF2B5EF4-FFF2-40B4-BE49-F238E27FC236}">
+                            <a16:creationId xmlns:a16="http://schemas.microsoft.com/office/drawing/2014/main" id="{3F2B62E4-BE4A-4FCF-8B62-D313D5C865B8}"/>
+                          </a:ext>
+                        </a:extLst>
+                      </p:cNvPr>
+                      <p:cNvSpPr>
+                        <a:spLocks noChangeArrowheads="1"/>
+                      </p:cNvSpPr>
+                      <p:nvPr/>
+                    </p:nvSpPr>
+                    <p:spPr bwMode="auto">
+                      <a:xfrm>
+                        <a:off x="1434" y="2975"/>
+                        <a:ext cx="307" cy="139"/>
+                      </a:xfrm>
+                      <a:prstGeom prst="roundRect">
+                        <a:avLst>
+                          <a:gd name="adj" fmla="val 16667"/>
+                        </a:avLst>
+                      </a:prstGeom>
+                      <a:noFill/>
+                      <a:ln w="57150">
+                        <a:solidFill>
+                          <a:schemeClr val="tx1"/>
+                        </a:solidFill>
+                        <a:round/>
+                        <a:headEnd type="none" w="lg" len="med"/>
+                        <a:tailEnd type="none" w="lg" len="med"/>
+                      </a:ln>
+                      <a:effectLst/>
+                    </p:spPr>
+                    <p:txBody>
+                      <a:bodyPr wrap="none" anchor="ctr">
+                        <a:spAutoFit/>
+                      </a:bodyPr>
+                      <a:lstStyle/>
+                      <a:p>
+                        <a:endParaRPr lang="en-US"/>
+                      </a:p>
+                    </p:txBody>
+                  </p:sp>
+                  <p:sp>
+                    <p:nvSpPr>
+                      <p:cNvPr id="280" name="Freeform 173 2" descr="Granite">
+                        <a:extLst>
+                          <a:ext uri="{FF2B5EF4-FFF2-40B4-BE49-F238E27FC236}">
+                            <a16:creationId xmlns:a16="http://schemas.microsoft.com/office/drawing/2014/main" id="{FD00D71E-8BC7-4249-8282-80DC8661DD0C}"/>
+                          </a:ext>
+                        </a:extLst>
+                      </p:cNvPr>
+                      <p:cNvSpPr>
+                        <a:spLocks/>
+                      </p:cNvSpPr>
+                      <p:nvPr/>
+                    </p:nvSpPr>
+                    <p:spPr bwMode="auto">
+                      <a:xfrm>
+                        <a:off x="932" y="3060"/>
+                        <a:ext cx="1312" cy="156"/>
+                      </a:xfrm>
+                      <a:custGeom>
+                        <a:avLst/>
+                        <a:gdLst/>
+                        <a:ahLst/>
+                        <a:cxnLst>
+                          <a:cxn ang="0">
+                            <a:pos x="100" y="156"/>
+                          </a:cxn>
+                          <a:cxn ang="0">
+                            <a:pos x="100" y="88"/>
+                          </a:cxn>
+                          <a:cxn ang="0">
+                            <a:pos x="1212" y="88"/>
+                          </a:cxn>
+                          <a:cxn ang="0">
+                            <a:pos x="1212" y="156"/>
+                          </a:cxn>
+                          <a:cxn ang="0">
+                            <a:pos x="1312" y="156"/>
+                          </a:cxn>
+                          <a:cxn ang="0">
+                            <a:pos x="1312" y="0"/>
+                          </a:cxn>
+                          <a:cxn ang="0">
+                            <a:pos x="0" y="0"/>
+                          </a:cxn>
+                          <a:cxn ang="0">
+                            <a:pos x="0" y="156"/>
+                          </a:cxn>
+                          <a:cxn ang="0">
+                            <a:pos x="100" y="156"/>
+                          </a:cxn>
+                        </a:cxnLst>
+                        <a:rect l="0" t="0" r="r" b="b"/>
+                        <a:pathLst>
+                          <a:path w="1312" h="156">
+                            <a:moveTo>
+                              <a:pt x="100" y="156"/>
+                            </a:moveTo>
+                            <a:lnTo>
+                              <a:pt x="100" y="88"/>
+                            </a:lnTo>
+                            <a:lnTo>
+                              <a:pt x="1212" y="88"/>
+                            </a:lnTo>
+                            <a:lnTo>
+                              <a:pt x="1212" y="156"/>
+                            </a:lnTo>
+                            <a:lnTo>
+                              <a:pt x="1312" y="156"/>
+                            </a:lnTo>
+                            <a:lnTo>
+                              <a:pt x="1312" y="0"/>
+                            </a:lnTo>
+                            <a:lnTo>
+                              <a:pt x="0" y="0"/>
+                            </a:lnTo>
+                            <a:lnTo>
+                              <a:pt x="0" y="156"/>
+                            </a:lnTo>
+                            <a:lnTo>
+                              <a:pt x="100" y="156"/>
+                            </a:lnTo>
+                            <a:close/>
+                          </a:path>
+                        </a:pathLst>
+                      </a:custGeom>
+                      <a:blipFill dpi="0" rotWithShape="1">
+                        <a:blip r:embed="rId10" cstate="print"/>
+                        <a:srcRect/>
+                        <a:tile tx="0" ty="0" sx="100000" sy="100000" flip="none" algn="tl"/>
+                      </a:blipFill>
+                      <a:ln w="12700" cap="flat" cmpd="sng">
+                        <a:solidFill>
+                          <a:schemeClr val="tx1"/>
+                        </a:solidFill>
+                        <a:prstDash val="solid"/>
+                        <a:round/>
+                        <a:headEnd type="none" w="lg" len="med"/>
+                        <a:tailEnd type="none" w="lg" len="med"/>
+                      </a:ln>
+                      <a:effectLst/>
+                    </p:spPr>
+                    <p:txBody>
+                      <a:bodyPr wrap="none" anchor="ctr">
+                        <a:spAutoFit/>
+                      </a:bodyPr>
+                      <a:lstStyle/>
+                      <a:p>
+                        <a:endParaRPr lang="en-US"/>
+                      </a:p>
+                    </p:txBody>
+                  </p:sp>
+                </p:grpSp>
+                <p:sp>
+                  <p:nvSpPr>
+                    <p:cNvPr id="159" name="AutoShape 174 2">
+                      <a:extLst>
+                        <a:ext uri="{FF2B5EF4-FFF2-40B4-BE49-F238E27FC236}">
+                          <a16:creationId xmlns:a16="http://schemas.microsoft.com/office/drawing/2014/main" id="{9B91C7B0-6642-4457-A254-1A6C25E0A234}"/>
+                        </a:ext>
+                      </a:extLst>
+                    </p:cNvPr>
+                    <p:cNvSpPr>
+                      <a:spLocks noChangeArrowheads="1"/>
+                    </p:cNvSpPr>
+                    <p:nvPr/>
+                  </p:nvSpPr>
+                  <p:spPr bwMode="auto">
+                    <a:xfrm flipV="1">
+                      <a:off x="8021073" y="2389981"/>
+                      <a:ext cx="157675" cy="105156"/>
+                    </a:xfrm>
+                    <a:prstGeom prst="triangle">
+                      <a:avLst>
+                        <a:gd name="adj" fmla="val 50000"/>
+                      </a:avLst>
+                    </a:prstGeom>
+                    <a:noFill/>
+                    <a:ln w="12700">
+                      <a:solidFill>
+                        <a:schemeClr val="tx1"/>
+                      </a:solidFill>
+                      <a:miter lim="800000"/>
+                      <a:headEnd type="none" w="lg" len="med"/>
+                      <a:tailEnd type="none" w="lg" len="med"/>
+                    </a:ln>
+                    <a:effectLst/>
+                  </p:spPr>
+                  <p:txBody>
+                    <a:bodyPr anchor="ctr">
+                      <a:spAutoFit/>
+                    </a:bodyPr>
+                    <a:lstStyle/>
+                    <a:p>
+                      <a:endParaRPr lang="en-US"/>
+                    </a:p>
+                  </p:txBody>
+                </p:sp>
+                <p:sp>
+                  <p:nvSpPr>
+                    <p:cNvPr id="160" name="Line 175 2">
+                      <a:extLst>
+                        <a:ext uri="{FF2B5EF4-FFF2-40B4-BE49-F238E27FC236}">
+                          <a16:creationId xmlns:a16="http://schemas.microsoft.com/office/drawing/2014/main" id="{D420A070-3C42-4044-96D2-089BC331F090}"/>
+                        </a:ext>
+                      </a:extLst>
+                    </p:cNvPr>
+                    <p:cNvSpPr>
+                      <a:spLocks noChangeShapeType="1"/>
+                    </p:cNvSpPr>
+                    <p:nvPr/>
+                  </p:nvSpPr>
+                  <p:spPr bwMode="auto">
+                    <a:xfrm>
+                      <a:off x="7994794" y="2524712"/>
+                      <a:ext cx="210233" cy="0"/>
+                    </a:xfrm>
+                    <a:prstGeom prst="line">
+                      <a:avLst/>
+                    </a:prstGeom>
+                    <a:noFill/>
+                    <a:ln w="12700">
+                      <a:solidFill>
+                        <a:schemeClr val="tx1"/>
+                      </a:solidFill>
+                      <a:round/>
+                      <a:headEnd type="none" w="lg" len="med"/>
+                      <a:tailEnd type="none" w="lg" len="med"/>
+                    </a:ln>
+                    <a:effectLst/>
+                  </p:spPr>
+                  <p:txBody>
+                    <a:bodyPr anchor="ctr">
+                      <a:spAutoFit/>
+                    </a:bodyPr>
+                    <a:lstStyle/>
+                    <a:p>
+                      <a:endParaRPr lang="en-US"/>
+                    </a:p>
+                  </p:txBody>
+                </p:sp>
+                <p:sp>
+                  <p:nvSpPr>
+                    <p:cNvPr id="161" name="Line 176 2">
+                      <a:extLst>
+                        <a:ext uri="{FF2B5EF4-FFF2-40B4-BE49-F238E27FC236}">
+                          <a16:creationId xmlns:a16="http://schemas.microsoft.com/office/drawing/2014/main" id="{3063D9CE-136D-4E6B-BEC7-178AB3A9FCD1}"/>
+                        </a:ext>
+                      </a:extLst>
+                    </p:cNvPr>
+                    <p:cNvSpPr>
+                      <a:spLocks noChangeShapeType="1"/>
+                    </p:cNvSpPr>
+                    <p:nvPr/>
+                  </p:nvSpPr>
+                  <p:spPr bwMode="auto">
+                    <a:xfrm>
+                      <a:off x="8021073" y="2554288"/>
+                      <a:ext cx="157675" cy="0"/>
+                    </a:xfrm>
+                    <a:prstGeom prst="line">
+                      <a:avLst/>
+                    </a:prstGeom>
+                    <a:noFill/>
+                    <a:ln w="12700">
+                      <a:solidFill>
+                        <a:schemeClr val="tx1"/>
+                      </a:solidFill>
+                      <a:round/>
+                      <a:headEnd type="none" w="lg" len="med"/>
+                      <a:tailEnd type="none" w="lg" len="med"/>
+                    </a:ln>
+                    <a:effectLst/>
+                  </p:spPr>
+                  <p:txBody>
+                    <a:bodyPr anchor="ctr">
+                      <a:spAutoFit/>
+                    </a:bodyPr>
+                    <a:lstStyle/>
+                    <a:p>
+                      <a:endParaRPr lang="en-US"/>
+                    </a:p>
+                  </p:txBody>
+                </p:sp>
+                <p:sp>
+                  <p:nvSpPr>
+                    <p:cNvPr id="162" name="Line 177 2">
+                      <a:extLst>
+                        <a:ext uri="{FF2B5EF4-FFF2-40B4-BE49-F238E27FC236}">
+                          <a16:creationId xmlns:a16="http://schemas.microsoft.com/office/drawing/2014/main" id="{C915A09E-9CB5-4BB2-BBFD-4B7D135B485F}"/>
+                        </a:ext>
+                      </a:extLst>
+                    </p:cNvPr>
+                    <p:cNvSpPr>
+                      <a:spLocks noChangeShapeType="1"/>
+                    </p:cNvSpPr>
+                    <p:nvPr/>
+                  </p:nvSpPr>
+                  <p:spPr bwMode="auto">
+                    <a:xfrm>
+                      <a:off x="8051732" y="2583863"/>
+                      <a:ext cx="95262" cy="0"/>
+                    </a:xfrm>
+                    <a:prstGeom prst="line">
+                      <a:avLst/>
+                    </a:prstGeom>
+                    <a:noFill/>
+                    <a:ln w="12700">
+                      <a:solidFill>
+                        <a:schemeClr val="tx1"/>
+                      </a:solidFill>
+                      <a:round/>
+                      <a:headEnd type="none" w="lg" len="med"/>
+                      <a:tailEnd type="none" w="lg" len="med"/>
+                    </a:ln>
+                    <a:effectLst/>
+                  </p:spPr>
+                  <p:txBody>
+                    <a:bodyPr anchor="ctr">
+                      <a:spAutoFit/>
+                    </a:bodyPr>
+                    <a:lstStyle/>
+                    <a:p>
+                      <a:endParaRPr lang="en-US"/>
+                    </a:p>
+                  </p:txBody>
+                </p:sp>
+                <p:grpSp>
+                  <p:nvGrpSpPr>
+                    <p:cNvPr id="163" name="Group 178">
+                      <a:extLst>
+                        <a:ext uri="{FF2B5EF4-FFF2-40B4-BE49-F238E27FC236}">
+                          <a16:creationId xmlns:a16="http://schemas.microsoft.com/office/drawing/2014/main" id="{B53EF5BD-196F-442F-9E6F-8597DCAB6D34}"/>
+                        </a:ext>
+                      </a:extLst>
+                    </p:cNvPr>
+                    <p:cNvGrpSpPr>
+                      <a:grpSpLocks/>
+                    </p:cNvGrpSpPr>
+                    <p:nvPr/>
+                  </p:nvGrpSpPr>
+                  <p:grpSpPr bwMode="auto">
+                    <a:xfrm>
+                      <a:off x="8796307" y="2492947"/>
+                      <a:ext cx="81027" cy="1245442"/>
+                      <a:chOff x="4310" y="2095"/>
+                      <a:chExt cx="74" cy="1137"/>
+                    </a:xfrm>
+                  </p:grpSpPr>
+                  <p:sp>
+                    <p:nvSpPr>
+                      <p:cNvPr id="277" name="Line 179 2">
+                        <a:extLst>
+                          <a:ext uri="{FF2B5EF4-FFF2-40B4-BE49-F238E27FC236}">
+                            <a16:creationId xmlns:a16="http://schemas.microsoft.com/office/drawing/2014/main" id="{3E86EE85-5451-4C3A-B574-2D896D8AEA9F}"/>
+                          </a:ext>
+                        </a:extLst>
+                      </p:cNvPr>
+                      <p:cNvSpPr>
+                        <a:spLocks noChangeShapeType="1"/>
+                      </p:cNvSpPr>
+                      <p:nvPr/>
+                    </p:nvSpPr>
+                    <p:spPr bwMode="auto">
+                      <a:xfrm rot="5400000">
+                        <a:off x="3815" y="2664"/>
+                        <a:ext cx="1137" cy="0"/>
+                      </a:xfrm>
+                      <a:prstGeom prst="line">
+                        <a:avLst/>
+                      </a:prstGeom>
+                      <a:noFill/>
+                      <a:ln w="12700">
+                        <a:solidFill>
+                          <a:schemeClr val="tx1"/>
+                        </a:solidFill>
+                        <a:round/>
+                        <a:headEnd type="none" w="lg" len="med"/>
+                        <a:tailEnd type="none" w="lg" len="med"/>
+                      </a:ln>
+                      <a:effectLst/>
+                    </p:spPr>
+                    <p:txBody>
+                      <a:bodyPr wrap="none" anchor="ctr">
+                        <a:spAutoFit/>
+                      </a:bodyPr>
+                      <a:lstStyle/>
+                      <a:p>
+                        <a:endParaRPr lang="en-US"/>
+                      </a:p>
+                    </p:txBody>
+                  </p:sp>
+                  <p:sp>
+                    <p:nvSpPr>
+                      <p:cNvPr id="278" name="Line 180 2">
+                        <a:extLst>
+                          <a:ext uri="{FF2B5EF4-FFF2-40B4-BE49-F238E27FC236}">
+                            <a16:creationId xmlns:a16="http://schemas.microsoft.com/office/drawing/2014/main" id="{A20C81ED-F989-4AAC-A46D-DC09365FA41D}"/>
+                          </a:ext>
+                        </a:extLst>
+                      </p:cNvPr>
+                      <p:cNvSpPr>
+                        <a:spLocks noChangeShapeType="1"/>
+                      </p:cNvSpPr>
+                      <p:nvPr/>
+                    </p:nvSpPr>
+                    <p:spPr bwMode="auto">
+                      <a:xfrm rot="5400000">
+                        <a:off x="3741" y="2664"/>
+                        <a:ext cx="1137" cy="0"/>
+                      </a:xfrm>
+                      <a:prstGeom prst="line">
+                        <a:avLst/>
+                      </a:prstGeom>
+                      <a:noFill/>
+                      <a:ln w="12700">
+                        <a:solidFill>
+                          <a:schemeClr val="tx1"/>
+                        </a:solidFill>
+                        <a:round/>
+                        <a:headEnd type="none" w="lg" len="med"/>
+                        <a:tailEnd type="none" w="lg" len="med"/>
+                      </a:ln>
+                      <a:effectLst/>
+                    </p:spPr>
+                    <p:txBody>
+                      <a:bodyPr wrap="none" anchor="ctr">
+                        <a:spAutoFit/>
+                      </a:bodyPr>
+                      <a:lstStyle/>
+                      <a:p>
+                        <a:endParaRPr lang="en-US"/>
+                      </a:p>
+                    </p:txBody>
+                  </p:sp>
+                </p:grpSp>
+                <p:grpSp>
+                  <p:nvGrpSpPr>
+                    <p:cNvPr id="164" name="Group 181">
+                      <a:extLst>
+                        <a:ext uri="{FF2B5EF4-FFF2-40B4-BE49-F238E27FC236}">
+                          <a16:creationId xmlns:a16="http://schemas.microsoft.com/office/drawing/2014/main" id="{577446F9-4039-4E58-A426-448997EA8C24}"/>
+                        </a:ext>
+                      </a:extLst>
+                    </p:cNvPr>
+                    <p:cNvGrpSpPr>
+                      <a:grpSpLocks/>
+                    </p:cNvGrpSpPr>
+                    <p:nvPr/>
+                  </p:nvGrpSpPr>
+                  <p:grpSpPr bwMode="auto">
+                    <a:xfrm rot="5400000" flipH="1">
+                      <a:off x="8680204" y="2321010"/>
+                      <a:ext cx="196072" cy="195998"/>
+                      <a:chOff x="4380" y="3764"/>
+                      <a:chExt cx="388" cy="388"/>
+                    </a:xfrm>
+                  </p:grpSpPr>
+                  <p:sp>
+                    <p:nvSpPr>
+                      <p:cNvPr id="275" name="Arc 182 2">
+                        <a:extLst>
+                          <a:ext uri="{FF2B5EF4-FFF2-40B4-BE49-F238E27FC236}">
+                            <a16:creationId xmlns:a16="http://schemas.microsoft.com/office/drawing/2014/main" id="{7DD78001-A916-4BED-9237-A446DADB5085}"/>
+                          </a:ext>
+                        </a:extLst>
+                      </p:cNvPr>
+                      <p:cNvSpPr>
+                        <a:spLocks/>
+                      </p:cNvSpPr>
+                      <p:nvPr/>
+                    </p:nvSpPr>
+                    <p:spPr bwMode="auto">
+                      <a:xfrm>
+                        <a:off x="4380" y="3764"/>
+                        <a:ext cx="388" cy="388"/>
+                      </a:xfrm>
+                      <a:custGeom>
+                        <a:avLst/>
+                        <a:gdLst>
+                          <a:gd name="G0" fmla="+- 0 0 0"/>
+                          <a:gd name="G1" fmla="+- 21600 0 0"/>
+                          <a:gd name="G2" fmla="+- 21600 0 0"/>
+                          <a:gd name="T0" fmla="*/ 0 w 21600"/>
+                          <a:gd name="T1" fmla="*/ 0 h 21600"/>
+                          <a:gd name="T2" fmla="*/ 21600 w 21600"/>
+                          <a:gd name="T3" fmla="*/ 21600 h 21600"/>
+                          <a:gd name="T4" fmla="*/ 0 w 21600"/>
+                          <a:gd name="T5" fmla="*/ 21600 h 21600"/>
+                        </a:gdLst>
+                        <a:ahLst/>
+                        <a:cxnLst>
+                          <a:cxn ang="0">
+                            <a:pos x="T0" y="T1"/>
+                          </a:cxn>
+                          <a:cxn ang="0">
+                            <a:pos x="T2" y="T3"/>
+                          </a:cxn>
+                          <a:cxn ang="0">
+                            <a:pos x="T4" y="T5"/>
+                          </a:cxn>
+                        </a:cxnLst>
+                        <a:rect l="0" t="0" r="r" b="b"/>
+                        <a:pathLst>
+                          <a:path w="21600" h="21600" fill="none" extrusionOk="0">
+                            <a:moveTo>
+                              <a:pt x="-1" y="0"/>
+                            </a:moveTo>
+                            <a:cubicBezTo>
+                              <a:pt x="11929" y="0"/>
+                              <a:pt x="21600" y="9670"/>
+                              <a:pt x="21600" y="21600"/>
+                            </a:cubicBezTo>
+                          </a:path>
+                          <a:path w="21600" h="21600" stroke="0" extrusionOk="0">
+                            <a:moveTo>
+                              <a:pt x="-1" y="0"/>
+                            </a:moveTo>
+                            <a:cubicBezTo>
+                              <a:pt x="11929" y="0"/>
+                              <a:pt x="21600" y="9670"/>
+                              <a:pt x="21600" y="21600"/>
+                            </a:cubicBezTo>
+                            <a:lnTo>
+                              <a:pt x="0" y="21600"/>
+                            </a:lnTo>
+                            <a:close/>
+                          </a:path>
+                        </a:pathLst>
+                      </a:custGeom>
+                      <a:noFill/>
+                      <a:ln w="12700">
+                        <a:solidFill>
+                          <a:schemeClr val="tx1"/>
+                        </a:solidFill>
+                        <a:round/>
+                        <a:headEnd type="none" w="lg" len="med"/>
+                        <a:tailEnd type="none" w="lg" len="med"/>
+                      </a:ln>
+                      <a:effectLst/>
+                    </p:spPr>
+                    <p:txBody>
+                      <a:bodyPr anchor="ctr">
+                        <a:spAutoFit/>
+                      </a:bodyPr>
+                      <a:lstStyle/>
+                      <a:p>
+                        <a:endParaRPr lang="en-US"/>
+                      </a:p>
+                    </p:txBody>
+                  </p:sp>
+                  <p:sp>
+                    <p:nvSpPr>
+                      <p:cNvPr id="276" name="Arc 183 2">
+                        <a:extLst>
+                          <a:ext uri="{FF2B5EF4-FFF2-40B4-BE49-F238E27FC236}">
+                            <a16:creationId xmlns:a16="http://schemas.microsoft.com/office/drawing/2014/main" id="{B694F050-1AE9-4CFE-AF95-7D1DB315A015}"/>
+                          </a:ext>
+                        </a:extLst>
+                      </p:cNvPr>
+                      <p:cNvSpPr>
+                        <a:spLocks/>
+                      </p:cNvSpPr>
+                      <p:nvPr/>
+                    </p:nvSpPr>
+                    <p:spPr bwMode="auto">
+                      <a:xfrm>
+                        <a:off x="4380" y="3924"/>
+                        <a:ext cx="228" cy="228"/>
+                      </a:xfrm>
+                      <a:custGeom>
+                        <a:avLst/>
+                        <a:gdLst>
+                          <a:gd name="G0" fmla="+- 0 0 0"/>
+                          <a:gd name="G1" fmla="+- 21600 0 0"/>
+                          <a:gd name="G2" fmla="+- 21600 0 0"/>
+                          <a:gd name="T0" fmla="*/ 0 w 21600"/>
+                          <a:gd name="T1" fmla="*/ 0 h 21600"/>
+                          <a:gd name="T2" fmla="*/ 21600 w 21600"/>
+                          <a:gd name="T3" fmla="*/ 21600 h 21600"/>
+                          <a:gd name="T4" fmla="*/ 0 w 21600"/>
+                          <a:gd name="T5" fmla="*/ 21600 h 21600"/>
+                        </a:gdLst>
+                        <a:ahLst/>
+                        <a:cxnLst>
+                          <a:cxn ang="0">
+                            <a:pos x="T0" y="T1"/>
+                          </a:cxn>
+                          <a:cxn ang="0">
+                            <a:pos x="T2" y="T3"/>
+                          </a:cxn>
+                          <a:cxn ang="0">
+                            <a:pos x="T4" y="T5"/>
+                          </a:cxn>
+                        </a:cxnLst>
+                        <a:rect l="0" t="0" r="r" b="b"/>
+                        <a:pathLst>
+                          <a:path w="21600" h="21600" fill="none" extrusionOk="0">
+                            <a:moveTo>
+                              <a:pt x="-1" y="0"/>
+                            </a:moveTo>
+                            <a:cubicBezTo>
+                              <a:pt x="11929" y="0"/>
+                              <a:pt x="21600" y="9670"/>
+                              <a:pt x="21600" y="21600"/>
+                            </a:cubicBezTo>
+                          </a:path>
+                          <a:path w="21600" h="21600" stroke="0" extrusionOk="0">
+                            <a:moveTo>
+                              <a:pt x="-1" y="0"/>
+                            </a:moveTo>
+                            <a:cubicBezTo>
+                              <a:pt x="11929" y="0"/>
+                              <a:pt x="21600" y="9670"/>
+                              <a:pt x="21600" y="21600"/>
+                            </a:cubicBezTo>
+                            <a:lnTo>
+                              <a:pt x="0" y="21600"/>
+                            </a:lnTo>
+                            <a:close/>
+                          </a:path>
+                        </a:pathLst>
+                      </a:custGeom>
+                      <a:noFill/>
+                      <a:ln w="12700">
+                        <a:solidFill>
+                          <a:schemeClr val="tx1"/>
+                        </a:solidFill>
+                        <a:round/>
+                        <a:headEnd type="none" w="lg" len="med"/>
+                        <a:tailEnd type="none" w="lg" len="med"/>
+                      </a:ln>
+                      <a:effectLst/>
+                    </p:spPr>
+                    <p:txBody>
+                      <a:bodyPr anchor="ctr">
+                        <a:spAutoFit/>
+                      </a:bodyPr>
+                      <a:lstStyle/>
+                      <a:p>
+                        <a:endParaRPr lang="en-US"/>
+                      </a:p>
+                    </p:txBody>
+                  </p:sp>
+                </p:grpSp>
+                <p:grpSp>
+                  <p:nvGrpSpPr>
+                    <p:cNvPr id="165" name="Group 184">
+                      <a:extLst>
+                        <a:ext uri="{FF2B5EF4-FFF2-40B4-BE49-F238E27FC236}">
+                          <a16:creationId xmlns:a16="http://schemas.microsoft.com/office/drawing/2014/main" id="{D01D99F0-38BB-4A35-9EA2-E4FB8D231D1D}"/>
+                        </a:ext>
+                      </a:extLst>
+                    </p:cNvPr>
+                    <p:cNvGrpSpPr>
+                      <a:grpSpLocks/>
+                    </p:cNvGrpSpPr>
+                    <p:nvPr/>
+                  </p:nvGrpSpPr>
+                  <p:grpSpPr bwMode="auto">
+                    <a:xfrm rot="16200000">
+                      <a:off x="8419624" y="2138131"/>
+                      <a:ext cx="81058" cy="456600"/>
+                      <a:chOff x="4310" y="2095"/>
+                      <a:chExt cx="74" cy="1137"/>
+                    </a:xfrm>
+                  </p:grpSpPr>
+                  <p:sp>
+                    <p:nvSpPr>
+                      <p:cNvPr id="273" name="Line 185 2">
+                        <a:extLst>
+                          <a:ext uri="{FF2B5EF4-FFF2-40B4-BE49-F238E27FC236}">
+                            <a16:creationId xmlns:a16="http://schemas.microsoft.com/office/drawing/2014/main" id="{32E34E6D-289C-4753-B446-0DDF02475DF4}"/>
+                          </a:ext>
+                        </a:extLst>
+                      </p:cNvPr>
+                      <p:cNvSpPr>
+                        <a:spLocks noChangeShapeType="1"/>
+                      </p:cNvSpPr>
+                      <p:nvPr/>
+                    </p:nvSpPr>
+                    <p:spPr bwMode="auto">
+                      <a:xfrm rot="5400000">
+                        <a:off x="3815" y="2664"/>
+                        <a:ext cx="1137" cy="0"/>
+                      </a:xfrm>
+                      <a:prstGeom prst="line">
+                        <a:avLst/>
+                      </a:prstGeom>
+                      <a:noFill/>
+                      <a:ln w="12700">
+                        <a:solidFill>
+                          <a:schemeClr val="tx1"/>
+                        </a:solidFill>
+                        <a:round/>
+                        <a:headEnd type="none" w="lg" len="med"/>
+                        <a:tailEnd type="none" w="lg" len="med"/>
+                      </a:ln>
+                      <a:effectLst/>
+                    </p:spPr>
+                    <p:txBody>
+                      <a:bodyPr wrap="none" anchor="ctr">
+                        <a:spAutoFit/>
+                      </a:bodyPr>
+                      <a:lstStyle/>
+                      <a:p>
+                        <a:endParaRPr lang="en-US"/>
+                      </a:p>
+                    </p:txBody>
+                  </p:sp>
+                  <p:sp>
+                    <p:nvSpPr>
+                      <p:cNvPr id="274" name="Line 186 2">
+                        <a:extLst>
+                          <a:ext uri="{FF2B5EF4-FFF2-40B4-BE49-F238E27FC236}">
+                            <a16:creationId xmlns:a16="http://schemas.microsoft.com/office/drawing/2014/main" id="{5146DB03-0C7A-42C3-8A6C-9090716A6D14}"/>
+                          </a:ext>
+                        </a:extLst>
+                      </p:cNvPr>
+                      <p:cNvSpPr>
+                        <a:spLocks noChangeShapeType="1"/>
+                      </p:cNvSpPr>
+                      <p:nvPr/>
+                    </p:nvSpPr>
+                    <p:spPr bwMode="auto">
+                      <a:xfrm rot="5400000">
+                        <a:off x="3741" y="2664"/>
+                        <a:ext cx="1137" cy="0"/>
+                      </a:xfrm>
+                      <a:prstGeom prst="line">
+                        <a:avLst/>
+                      </a:prstGeom>
+                      <a:noFill/>
+                      <a:ln w="12700">
+                        <a:solidFill>
+                          <a:schemeClr val="tx1"/>
+                        </a:solidFill>
+                        <a:round/>
+                        <a:headEnd type="none" w="lg" len="med"/>
+                        <a:tailEnd type="none" w="lg" len="med"/>
+                      </a:ln>
+                      <a:effectLst/>
+                    </p:spPr>
+                    <p:txBody>
+                      <a:bodyPr wrap="none" anchor="ctr">
+                        <a:spAutoFit/>
+                      </a:bodyPr>
+                      <a:lstStyle/>
+                      <a:p>
+                        <a:endParaRPr lang="en-US"/>
+                      </a:p>
+                    </p:txBody>
+                  </p:sp>
+                </p:grpSp>
+                <p:sp>
+                  <p:nvSpPr>
+                    <p:cNvPr id="166" name="Rectangle 187 2">
+                      <a:extLst>
+                        <a:ext uri="{FF2B5EF4-FFF2-40B4-BE49-F238E27FC236}">
+                          <a16:creationId xmlns:a16="http://schemas.microsoft.com/office/drawing/2014/main" id="{4D8EBCDA-6C47-4DD0-8C2C-2E07EB9E6085}"/>
+                        </a:ext>
+                      </a:extLst>
+                    </p:cNvPr>
+                    <p:cNvSpPr>
+                      <a:spLocks noChangeArrowheads="1"/>
+                    </p:cNvSpPr>
+                    <p:nvPr/>
+                  </p:nvSpPr>
+                  <p:spPr bwMode="auto">
+                    <a:xfrm>
+                      <a:off x="8244445" y="2335213"/>
+                      <a:ext cx="236512" cy="61341"/>
+                    </a:xfrm>
+                    <a:prstGeom prst="rect">
+                      <a:avLst/>
+                    </a:prstGeom>
+                    <a:solidFill>
+                      <a:schemeClr val="bg1"/>
+                    </a:solidFill>
+                    <a:ln w="12700">
+                      <a:solidFill>
+                        <a:schemeClr val="bg1"/>
+                      </a:solidFill>
+                      <a:miter lim="800000"/>
+                      <a:headEnd type="none" w="lg" len="med"/>
+                      <a:tailEnd type="none" w="lg" len="med"/>
+                    </a:ln>
+                    <a:effectLst/>
+                  </p:spPr>
+                  <p:txBody>
+                    <a:bodyPr wrap="none" anchor="ctr">
+                      <a:spAutoFit/>
+                    </a:bodyPr>
+                    <a:lstStyle/>
+                    <a:p>
+                      <a:endParaRPr lang="en-US"/>
+                    </a:p>
+                  </p:txBody>
+                </p:sp>
+                <p:sp>
+                  <p:nvSpPr>
+                    <p:cNvPr id="167" name="Freeform 188 2">
+                      <a:extLst>
+                        <a:ext uri="{FF2B5EF4-FFF2-40B4-BE49-F238E27FC236}">
+                          <a16:creationId xmlns:a16="http://schemas.microsoft.com/office/drawing/2014/main" id="{2FC89EBA-5DF0-48D6-9EDA-0CFCFB198509}"/>
+                        </a:ext>
+                      </a:extLst>
+                    </p:cNvPr>
+                    <p:cNvSpPr>
+                      <a:spLocks/>
+                    </p:cNvSpPr>
+                    <p:nvPr/>
+                  </p:nvSpPr>
+                  <p:spPr bwMode="auto">
+                    <a:xfrm>
+                      <a:off x="8275104" y="4681506"/>
+                      <a:ext cx="326299" cy="244269"/>
+                    </a:xfrm>
+                    <a:custGeom>
+                      <a:avLst/>
+                      <a:gdLst/>
+                      <a:ahLst/>
+                      <a:cxnLst>
+                        <a:cxn ang="0">
+                          <a:pos x="10" y="130"/>
+                        </a:cxn>
+                        <a:cxn ang="0">
+                          <a:pos x="56" y="9"/>
+                        </a:cxn>
+                        <a:cxn ang="0">
+                          <a:pos x="103" y="149"/>
+                        </a:cxn>
+                        <a:cxn ang="0">
+                          <a:pos x="177" y="46"/>
+                        </a:cxn>
+                        <a:cxn ang="0">
+                          <a:pos x="242" y="121"/>
+                        </a:cxn>
+                        <a:cxn ang="0">
+                          <a:pos x="307" y="0"/>
+                        </a:cxn>
+                        <a:cxn ang="0">
+                          <a:pos x="363" y="111"/>
+                        </a:cxn>
+                        <a:cxn ang="0">
+                          <a:pos x="363" y="223"/>
+                        </a:cxn>
+                        <a:cxn ang="0">
+                          <a:pos x="0" y="223"/>
+                        </a:cxn>
+                        <a:cxn ang="0">
+                          <a:pos x="10" y="130"/>
+                        </a:cxn>
+                      </a:cxnLst>
+                      <a:rect l="0" t="0" r="r" b="b"/>
+                      <a:pathLst>
+                        <a:path w="363" h="223">
+                          <a:moveTo>
+                            <a:pt x="10" y="130"/>
+                          </a:moveTo>
+                          <a:lnTo>
+                            <a:pt x="56" y="9"/>
+                          </a:lnTo>
+                          <a:lnTo>
+                            <a:pt x="103" y="149"/>
+                          </a:lnTo>
+                          <a:lnTo>
+                            <a:pt x="177" y="46"/>
+                          </a:lnTo>
+                          <a:lnTo>
+                            <a:pt x="242" y="121"/>
+                          </a:lnTo>
+                          <a:lnTo>
+                            <a:pt x="307" y="0"/>
+                          </a:lnTo>
+                          <a:lnTo>
+                            <a:pt x="363" y="111"/>
+                          </a:lnTo>
+                          <a:lnTo>
+                            <a:pt x="363" y="223"/>
+                          </a:lnTo>
+                          <a:lnTo>
+                            <a:pt x="0" y="223"/>
+                          </a:lnTo>
+                          <a:lnTo>
+                            <a:pt x="10" y="130"/>
+                          </a:lnTo>
+                          <a:close/>
+                        </a:path>
+                      </a:pathLst>
+                    </a:custGeom>
+                    <a:solidFill>
+                      <a:schemeClr val="bg1"/>
+                    </a:solidFill>
+                    <a:ln w="12700" cap="flat" cmpd="sng">
+                      <a:solidFill>
+                        <a:schemeClr val="bg1"/>
+                      </a:solidFill>
+                      <a:prstDash val="solid"/>
+                      <a:round/>
+                      <a:headEnd type="none" w="lg" len="med"/>
+                      <a:tailEnd type="none" w="lg" len="med"/>
+                    </a:ln>
+                    <a:effectLst/>
+                  </p:spPr>
+                  <p:txBody>
+                    <a:bodyPr anchor="ctr">
+                      <a:spAutoFit/>
+                    </a:bodyPr>
+                    <a:lstStyle/>
+                    <a:p>
+                      <a:endParaRPr lang="en-US"/>
+                    </a:p>
+                  </p:txBody>
+                </p:sp>
+                <p:grpSp>
+                  <p:nvGrpSpPr>
+                    <p:cNvPr id="169" name="Group 168">
+                      <a:extLst>
+                        <a:ext uri="{FF2B5EF4-FFF2-40B4-BE49-F238E27FC236}">
+                          <a16:creationId xmlns:a16="http://schemas.microsoft.com/office/drawing/2014/main" id="{C729B5B3-8A0E-478F-A76A-62C015590016}"/>
+                        </a:ext>
+                      </a:extLst>
+                    </p:cNvPr>
+                    <p:cNvGrpSpPr/>
+                    <p:nvPr/>
+                  </p:nvGrpSpPr>
+                  <p:grpSpPr>
+                    <a:xfrm>
+                      <a:off x="5553026" y="4491990"/>
+                      <a:ext cx="3497312" cy="613410"/>
+                      <a:chOff x="5553026" y="4491990"/>
+                      <a:chExt cx="3497312" cy="613410"/>
+                    </a:xfrm>
+                  </p:grpSpPr>
+                  <p:grpSp>
+                    <p:nvGrpSpPr>
+                      <p:cNvPr id="196" name="Group 144">
+                        <a:extLst>
+                          <a:ext uri="{FF2B5EF4-FFF2-40B4-BE49-F238E27FC236}">
+                            <a16:creationId xmlns:a16="http://schemas.microsoft.com/office/drawing/2014/main" id="{FA86264D-8509-4566-8CF9-E56904EB0908}"/>
+                          </a:ext>
+                        </a:extLst>
+                      </p:cNvPr>
+                      <p:cNvGrpSpPr>
+                        <a:grpSpLocks/>
+                      </p:cNvGrpSpPr>
+                      <p:nvPr/>
+                    </p:nvGrpSpPr>
+                    <p:grpSpPr bwMode="auto">
+                      <a:xfrm>
+                        <a:off x="5931884" y="4491990"/>
+                        <a:ext cx="3118454" cy="613410"/>
+                        <a:chOff x="1920" y="3764"/>
+                        <a:chExt cx="2848" cy="560"/>
+                      </a:xfrm>
+                    </p:grpSpPr>
+                    <p:sp>
+                      <p:nvSpPr>
+                        <p:cNvPr id="266" name="Line 145 2">
+                          <a:extLst>
+                            <a:ext uri="{FF2B5EF4-FFF2-40B4-BE49-F238E27FC236}">
+                              <a16:creationId xmlns:a16="http://schemas.microsoft.com/office/drawing/2014/main" id="{5A105E5B-D2C1-46B0-B990-3BE146D57E23}"/>
+                            </a:ext>
+                          </a:extLst>
+                        </p:cNvPr>
+                        <p:cNvSpPr>
+                          <a:spLocks noChangeShapeType="1"/>
+                        </p:cNvSpPr>
+                        <p:nvPr/>
+                      </p:nvSpPr>
+                      <p:spPr bwMode="auto">
+                        <a:xfrm flipH="1">
+                          <a:off x="1920" y="3768"/>
+                          <a:ext cx="2468" cy="0"/>
+                        </a:xfrm>
+                        <a:prstGeom prst="line">
+                          <a:avLst/>
+                        </a:prstGeom>
+                        <a:noFill/>
+                        <a:ln w="12700">
+                          <a:solidFill>
+                            <a:schemeClr val="tx1"/>
+                          </a:solidFill>
+                          <a:round/>
+                          <a:headEnd type="none" w="lg" len="med"/>
+                          <a:tailEnd type="none" w="lg" len="med"/>
+                        </a:ln>
+                        <a:effectLst/>
+                      </p:spPr>
+                      <p:txBody>
+                        <a:bodyPr wrap="none" anchor="ctr">
+                          <a:spAutoFit/>
+                        </a:bodyPr>
+                        <a:lstStyle/>
+                        <a:p>
+                          <a:endParaRPr lang="en-US"/>
+                        </a:p>
+                      </p:txBody>
+                    </p:sp>
+                    <p:sp>
+                      <p:nvSpPr>
+                        <p:cNvPr id="267" name="Line 146 2">
+                          <a:extLst>
+                            <a:ext uri="{FF2B5EF4-FFF2-40B4-BE49-F238E27FC236}">
+                              <a16:creationId xmlns:a16="http://schemas.microsoft.com/office/drawing/2014/main" id="{5CDD7E09-977C-4102-8221-DDFB30BD0238}"/>
+                            </a:ext>
+                          </a:extLst>
+                        </p:cNvPr>
+                        <p:cNvSpPr>
+                          <a:spLocks noChangeShapeType="1"/>
+                        </p:cNvSpPr>
+                        <p:nvPr/>
+                      </p:nvSpPr>
+                      <p:spPr bwMode="auto">
+                        <a:xfrm flipH="1">
+                          <a:off x="1920" y="3928"/>
+                          <a:ext cx="2468" cy="0"/>
+                        </a:xfrm>
+                        <a:prstGeom prst="line">
+                          <a:avLst/>
+                        </a:prstGeom>
+                        <a:noFill/>
+                        <a:ln w="12700">
+                          <a:solidFill>
+                            <a:schemeClr val="tx1"/>
+                          </a:solidFill>
+                          <a:round/>
+                          <a:headEnd type="none" w="lg" len="med"/>
+                          <a:tailEnd type="none" w="lg" len="med"/>
+                        </a:ln>
+                        <a:effectLst/>
+                      </p:spPr>
+                      <p:txBody>
+                        <a:bodyPr wrap="none" anchor="ctr">
+                          <a:spAutoFit/>
+                        </a:bodyPr>
+                        <a:lstStyle/>
+                        <a:p>
+                          <a:endParaRPr lang="en-US"/>
+                        </a:p>
+                      </p:txBody>
+                    </p:sp>
+                    <p:grpSp>
+                      <p:nvGrpSpPr>
+                        <p:cNvPr id="268" name="Group 147">
+                          <a:extLst>
+                            <a:ext uri="{FF2B5EF4-FFF2-40B4-BE49-F238E27FC236}">
+                              <a16:creationId xmlns:a16="http://schemas.microsoft.com/office/drawing/2014/main" id="{883ABB80-0902-4AEC-8C02-48111C33D9B2}"/>
+                            </a:ext>
+                          </a:extLst>
+                        </p:cNvPr>
+                        <p:cNvGrpSpPr>
+                          <a:grpSpLocks/>
+                        </p:cNvGrpSpPr>
+                        <p:nvPr/>
+                      </p:nvGrpSpPr>
+                      <p:grpSpPr bwMode="auto">
+                        <a:xfrm>
+                          <a:off x="4380" y="3764"/>
+                          <a:ext cx="388" cy="388"/>
+                          <a:chOff x="4380" y="3764"/>
+                          <a:chExt cx="388" cy="388"/>
+                        </a:xfrm>
+                      </p:grpSpPr>
+                      <p:sp>
+                        <p:nvSpPr>
+                          <p:cNvPr id="271" name="Arc 148 2">
+                            <a:extLst>
+                              <a:ext uri="{FF2B5EF4-FFF2-40B4-BE49-F238E27FC236}">
+                                <a16:creationId xmlns:a16="http://schemas.microsoft.com/office/drawing/2014/main" id="{20230A66-C4FD-4F79-B227-1CF35C752BCB}"/>
+                              </a:ext>
+                            </a:extLst>
+                          </p:cNvPr>
+                          <p:cNvSpPr>
+                            <a:spLocks/>
+                          </p:cNvSpPr>
+                          <p:nvPr/>
+                        </p:nvSpPr>
+                        <p:spPr bwMode="auto">
+                          <a:xfrm>
+                            <a:off x="4380" y="3764"/>
+                            <a:ext cx="388" cy="388"/>
+                          </a:xfrm>
+                          <a:custGeom>
+                            <a:avLst/>
+                            <a:gdLst>
+                              <a:gd name="G0" fmla="+- 0 0 0"/>
+                              <a:gd name="G1" fmla="+- 21600 0 0"/>
+                              <a:gd name="G2" fmla="+- 21600 0 0"/>
+                              <a:gd name="T0" fmla="*/ 0 w 21600"/>
+                              <a:gd name="T1" fmla="*/ 0 h 21600"/>
+                              <a:gd name="T2" fmla="*/ 21600 w 21600"/>
+                              <a:gd name="T3" fmla="*/ 21600 h 21600"/>
+                              <a:gd name="T4" fmla="*/ 0 w 21600"/>
+                              <a:gd name="T5" fmla="*/ 21600 h 21600"/>
+                            </a:gdLst>
+                            <a:ahLst/>
+                            <a:cxnLst>
+                              <a:cxn ang="0">
+                                <a:pos x="T0" y="T1"/>
+                              </a:cxn>
+                              <a:cxn ang="0">
+                                <a:pos x="T2" y="T3"/>
+                              </a:cxn>
+                              <a:cxn ang="0">
+                                <a:pos x="T4" y="T5"/>
+                              </a:cxn>
+                            </a:cxnLst>
+                            <a:rect l="0" t="0" r="r" b="b"/>
+                            <a:pathLst>
+                              <a:path w="21600" h="21600" fill="none" extrusionOk="0">
+                                <a:moveTo>
+                                  <a:pt x="-1" y="0"/>
+                                </a:moveTo>
+                                <a:cubicBezTo>
+                                  <a:pt x="11929" y="0"/>
+                                  <a:pt x="21600" y="9670"/>
+                                  <a:pt x="21600" y="21600"/>
+                                </a:cubicBezTo>
+                              </a:path>
+                              <a:path w="21600" h="21600" stroke="0" extrusionOk="0">
+                                <a:moveTo>
+                                  <a:pt x="-1" y="0"/>
+                                </a:moveTo>
+                                <a:cubicBezTo>
+                                  <a:pt x="11929" y="0"/>
+                                  <a:pt x="21600" y="9670"/>
+                                  <a:pt x="21600" y="21600"/>
+                                </a:cubicBezTo>
+                                <a:lnTo>
+                                  <a:pt x="0" y="21600"/>
+                                </a:lnTo>
+                                <a:close/>
+                              </a:path>
+                            </a:pathLst>
+                          </a:custGeom>
+                          <a:noFill/>
+                          <a:ln w="12700">
+                            <a:solidFill>
+                              <a:schemeClr val="tx1"/>
+                            </a:solidFill>
+                            <a:round/>
+                            <a:headEnd type="none" w="lg" len="med"/>
+                            <a:tailEnd type="none" w="lg" len="med"/>
+                          </a:ln>
+                          <a:effectLst/>
+                        </p:spPr>
+                        <p:txBody>
+                          <a:bodyPr anchor="ctr">
+                            <a:spAutoFit/>
+                          </a:bodyPr>
+                          <a:lstStyle/>
+                          <a:p>
+                            <a:endParaRPr lang="en-US"/>
+                          </a:p>
+                        </p:txBody>
+                      </p:sp>
+                      <p:sp>
+                        <p:nvSpPr>
+                          <p:cNvPr id="272" name="Arc 149 2">
+                            <a:extLst>
+                              <a:ext uri="{FF2B5EF4-FFF2-40B4-BE49-F238E27FC236}">
+                                <a16:creationId xmlns:a16="http://schemas.microsoft.com/office/drawing/2014/main" id="{E7FCD511-C590-481E-AE59-F378317576B6}"/>
+                              </a:ext>
+                            </a:extLst>
+                          </p:cNvPr>
+                          <p:cNvSpPr>
+                            <a:spLocks/>
+                          </p:cNvSpPr>
+                          <p:nvPr/>
+                        </p:nvSpPr>
+                        <p:spPr bwMode="auto">
+                          <a:xfrm>
+                            <a:off x="4380" y="3924"/>
+                            <a:ext cx="228" cy="228"/>
+                          </a:xfrm>
+                          <a:custGeom>
+                            <a:avLst/>
+                            <a:gdLst>
+                              <a:gd name="G0" fmla="+- 0 0 0"/>
+                              <a:gd name="G1" fmla="+- 21600 0 0"/>
+                              <a:gd name="G2" fmla="+- 21600 0 0"/>
+                              <a:gd name="T0" fmla="*/ 0 w 21600"/>
+                              <a:gd name="T1" fmla="*/ 0 h 21600"/>
+                              <a:gd name="T2" fmla="*/ 21600 w 21600"/>
+                              <a:gd name="T3" fmla="*/ 21600 h 21600"/>
+                              <a:gd name="T4" fmla="*/ 0 w 21600"/>
+                              <a:gd name="T5" fmla="*/ 21600 h 21600"/>
+                            </a:gdLst>
+                            <a:ahLst/>
+                            <a:cxnLst>
+                              <a:cxn ang="0">
+                                <a:pos x="T0" y="T1"/>
+                              </a:cxn>
+                              <a:cxn ang="0">
+                                <a:pos x="T2" y="T3"/>
+                              </a:cxn>
+                              <a:cxn ang="0">
+                                <a:pos x="T4" y="T5"/>
+                              </a:cxn>
+                            </a:cxnLst>
+                            <a:rect l="0" t="0" r="r" b="b"/>
+                            <a:pathLst>
+                              <a:path w="21600" h="21600" fill="none" extrusionOk="0">
+                                <a:moveTo>
+                                  <a:pt x="-1" y="0"/>
+                                </a:moveTo>
+                                <a:cubicBezTo>
+                                  <a:pt x="11929" y="0"/>
+                                  <a:pt x="21600" y="9670"/>
+                                  <a:pt x="21600" y="21600"/>
+                                </a:cubicBezTo>
+                              </a:path>
+                              <a:path w="21600" h="21600" stroke="0" extrusionOk="0">
+                                <a:moveTo>
+                                  <a:pt x="-1" y="0"/>
+                                </a:moveTo>
+                                <a:cubicBezTo>
+                                  <a:pt x="11929" y="0"/>
+                                  <a:pt x="21600" y="9670"/>
+                                  <a:pt x="21600" y="21600"/>
+                                </a:cubicBezTo>
+                                <a:lnTo>
+                                  <a:pt x="0" y="21600"/>
+                                </a:lnTo>
+                                <a:close/>
+                              </a:path>
+                            </a:pathLst>
+                          </a:custGeom>
+                          <a:noFill/>
+                          <a:ln w="12700">
+                            <a:solidFill>
+                              <a:schemeClr val="tx1"/>
+                            </a:solidFill>
+                            <a:round/>
+                            <a:headEnd type="none" w="lg" len="med"/>
+                            <a:tailEnd type="none" w="lg" len="med"/>
+                          </a:ln>
+                          <a:effectLst/>
+                        </p:spPr>
+                        <p:txBody>
+                          <a:bodyPr anchor="ctr">
+                            <a:spAutoFit/>
+                          </a:bodyPr>
+                          <a:lstStyle/>
+                          <a:p>
+                            <a:endParaRPr lang="en-US"/>
+                          </a:p>
+                        </p:txBody>
+                      </p:sp>
+                    </p:grpSp>
+                    <p:sp>
+                      <p:nvSpPr>
+                        <p:cNvPr id="269" name="Line 150 2">
+                          <a:extLst>
+                            <a:ext uri="{FF2B5EF4-FFF2-40B4-BE49-F238E27FC236}">
+                              <a16:creationId xmlns:a16="http://schemas.microsoft.com/office/drawing/2014/main" id="{18DD0D56-BB34-44B1-AAE8-EE39FFFB636C}"/>
+                            </a:ext>
+                          </a:extLst>
+                        </p:cNvPr>
+                        <p:cNvSpPr>
+                          <a:spLocks noChangeShapeType="1"/>
+                        </p:cNvSpPr>
+                        <p:nvPr/>
+                      </p:nvSpPr>
+                      <p:spPr bwMode="auto">
+                        <a:xfrm>
+                          <a:off x="4608" y="4140"/>
+                          <a:ext cx="0" cy="180"/>
+                        </a:xfrm>
+                        <a:prstGeom prst="line">
+                          <a:avLst/>
+                        </a:prstGeom>
+                        <a:noFill/>
+                        <a:ln w="12700">
+                          <a:solidFill>
+                            <a:schemeClr val="tx1"/>
+                          </a:solidFill>
+                          <a:round/>
+                          <a:headEnd type="none" w="lg" len="med"/>
+                          <a:tailEnd type="none" w="lg" len="med"/>
+                        </a:ln>
+                        <a:effectLst/>
+                      </p:spPr>
+                      <p:txBody>
+                        <a:bodyPr wrap="none" anchor="ctr">
+                          <a:spAutoFit/>
+                        </a:bodyPr>
+                        <a:lstStyle/>
+                        <a:p>
+                          <a:endParaRPr lang="en-US"/>
+                        </a:p>
+                      </p:txBody>
+                    </p:sp>
+                    <p:sp>
+                      <p:nvSpPr>
+                        <p:cNvPr id="270" name="Line 151 2">
+                          <a:extLst>
+                            <a:ext uri="{FF2B5EF4-FFF2-40B4-BE49-F238E27FC236}">
+                              <a16:creationId xmlns:a16="http://schemas.microsoft.com/office/drawing/2014/main" id="{7C300C4C-D24A-49FF-8C6A-521655CC16C5}"/>
+                            </a:ext>
+                          </a:extLst>
+                        </p:cNvPr>
+                        <p:cNvSpPr>
+                          <a:spLocks noChangeShapeType="1"/>
+                        </p:cNvSpPr>
+                        <p:nvPr/>
+                      </p:nvSpPr>
+                      <p:spPr bwMode="auto">
+                        <a:xfrm>
+                          <a:off x="4768" y="4144"/>
+                          <a:ext cx="0" cy="180"/>
+                        </a:xfrm>
+                        <a:prstGeom prst="line">
+                          <a:avLst/>
+                        </a:prstGeom>
+                        <a:noFill/>
+                        <a:ln w="12700">
+                          <a:solidFill>
+                            <a:schemeClr val="tx1"/>
+                          </a:solidFill>
+                          <a:round/>
+                          <a:headEnd type="none" w="lg" len="med"/>
+                          <a:tailEnd type="none" w="lg" len="med"/>
+                        </a:ln>
+                        <a:effectLst/>
+                      </p:spPr>
+                      <p:txBody>
+                        <a:bodyPr wrap="none" anchor="ctr">
+                          <a:spAutoFit/>
+                        </a:bodyPr>
+                        <a:lstStyle/>
+                        <a:p>
+                          <a:endParaRPr lang="en-US"/>
+                        </a:p>
+                      </p:txBody>
+                    </p:sp>
+                  </p:grpSp>
+                  <p:sp>
+                    <p:nvSpPr>
+                      <p:cNvPr id="202" name="Arc 164 2">
+                        <a:extLst>
+                          <a:ext uri="{FF2B5EF4-FFF2-40B4-BE49-F238E27FC236}">
+                            <a16:creationId xmlns:a16="http://schemas.microsoft.com/office/drawing/2014/main" id="{506BFD1A-448A-4B68-A481-C40F136B6AB0}"/>
+                          </a:ext>
+                        </a:extLst>
+                      </p:cNvPr>
+                      <p:cNvSpPr>
+                        <a:spLocks/>
+                      </p:cNvSpPr>
+                      <p:nvPr/>
+                    </p:nvSpPr>
+                    <p:spPr bwMode="auto">
+                      <a:xfrm flipH="1">
+                        <a:off x="5553026" y="4495276"/>
+                        <a:ext cx="378857" cy="553164"/>
+                      </a:xfrm>
+                      <a:custGeom>
+                        <a:avLst/>
+                        <a:gdLst>
+                          <a:gd name="G0" fmla="+- 0 0 0"/>
+                          <a:gd name="G1" fmla="+- 21600 0 0"/>
+                          <a:gd name="G2" fmla="+- 21600 0 0"/>
+                          <a:gd name="T0" fmla="*/ 0 w 21600"/>
+                          <a:gd name="T1" fmla="*/ 0 h 21600"/>
+                          <a:gd name="T2" fmla="*/ 21600 w 21600"/>
+                          <a:gd name="T3" fmla="*/ 21600 h 21600"/>
+                          <a:gd name="T4" fmla="*/ 0 w 21600"/>
+                          <a:gd name="T5" fmla="*/ 21600 h 21600"/>
+                        </a:gdLst>
+                        <a:ahLst/>
+                        <a:cxnLst>
+                          <a:cxn ang="0">
+                            <a:pos x="T0" y="T1"/>
+                          </a:cxn>
+                          <a:cxn ang="0">
+                            <a:pos x="T2" y="T3"/>
+                          </a:cxn>
+                          <a:cxn ang="0">
+                            <a:pos x="T4" y="T5"/>
+                          </a:cxn>
+                        </a:cxnLst>
+                        <a:rect l="0" t="0" r="r" b="b"/>
+                        <a:pathLst>
+                          <a:path w="21600" h="21600" fill="none" extrusionOk="0">
+                            <a:moveTo>
+                              <a:pt x="-1" y="0"/>
+                            </a:moveTo>
+                            <a:cubicBezTo>
+                              <a:pt x="11929" y="0"/>
+                              <a:pt x="21600" y="9670"/>
+                              <a:pt x="21600" y="21600"/>
+                            </a:cubicBezTo>
+                          </a:path>
+                          <a:path w="21600" h="21600" stroke="0" extrusionOk="0">
+                            <a:moveTo>
+                              <a:pt x="-1" y="0"/>
+                            </a:moveTo>
+                            <a:cubicBezTo>
+                              <a:pt x="11929" y="0"/>
+                              <a:pt x="21600" y="9670"/>
+                              <a:pt x="21600" y="21600"/>
+                            </a:cubicBezTo>
+                            <a:lnTo>
+                              <a:pt x="0" y="21600"/>
+                            </a:lnTo>
+                            <a:close/>
+                          </a:path>
+                        </a:pathLst>
+                      </a:custGeom>
+                      <a:noFill/>
+                      <a:ln w="6350">
+                        <a:solidFill>
+                          <a:schemeClr val="hlink"/>
+                        </a:solidFill>
+                        <a:round/>
+                        <a:headEnd type="none" w="lg" len="med"/>
+                        <a:tailEnd type="none" w="lg" len="med"/>
+                      </a:ln>
+                      <a:effectLst/>
+                    </p:spPr>
+                    <p:txBody>
+                      <a:bodyPr anchor="ctr">
+                        <a:spAutoFit/>
+                      </a:bodyPr>
+                      <a:lstStyle/>
+                      <a:p>
+                        <a:endParaRPr lang="en-US"/>
+                      </a:p>
+                    </p:txBody>
+                  </p:sp>
+                  <p:sp>
+                    <p:nvSpPr>
+                      <p:cNvPr id="230" name="Arc 165 2">
+                        <a:extLst>
+                          <a:ext uri="{FF2B5EF4-FFF2-40B4-BE49-F238E27FC236}">
+                            <a16:creationId xmlns:a16="http://schemas.microsoft.com/office/drawing/2014/main" id="{86BF2795-9366-41DA-B4CB-BA9AB0DE6B1B}"/>
+                          </a:ext>
+                        </a:extLst>
+                      </p:cNvPr>
+                      <p:cNvSpPr>
+                        <a:spLocks/>
+                      </p:cNvSpPr>
+                      <p:nvPr/>
+                    </p:nvSpPr>
+                    <p:spPr bwMode="auto">
+                      <a:xfrm flipH="1">
+                        <a:off x="5651573" y="4673822"/>
+                        <a:ext cx="280311" cy="377904"/>
+                      </a:xfrm>
+                      <a:custGeom>
+                        <a:avLst/>
+                        <a:gdLst>
+                          <a:gd name="G0" fmla="+- 0 0 0"/>
+                          <a:gd name="G1" fmla="+- 21600 0 0"/>
+                          <a:gd name="G2" fmla="+- 21600 0 0"/>
+                          <a:gd name="T0" fmla="*/ 0 w 21600"/>
+                          <a:gd name="T1" fmla="*/ 0 h 21600"/>
+                          <a:gd name="T2" fmla="*/ 21600 w 21600"/>
+                          <a:gd name="T3" fmla="*/ 21600 h 21600"/>
+                          <a:gd name="T4" fmla="*/ 0 w 21600"/>
+                          <a:gd name="T5" fmla="*/ 21600 h 21600"/>
+                        </a:gdLst>
+                        <a:ahLst/>
+                        <a:cxnLst>
+                          <a:cxn ang="0">
+                            <a:pos x="T0" y="T1"/>
+                          </a:cxn>
+                          <a:cxn ang="0">
+                            <a:pos x="T2" y="T3"/>
+                          </a:cxn>
+                          <a:cxn ang="0">
+                            <a:pos x="T4" y="T5"/>
+                          </a:cxn>
+                        </a:cxnLst>
+                        <a:rect l="0" t="0" r="r" b="b"/>
+                        <a:pathLst>
+                          <a:path w="21600" h="21600" fill="none" extrusionOk="0">
+                            <a:moveTo>
+                              <a:pt x="-1" y="0"/>
+                            </a:moveTo>
+                            <a:cubicBezTo>
+                              <a:pt x="11929" y="0"/>
+                              <a:pt x="21600" y="9670"/>
+                              <a:pt x="21600" y="21600"/>
+                            </a:cubicBezTo>
+                          </a:path>
+                          <a:path w="21600" h="21600" stroke="0" extrusionOk="0">
+                            <a:moveTo>
+                              <a:pt x="-1" y="0"/>
+                            </a:moveTo>
+                            <a:cubicBezTo>
+                              <a:pt x="11929" y="0"/>
+                              <a:pt x="21600" y="9670"/>
+                              <a:pt x="21600" y="21600"/>
+                            </a:cubicBezTo>
+                            <a:lnTo>
+                              <a:pt x="0" y="21600"/>
+                            </a:lnTo>
+                            <a:close/>
+                          </a:path>
+                        </a:pathLst>
+                      </a:custGeom>
+                      <a:noFill/>
+                      <a:ln w="6350">
+                        <a:solidFill>
+                          <a:schemeClr val="hlink"/>
+                        </a:solidFill>
+                        <a:round/>
+                        <a:headEnd type="none" w="lg" len="med"/>
+                        <a:tailEnd type="none" w="lg" len="med"/>
+                      </a:ln>
+                      <a:effectLst/>
+                    </p:spPr>
+                    <p:txBody>
+                      <a:bodyPr anchor="ctr">
+                        <a:spAutoFit/>
+                      </a:bodyPr>
+                      <a:lstStyle/>
+                      <a:p>
+                        <a:endParaRPr lang="en-US"/>
+                      </a:p>
+                    </p:txBody>
+                  </p:sp>
+                  <p:sp>
+                    <p:nvSpPr>
+                      <p:cNvPr id="231" name="Arc 166 2">
+                        <a:extLst>
+                          <a:ext uri="{FF2B5EF4-FFF2-40B4-BE49-F238E27FC236}">
+                            <a16:creationId xmlns:a16="http://schemas.microsoft.com/office/drawing/2014/main" id="{64E52C09-EC7D-4568-816E-E84C6A30F304}"/>
+                          </a:ext>
+                        </a:extLst>
+                      </p:cNvPr>
+                      <p:cNvSpPr>
+                        <a:spLocks/>
+                      </p:cNvSpPr>
+                      <p:nvPr/>
+                    </p:nvSpPr>
+                    <p:spPr bwMode="auto">
+                      <a:xfrm flipH="1">
+                        <a:off x="5628579" y="4627816"/>
+                        <a:ext cx="296735" cy="420624"/>
+                      </a:xfrm>
+                      <a:custGeom>
+                        <a:avLst/>
+                        <a:gdLst>
+                          <a:gd name="G0" fmla="+- 0 0 0"/>
+                          <a:gd name="G1" fmla="+- 21600 0 0"/>
+                          <a:gd name="G2" fmla="+- 21600 0 0"/>
+                          <a:gd name="T0" fmla="*/ 0 w 21600"/>
+                          <a:gd name="T1" fmla="*/ 0 h 21600"/>
+                          <a:gd name="T2" fmla="*/ 21600 w 21600"/>
+                          <a:gd name="T3" fmla="*/ 21600 h 21600"/>
+                          <a:gd name="T4" fmla="*/ 0 w 21600"/>
+                          <a:gd name="T5" fmla="*/ 21600 h 21600"/>
+                        </a:gdLst>
+                        <a:ahLst/>
+                        <a:cxnLst>
+                          <a:cxn ang="0">
+                            <a:pos x="T0" y="T1"/>
+                          </a:cxn>
+                          <a:cxn ang="0">
+                            <a:pos x="T2" y="T3"/>
+                          </a:cxn>
+                          <a:cxn ang="0">
+                            <a:pos x="T4" y="T5"/>
+                          </a:cxn>
+                        </a:cxnLst>
+                        <a:rect l="0" t="0" r="r" b="b"/>
+                        <a:pathLst>
+                          <a:path w="21600" h="21600" fill="none" extrusionOk="0">
+                            <a:moveTo>
+                              <a:pt x="-1" y="0"/>
+                            </a:moveTo>
+                            <a:cubicBezTo>
+                              <a:pt x="11929" y="0"/>
+                              <a:pt x="21600" y="9670"/>
+                              <a:pt x="21600" y="21600"/>
+                            </a:cubicBezTo>
+                          </a:path>
+                          <a:path w="21600" h="21600" stroke="0" extrusionOk="0">
+                            <a:moveTo>
+                              <a:pt x="-1" y="0"/>
+                            </a:moveTo>
+                            <a:cubicBezTo>
+                              <a:pt x="11929" y="0"/>
+                              <a:pt x="21600" y="9670"/>
+                              <a:pt x="21600" y="21600"/>
+                            </a:cubicBezTo>
+                            <a:lnTo>
+                              <a:pt x="0" y="21600"/>
+                            </a:lnTo>
+                            <a:close/>
+                          </a:path>
+                        </a:pathLst>
+                      </a:custGeom>
+                      <a:noFill/>
+                      <a:ln w="6350">
+                        <a:solidFill>
+                          <a:schemeClr val="hlink"/>
+                        </a:solidFill>
+                        <a:round/>
+                        <a:headEnd type="none" w="lg" len="med"/>
+                        <a:tailEnd type="none" w="lg" len="med"/>
+                      </a:ln>
+                      <a:effectLst/>
+                    </p:spPr>
+                    <p:txBody>
+                      <a:bodyPr anchor="ctr">
+                        <a:spAutoFit/>
+                      </a:bodyPr>
+                      <a:lstStyle/>
+                      <a:p>
+                        <a:endParaRPr lang="en-US"/>
+                      </a:p>
+                    </p:txBody>
+                  </p:sp>
+                  <p:sp>
+                    <p:nvSpPr>
+                      <p:cNvPr id="232" name="Arc 167 2">
+                        <a:extLst>
+                          <a:ext uri="{FF2B5EF4-FFF2-40B4-BE49-F238E27FC236}">
+                            <a16:creationId xmlns:a16="http://schemas.microsoft.com/office/drawing/2014/main" id="{88091511-FABE-45F4-8138-9C6DE9E2E7BB}"/>
+                          </a:ext>
+                        </a:extLst>
+                      </p:cNvPr>
+                      <p:cNvSpPr>
+                        <a:spLocks/>
+                      </p:cNvSpPr>
+                      <p:nvPr/>
+                    </p:nvSpPr>
+                    <p:spPr bwMode="auto">
+                      <a:xfrm flipH="1">
+                        <a:off x="5608870" y="4588383"/>
+                        <a:ext cx="313159" cy="460058"/>
+                      </a:xfrm>
+                      <a:custGeom>
+                        <a:avLst/>
+                        <a:gdLst>
+                          <a:gd name="G0" fmla="+- 0 0 0"/>
+                          <a:gd name="G1" fmla="+- 21600 0 0"/>
+                          <a:gd name="G2" fmla="+- 21600 0 0"/>
+                          <a:gd name="T0" fmla="*/ 0 w 21600"/>
+                          <a:gd name="T1" fmla="*/ 0 h 21600"/>
+                          <a:gd name="T2" fmla="*/ 21600 w 21600"/>
+                          <a:gd name="T3" fmla="*/ 21600 h 21600"/>
+                          <a:gd name="T4" fmla="*/ 0 w 21600"/>
+                          <a:gd name="T5" fmla="*/ 21600 h 21600"/>
+                        </a:gdLst>
+                        <a:ahLst/>
+                        <a:cxnLst>
+                          <a:cxn ang="0">
+                            <a:pos x="T0" y="T1"/>
+                          </a:cxn>
+                          <a:cxn ang="0">
+                            <a:pos x="T2" y="T3"/>
+                          </a:cxn>
+                          <a:cxn ang="0">
+                            <a:pos x="T4" y="T5"/>
+                          </a:cxn>
+                        </a:cxnLst>
+                        <a:rect l="0" t="0" r="r" b="b"/>
+                        <a:pathLst>
+                          <a:path w="21600" h="21600" fill="none" extrusionOk="0">
+                            <a:moveTo>
+                              <a:pt x="-1" y="0"/>
+                            </a:moveTo>
+                            <a:cubicBezTo>
+                              <a:pt x="11929" y="0"/>
+                              <a:pt x="21600" y="9670"/>
+                              <a:pt x="21600" y="21600"/>
+                            </a:cubicBezTo>
+                          </a:path>
+                          <a:path w="21600" h="21600" stroke="0" extrusionOk="0">
+                            <a:moveTo>
+                              <a:pt x="-1" y="0"/>
+                            </a:moveTo>
+                            <a:cubicBezTo>
+                              <a:pt x="11929" y="0"/>
+                              <a:pt x="21600" y="9670"/>
+                              <a:pt x="21600" y="21600"/>
+                            </a:cubicBezTo>
+                            <a:lnTo>
+                              <a:pt x="0" y="21600"/>
+                            </a:lnTo>
+                            <a:close/>
+                          </a:path>
+                        </a:pathLst>
+                      </a:custGeom>
+                      <a:noFill/>
+                      <a:ln w="6350">
+                        <a:solidFill>
+                          <a:schemeClr val="hlink"/>
+                        </a:solidFill>
+                        <a:round/>
+                        <a:headEnd type="none" w="lg" len="med"/>
+                        <a:tailEnd type="none" w="lg" len="med"/>
+                      </a:ln>
+                      <a:effectLst/>
+                    </p:spPr>
+                    <p:txBody>
+                      <a:bodyPr anchor="ctr">
+                        <a:spAutoFit/>
+                      </a:bodyPr>
+                      <a:lstStyle/>
+                      <a:p>
+                        <a:endParaRPr lang="en-US"/>
+                      </a:p>
+                    </p:txBody>
+                  </p:sp>
+                  <p:sp>
+                    <p:nvSpPr>
+                      <p:cNvPr id="264" name="Arc 168 2">
+                        <a:extLst>
+                          <a:ext uri="{FF2B5EF4-FFF2-40B4-BE49-F238E27FC236}">
+                            <a16:creationId xmlns:a16="http://schemas.microsoft.com/office/drawing/2014/main" id="{9F8F8208-0120-4F5F-B98E-38FDC23E6189}"/>
+                          </a:ext>
+                        </a:extLst>
+                      </p:cNvPr>
+                      <p:cNvSpPr>
+                        <a:spLocks/>
+                      </p:cNvSpPr>
+                      <p:nvPr/>
+                    </p:nvSpPr>
+                    <p:spPr bwMode="auto">
+                      <a:xfrm flipH="1">
+                        <a:off x="5585875" y="4548949"/>
+                        <a:ext cx="332869" cy="496205"/>
+                      </a:xfrm>
+                      <a:custGeom>
+                        <a:avLst/>
+                        <a:gdLst>
+                          <a:gd name="G0" fmla="+- 0 0 0"/>
+                          <a:gd name="G1" fmla="+- 21600 0 0"/>
+                          <a:gd name="G2" fmla="+- 21600 0 0"/>
+                          <a:gd name="T0" fmla="*/ 0 w 21600"/>
+                          <a:gd name="T1" fmla="*/ 0 h 21600"/>
+                          <a:gd name="T2" fmla="*/ 21600 w 21600"/>
+                          <a:gd name="T3" fmla="*/ 21600 h 21600"/>
+                          <a:gd name="T4" fmla="*/ 0 w 21600"/>
+                          <a:gd name="T5" fmla="*/ 21600 h 21600"/>
+                        </a:gdLst>
+                        <a:ahLst/>
+                        <a:cxnLst>
+                          <a:cxn ang="0">
+                            <a:pos x="T0" y="T1"/>
+                          </a:cxn>
+                          <a:cxn ang="0">
+                            <a:pos x="T2" y="T3"/>
+                          </a:cxn>
+                          <a:cxn ang="0">
+                            <a:pos x="T4" y="T5"/>
+                          </a:cxn>
+                        </a:cxnLst>
+                        <a:rect l="0" t="0" r="r" b="b"/>
+                        <a:pathLst>
+                          <a:path w="21600" h="21600" fill="none" extrusionOk="0">
+                            <a:moveTo>
+                              <a:pt x="-1" y="0"/>
+                            </a:moveTo>
+                            <a:cubicBezTo>
+                              <a:pt x="11929" y="0"/>
+                              <a:pt x="21600" y="9670"/>
+                              <a:pt x="21600" y="21600"/>
+                            </a:cubicBezTo>
+                          </a:path>
+                          <a:path w="21600" h="21600" stroke="0" extrusionOk="0">
+                            <a:moveTo>
+                              <a:pt x="-1" y="0"/>
+                            </a:moveTo>
+                            <a:cubicBezTo>
+                              <a:pt x="11929" y="0"/>
+                              <a:pt x="21600" y="9670"/>
+                              <a:pt x="21600" y="21600"/>
+                            </a:cubicBezTo>
+                            <a:lnTo>
+                              <a:pt x="0" y="21600"/>
+                            </a:lnTo>
+                            <a:close/>
+                          </a:path>
+                        </a:pathLst>
+                      </a:custGeom>
+                      <a:noFill/>
+                      <a:ln w="6350">
+                        <a:solidFill>
+                          <a:schemeClr val="hlink"/>
+                        </a:solidFill>
+                        <a:round/>
+                        <a:headEnd type="none" w="lg" len="med"/>
+                        <a:tailEnd type="none" w="lg" len="med"/>
+                      </a:ln>
+                      <a:effectLst/>
+                    </p:spPr>
+                    <p:txBody>
+                      <a:bodyPr anchor="ctr">
+                        <a:spAutoFit/>
+                      </a:bodyPr>
+                      <a:lstStyle/>
+                      <a:p>
+                        <a:endParaRPr lang="en-US" dirty="0"/>
+                      </a:p>
+                    </p:txBody>
+                  </p:sp>
+                  <p:sp>
+                    <p:nvSpPr>
+                      <p:cNvPr id="265" name="Rectangle 189 2">
+                        <a:extLst>
+                          <a:ext uri="{FF2B5EF4-FFF2-40B4-BE49-F238E27FC236}">
+                            <a16:creationId xmlns:a16="http://schemas.microsoft.com/office/drawing/2014/main" id="{8FF037D6-A197-41F4-85B5-5E724431225F}"/>
+                          </a:ext>
+                        </a:extLst>
+                      </p:cNvPr>
+                      <p:cNvSpPr>
+                        <a:spLocks noChangeArrowheads="1"/>
+                      </p:cNvSpPr>
+                      <p:nvPr/>
+                    </p:nvSpPr>
+                    <p:spPr bwMode="auto">
+                      <a:xfrm>
+                        <a:off x="8252110" y="4505134"/>
+                        <a:ext cx="394187" cy="157734"/>
+                      </a:xfrm>
+                      <a:prstGeom prst="rect">
+                        <a:avLst/>
+                      </a:prstGeom>
+                      <a:solidFill>
+                        <a:schemeClr val="bg1"/>
+                      </a:solidFill>
+                      <a:ln w="12700">
+                        <a:solidFill>
+                          <a:schemeClr val="bg1"/>
+                        </a:solidFill>
+                        <a:miter lim="800000"/>
+                        <a:headEnd type="none" w="lg" len="med"/>
+                        <a:tailEnd type="none" w="lg" len="med"/>
+                      </a:ln>
+                      <a:effectLst/>
+                    </p:spPr>
+                    <p:txBody>
+                      <a:bodyPr anchor="ctr">
+                        <a:spAutoFit/>
+                      </a:bodyPr>
+                      <a:lstStyle/>
+                      <a:p>
+                        <a:endParaRPr lang="en-US"/>
+                      </a:p>
+                    </p:txBody>
+                  </p:sp>
+                </p:grpSp>
+                <p:sp>
+                  <p:nvSpPr>
+                    <p:cNvPr id="170" name="Rectangle 190 2">
+                      <a:extLst>
+                        <a:ext uri="{FF2B5EF4-FFF2-40B4-BE49-F238E27FC236}">
+                          <a16:creationId xmlns:a16="http://schemas.microsoft.com/office/drawing/2014/main" id="{140F3573-15F4-4B34-9C3E-E7CBF27A3314}"/>
+                        </a:ext>
+                      </a:extLst>
+                    </p:cNvPr>
+                    <p:cNvSpPr>
+                      <a:spLocks noChangeArrowheads="1"/>
+                    </p:cNvSpPr>
+                    <p:nvPr/>
+                  </p:nvSpPr>
+                  <p:spPr bwMode="auto">
+                    <a:xfrm>
+                      <a:off x="7314822" y="3754819"/>
+                      <a:ext cx="32849" cy="319850"/>
+                    </a:xfrm>
+                    <a:prstGeom prst="rect">
+                      <a:avLst/>
+                    </a:prstGeom>
+                    <a:solidFill>
+                      <a:schemeClr val="bg1"/>
+                    </a:solidFill>
+                    <a:ln w="12700">
+                      <a:solidFill>
+                        <a:schemeClr val="bg1"/>
+                      </a:solidFill>
+                      <a:miter lim="800000"/>
+                      <a:headEnd type="none" w="lg" len="med"/>
+                      <a:tailEnd type="none" w="lg" len="med"/>
+                    </a:ln>
+                    <a:effectLst/>
+                  </p:spPr>
+                  <p:txBody>
+                    <a:bodyPr anchor="ctr">
+                      <a:spAutoFit/>
+                    </a:bodyPr>
+                    <a:lstStyle/>
+                    <a:p>
+                      <a:endParaRPr lang="en-US"/>
+                    </a:p>
+                  </p:txBody>
+                </p:sp>
+                <p:pic>
+                  <p:nvPicPr>
+                    <p:cNvPr id="171" name="Picture 170">
+                      <a:extLst>
+                        <a:ext uri="{FF2B5EF4-FFF2-40B4-BE49-F238E27FC236}">
+                          <a16:creationId xmlns:a16="http://schemas.microsoft.com/office/drawing/2014/main" id="{E0253E3F-CD63-4463-963A-621F2B39BCC3}"/>
+                        </a:ext>
+                      </a:extLst>
+                    </p:cNvPr>
+                    <p:cNvPicPr>
+                      <a:picLocks noChangeAspect="1"/>
+                    </p:cNvPicPr>
+                    <p:nvPr>
+                      <p:custDataLst>
+                        <p:tags r:id="rId4"/>
+                      </p:custDataLst>
+                    </p:nvPr>
+                  </p:nvPicPr>
+                  <p:blipFill>
+                    <a:blip r:embed="rId11">
+                      <a:extLst>
+                        <a:ext uri="{28A0092B-C50C-407E-A947-70E740481C1C}">
+                          <a14:useLocalDpi xmlns:a14="http://schemas.microsoft.com/office/drawing/2010/main" val="0"/>
+                        </a:ext>
+                      </a:extLst>
+                    </a:blip>
+                    <a:stretch>
+                      <a:fillRect/>
+                    </a:stretch>
+                  </p:blipFill>
+                  <p:spPr>
+                    <a:xfrm>
+                      <a:off x="4841000" y="3141181"/>
+                      <a:ext cx="224000" cy="216381"/>
+                    </a:xfrm>
+                    <a:prstGeom prst="rect">
+                      <a:avLst/>
+                    </a:prstGeom>
+                    <a:solidFill>
+                      <a:schemeClr val="bg1"/>
+                    </a:solidFill>
+                  </p:spPr>
+                </p:pic>
+                <p:cxnSp>
+                  <p:nvCxnSpPr>
+                    <p:cNvPr id="172" name="Straight Connector 171">
+                      <a:extLst>
+                        <a:ext uri="{FF2B5EF4-FFF2-40B4-BE49-F238E27FC236}">
+                          <a16:creationId xmlns:a16="http://schemas.microsoft.com/office/drawing/2014/main" id="{0249E9FA-7BC2-49E2-85AF-6934109ED96E}"/>
+                        </a:ext>
+                      </a:extLst>
+                    </p:cNvPr>
+                    <p:cNvCxnSpPr>
+                      <a:cxnSpLocks/>
+                    </p:cNvCxnSpPr>
+                    <p:nvPr/>
+                  </p:nvCxnSpPr>
+                  <p:spPr>
+                    <a:xfrm>
+                      <a:off x="4648200" y="4191000"/>
+                      <a:ext cx="805477" cy="0"/>
+                    </a:xfrm>
+                    <a:prstGeom prst="line">
+                      <a:avLst/>
+                    </a:prstGeom>
+                    <a:ln w="28575">
+                      <a:solidFill>
+                        <a:srgbClr val="C00000"/>
+                      </a:solidFill>
+                      <a:prstDash val="dash"/>
+                    </a:ln>
+                  </p:spPr>
+                  <p:style>
+                    <a:lnRef idx="1">
+                      <a:schemeClr val="accent1"/>
+                    </a:lnRef>
+                    <a:fillRef idx="0">
+                      <a:schemeClr val="accent1"/>
+                    </a:fillRef>
+                    <a:effectRef idx="0">
+                      <a:schemeClr val="accent1"/>
+                    </a:effectRef>
+                    <a:fontRef idx="minor">
+                      <a:schemeClr val="tx1"/>
+                    </a:fontRef>
+                  </p:style>
+                </p:cxnSp>
+                <p:cxnSp>
+                  <p:nvCxnSpPr>
+                    <p:cNvPr id="194" name="Straight Connector 193">
+                      <a:extLst>
+                        <a:ext uri="{FF2B5EF4-FFF2-40B4-BE49-F238E27FC236}">
+                          <a16:creationId xmlns:a16="http://schemas.microsoft.com/office/drawing/2014/main" id="{19C07A9B-7209-4963-929D-074F72D054DE}"/>
+                        </a:ext>
+                      </a:extLst>
+                    </p:cNvPr>
+                    <p:cNvCxnSpPr>
+                      <a:cxnSpLocks/>
+                    </p:cNvCxnSpPr>
+                    <p:nvPr/>
+                  </p:nvCxnSpPr>
+                  <p:spPr>
+                    <a:xfrm>
+                      <a:off x="4635061" y="2501710"/>
+                      <a:ext cx="3626904" cy="0"/>
+                    </a:xfrm>
+                    <a:prstGeom prst="line">
+                      <a:avLst/>
+                    </a:prstGeom>
+                    <a:ln w="28575">
+                      <a:solidFill>
+                        <a:srgbClr val="C00000"/>
+                      </a:solidFill>
+                      <a:prstDash val="dash"/>
+                    </a:ln>
+                  </p:spPr>
+                  <p:style>
+                    <a:lnRef idx="1">
+                      <a:schemeClr val="accent1"/>
+                    </a:lnRef>
+                    <a:fillRef idx="0">
+                      <a:schemeClr val="accent1"/>
+                    </a:fillRef>
+                    <a:effectRef idx="0">
+                      <a:schemeClr val="accent1"/>
+                    </a:effectRef>
+                    <a:fontRef idx="minor">
+                      <a:schemeClr val="tx1"/>
+                    </a:fontRef>
+                  </p:style>
+                </p:cxnSp>
+                <p:sp>
+                  <p:nvSpPr>
+                    <p:cNvPr id="195" name="Line 140 2">
+                      <a:extLst>
+                        <a:ext uri="{FF2B5EF4-FFF2-40B4-BE49-F238E27FC236}">
+                          <a16:creationId xmlns:a16="http://schemas.microsoft.com/office/drawing/2014/main" id="{536D944B-64E8-49A4-BB0D-90B6419F9073}"/>
+                        </a:ext>
+                      </a:extLst>
+                    </p:cNvPr>
+                    <p:cNvSpPr>
+                      <a:spLocks noChangeShapeType="1"/>
+                    </p:cNvSpPr>
+                    <p:nvPr/>
+                  </p:nvSpPr>
+                  <p:spPr bwMode="auto">
+                    <a:xfrm>
+                      <a:off x="7112254" y="2501710"/>
+                      <a:ext cx="1149712" cy="0"/>
+                    </a:xfrm>
+                    <a:prstGeom prst="line">
+                      <a:avLst/>
+                    </a:prstGeom>
+                    <a:noFill/>
+                    <a:ln w="12700">
+                      <a:solidFill>
+                        <a:schemeClr val="tx1"/>
+                      </a:solidFill>
+                      <a:round/>
+                      <a:headEnd type="none" w="lg" len="med"/>
+                      <a:tailEnd type="none" w="lg" len="med"/>
+                    </a:ln>
+                    <a:effectLst/>
+                  </p:spPr>
+                  <p:txBody>
+                    <a:bodyPr wrap="square" anchor="ctr">
+                      <a:spAutoFit/>
+                    </a:bodyPr>
+                    <a:lstStyle/>
+                    <a:p>
+                      <a:endParaRPr lang="en-US" dirty="0"/>
+                    </a:p>
+                  </p:txBody>
+                </p:sp>
+              </p:grpSp>
+              <p:cxnSp>
+                <p:nvCxnSpPr>
+                  <p:cNvPr id="138" name="Straight Connector 137">
+                    <a:extLst>
+                      <a:ext uri="{FF2B5EF4-FFF2-40B4-BE49-F238E27FC236}">
+                        <a16:creationId xmlns:a16="http://schemas.microsoft.com/office/drawing/2014/main" id="{9E27EA13-4552-44AC-8EB8-73A225A9FB59}"/>
+                      </a:ext>
+                    </a:extLst>
+                  </p:cNvPr>
+                  <p:cNvCxnSpPr>
+                    <a:cxnSpLocks/>
+                  </p:cNvCxnSpPr>
+                  <p:nvPr/>
+                </p:nvCxnSpPr>
+                <p:spPr>
+                  <a:xfrm>
+                    <a:off x="2890277" y="3538521"/>
+                    <a:ext cx="1137667" cy="0"/>
+                  </a:xfrm>
+                  <a:prstGeom prst="line">
+                    <a:avLst/>
+                  </a:prstGeom>
+                  <a:ln w="28575">
+                    <a:solidFill>
+                      <a:srgbClr val="C00000"/>
+                    </a:solidFill>
+                    <a:prstDash val="dash"/>
+                  </a:ln>
+                </p:spPr>
+                <p:style>
+                  <a:lnRef idx="1">
+                    <a:schemeClr val="accent1"/>
+                  </a:lnRef>
+                  <a:fillRef idx="0">
+                    <a:schemeClr val="accent1"/>
+                  </a:fillRef>
+                  <a:effectRef idx="0">
+                    <a:schemeClr val="accent1"/>
+                  </a:effectRef>
+                  <a:fontRef idx="minor">
+                    <a:schemeClr val="tx1"/>
+                  </a:fontRef>
+                </p:style>
+              </p:cxnSp>
+              <p:sp>
+                <p:nvSpPr>
+                  <p:cNvPr id="139" name="Line 6 4">
+                    <a:extLst>
+                      <a:ext uri="{FF2B5EF4-FFF2-40B4-BE49-F238E27FC236}">
+                        <a16:creationId xmlns:a16="http://schemas.microsoft.com/office/drawing/2014/main" id="{FB79EE5B-E09C-41DB-B666-90D0B8F2008C}"/>
+                      </a:ext>
+                    </a:extLst>
+                  </p:cNvPr>
+                  <p:cNvSpPr>
+                    <a:spLocks noChangeShapeType="1"/>
+                  </p:cNvSpPr>
+                  <p:nvPr/>
+                </p:nvSpPr>
+                <p:spPr bwMode="auto">
+                  <a:xfrm>
+                    <a:off x="3419412" y="2282811"/>
+                    <a:ext cx="0" cy="1241471"/>
+                  </a:xfrm>
+                  <a:prstGeom prst="line">
+                    <a:avLst/>
+                  </a:prstGeom>
+                  <a:noFill/>
+                  <a:ln w="28575">
+                    <a:solidFill>
+                      <a:schemeClr val="tx1"/>
+                    </a:solidFill>
+                    <a:round/>
+                    <a:headEnd type="triangle" w="lg" len="med"/>
+                    <a:tailEnd type="triangle" w="lg" len="med"/>
+                  </a:ln>
+                  <a:effectLst/>
+                </p:spPr>
+                <p:txBody>
+                  <a:bodyPr wrap="none" anchor="ctr"/>
+                  <a:lstStyle/>
+                  <a:p>
+                    <a:endParaRPr lang="en-US" dirty="0"/>
+                  </a:p>
+                </p:txBody>
+              </p:sp>
+              <p:pic>
+                <p:nvPicPr>
+                  <p:cNvPr id="140" name="Picture 139">
+                    <a:extLst>
+                      <a:ext uri="{FF2B5EF4-FFF2-40B4-BE49-F238E27FC236}">
+                        <a16:creationId xmlns:a16="http://schemas.microsoft.com/office/drawing/2014/main" id="{3ECABDF2-FE70-48FB-BDBB-DF2650ABD9AB}"/>
+                      </a:ext>
+                    </a:extLst>
+                  </p:cNvPr>
+                  <p:cNvPicPr>
+                    <a:picLocks noChangeAspect="1"/>
+                  </p:cNvPicPr>
+                  <p:nvPr>
+                    <p:custDataLst>
+                      <p:tags r:id="rId2"/>
+                    </p:custDataLst>
+                  </p:nvPr>
+                </p:nvPicPr>
+                <p:blipFill>
+                  <a:blip r:embed="rId12">
+                    <a:extLst>
+                      <a:ext uri="{28A0092B-C50C-407E-A947-70E740481C1C}">
+                        <a14:useLocalDpi xmlns:a14="http://schemas.microsoft.com/office/drawing/2010/main" val="0"/>
+                      </a:ext>
+                    </a:extLst>
+                  </a:blip>
+                  <a:stretch>
+                    <a:fillRect/>
+                  </a:stretch>
+                </p:blipFill>
+                <p:spPr>
+                  <a:xfrm>
+                    <a:off x="3038182" y="2823080"/>
+                    <a:ext cx="614095" cy="214857"/>
+                  </a:xfrm>
+                  <a:prstGeom prst="rect">
+                    <a:avLst/>
+                  </a:prstGeom>
+                  <a:solidFill>
+                    <a:schemeClr val="bg1"/>
+                  </a:solidFill>
+                </p:spPr>
+              </p:pic>
+              <p:pic>
+                <p:nvPicPr>
+                  <p:cNvPr id="141" name="Picture 140">
+                    <a:extLst>
+                      <a:ext uri="{FF2B5EF4-FFF2-40B4-BE49-F238E27FC236}">
+                        <a16:creationId xmlns:a16="http://schemas.microsoft.com/office/drawing/2014/main" id="{548F6BAC-B015-43FA-ABD4-718BAF82BF02}"/>
+                      </a:ext>
+                    </a:extLst>
+                  </p:cNvPr>
+                  <p:cNvPicPr>
+                    <a:picLocks noChangeAspect="1"/>
+                  </p:cNvPicPr>
+                  <p:nvPr>
+                    <p:custDataLst>
+                      <p:tags r:id="rId3"/>
+                    </p:custDataLst>
+                  </p:nvPr>
+                </p:nvPicPr>
+                <p:blipFill>
+                  <a:blip r:embed="rId13">
+                    <a:extLst>
+                      <a:ext uri="{28A0092B-C50C-407E-A947-70E740481C1C}">
+                        <a14:useLocalDpi xmlns:a14="http://schemas.microsoft.com/office/drawing/2010/main" val="0"/>
+                      </a:ext>
+                    </a:extLst>
+                  </a:blip>
+                  <a:stretch>
+                    <a:fillRect/>
+                  </a:stretch>
+                </p:blipFill>
+                <p:spPr>
+                  <a:xfrm>
+                    <a:off x="-441478" y="5024956"/>
+                    <a:ext cx="6598091" cy="230095"/>
+                  </a:xfrm>
+                  <a:prstGeom prst="rect">
+                    <a:avLst/>
+                  </a:prstGeom>
+                  <a:solidFill>
+                    <a:schemeClr val="bg1"/>
+                  </a:solidFill>
+                </p:spPr>
+              </p:pic>
+            </p:grpSp>
+            <p:pic>
+              <p:nvPicPr>
+                <p:cNvPr id="136" name="Picture 135">
+                  <a:extLst>
+                    <a:ext uri="{FF2B5EF4-FFF2-40B4-BE49-F238E27FC236}">
+                      <a16:creationId xmlns:a16="http://schemas.microsoft.com/office/drawing/2014/main" id="{1FFBD365-A153-42D5-93FA-D32C8BF9E8A9}"/>
+                    </a:ext>
+                  </a:extLst>
+                </p:cNvPr>
+                <p:cNvPicPr>
+                  <a:picLocks noChangeAspect="1"/>
+                </p:cNvPicPr>
+                <p:nvPr>
+                  <p:custDataLst>
+                    <p:tags r:id="rId1"/>
+                  </p:custDataLst>
+                </p:nvPr>
+              </p:nvPicPr>
+              <p:blipFill>
+                <a:blip r:embed="rId14">
+                  <a:extLst>
+                    <a:ext uri="{28A0092B-C50C-407E-A947-70E740481C1C}">
+                      <a14:useLocalDpi xmlns:a14="http://schemas.microsoft.com/office/drawing/2010/main" val="0"/>
+                    </a:ext>
+                  </a:extLst>
+                </a:blip>
+                <a:stretch>
+                  <a:fillRect/>
+                </a:stretch>
+              </p:blipFill>
+              <p:spPr>
+                <a:xfrm>
+                  <a:off x="-1175738" y="3447974"/>
+                  <a:ext cx="7396568" cy="528762"/>
+                </a:xfrm>
+                <a:prstGeom prst="rect">
+                  <a:avLst/>
+                </a:prstGeom>
+                <a:solidFill>
+                  <a:schemeClr val="bg1"/>
+                </a:solidFill>
+              </p:spPr>
+            </p:pic>
+          </p:grpSp>
+          <p:sp>
+            <p:nvSpPr>
+              <p:cNvPr id="287" name="Line 6 2">
+                <a:extLst>
+                  <a:ext uri="{FF2B5EF4-FFF2-40B4-BE49-F238E27FC236}">
+                    <a16:creationId xmlns:a16="http://schemas.microsoft.com/office/drawing/2014/main" id="{A2EC703D-D8FC-4D44-9F7F-8EE6813815F4}"/>
+                  </a:ext>
+                </a:extLst>
+              </p:cNvPr>
+              <p:cNvSpPr>
+                <a:spLocks noChangeShapeType="1"/>
+              </p:cNvSpPr>
+              <p:nvPr/>
+            </p:nvSpPr>
+            <p:spPr bwMode="auto">
+              <a:xfrm>
+                <a:off x="1375520" y="6656276"/>
+                <a:ext cx="0" cy="414909"/>
+              </a:xfrm>
+              <a:prstGeom prst="line">
+                <a:avLst/>
+              </a:prstGeom>
+              <a:noFill/>
+              <a:ln w="28575">
+                <a:solidFill>
+                  <a:schemeClr val="tx1"/>
+                </a:solidFill>
+                <a:round/>
+                <a:headEnd type="none" w="lg" len="med"/>
+                <a:tailEnd type="triangle" w="lg" len="med"/>
+              </a:ln>
+              <a:effectLst/>
+            </p:spPr>
+            <p:txBody>
+              <a:bodyPr wrap="none" anchor="ctr"/>
+              <a:lstStyle/>
+              <a:p>
+                <a:endParaRPr lang="en-US" dirty="0"/>
+              </a:p>
+            </p:txBody>
+          </p:sp>
+          <p:sp>
+            <p:nvSpPr>
+              <p:cNvPr id="288" name="TextBox 287">
+                <a:extLst>
+                  <a:ext uri="{FF2B5EF4-FFF2-40B4-BE49-F238E27FC236}">
+                    <a16:creationId xmlns:a16="http://schemas.microsoft.com/office/drawing/2014/main" id="{D28121E1-C862-4043-BF38-2FEF3256D548}"/>
+                  </a:ext>
+                </a:extLst>
+              </p:cNvPr>
+              <p:cNvSpPr txBox="1"/>
+              <p:nvPr/>
+            </p:nvSpPr>
+            <p:spPr>
+              <a:xfrm>
+                <a:off x="1003569" y="6363011"/>
+                <a:ext cx="710516" cy="369332"/>
+              </a:xfrm>
+              <a:prstGeom prst="rect">
+                <a:avLst/>
+              </a:prstGeom>
+              <a:noFill/>
+            </p:spPr>
+            <p:txBody>
+              <a:bodyPr wrap="none" rtlCol="0">
+                <a:spAutoFit/>
+              </a:bodyPr>
+              <a:lstStyle/>
+              <a:p>
+                <a:r>
+                  <a:rPr lang="en-US" dirty="0">
+                    <a:latin typeface="Times New Roman" panose="02020603050405020304" pitchFamily="18" charset="0"/>
+                    <a:cs typeface="Times New Roman" panose="02020603050405020304" pitchFamily="18" charset="0"/>
+                  </a:rPr>
+                  <a:t>Valve</a:t>
+                </a:r>
+              </a:p>
+            </p:txBody>
+          </p:sp>
+          <p:sp>
+            <p:nvSpPr>
+              <p:cNvPr id="289" name="Left Brace 288">
+                <a:extLst>
+                  <a:ext uri="{FF2B5EF4-FFF2-40B4-BE49-F238E27FC236}">
+                    <a16:creationId xmlns:a16="http://schemas.microsoft.com/office/drawing/2014/main" id="{AA7707E4-9E8D-4B43-AA9D-F80187C0AB68}"/>
+                  </a:ext>
+                </a:extLst>
+              </p:cNvPr>
+              <p:cNvSpPr/>
+              <p:nvPr/>
+            </p:nvSpPr>
+            <p:spPr>
+              <a:xfrm flipH="1">
+                <a:off x="4575698" y="4879731"/>
+                <a:ext cx="663550" cy="1837919"/>
+              </a:xfrm>
+              <a:prstGeom prst="leftBrace">
+                <a:avLst>
+                  <a:gd name="adj1" fmla="val 8333"/>
+                  <a:gd name="adj2" fmla="val 47728"/>
+                </a:avLst>
+              </a:prstGeom>
+              <a:ln w="38100">
+                <a:solidFill>
+                  <a:schemeClr val="tx1"/>
+                </a:solidFill>
+              </a:ln>
+            </p:spPr>
+            <p:style>
+              <a:lnRef idx="1">
+                <a:schemeClr val="accent1"/>
+              </a:lnRef>
+              <a:fillRef idx="0">
+                <a:schemeClr val="accent1"/>
+              </a:fillRef>
+              <a:effectRef idx="0">
+                <a:schemeClr val="accent1"/>
+              </a:effectRef>
+              <a:fontRef idx="minor">
+                <a:schemeClr val="tx1"/>
+              </a:fontRef>
+            </p:style>
+            <p:txBody>
+              <a:bodyPr rtlCol="0" anchor="ctr"/>
+              <a:lstStyle/>
+              <a:p>
+                <a:pPr algn="ctr"/>
+                <a:endParaRPr lang="en-US" dirty="0"/>
+              </a:p>
+            </p:txBody>
+          </p:sp>
+          <p:sp>
+            <p:nvSpPr>
+              <p:cNvPr id="290" name="TextBox 289">
+                <a:extLst>
+                  <a:ext uri="{FF2B5EF4-FFF2-40B4-BE49-F238E27FC236}">
+                    <a16:creationId xmlns:a16="http://schemas.microsoft.com/office/drawing/2014/main" id="{CB2E6029-74FA-4C66-9BC3-262A9E2B2349}"/>
+                  </a:ext>
+                </a:extLst>
+              </p:cNvPr>
+              <p:cNvSpPr txBox="1"/>
+              <p:nvPr/>
+            </p:nvSpPr>
+            <p:spPr>
+              <a:xfrm>
+                <a:off x="5384306" y="5569426"/>
+                <a:ext cx="643061" cy="369332"/>
+              </a:xfrm>
+              <a:prstGeom prst="rect">
+                <a:avLst/>
+              </a:prstGeom>
+              <a:noFill/>
+            </p:spPr>
+            <p:txBody>
+              <a:bodyPr wrap="none" rtlCol="0">
+                <a:spAutoFit/>
+              </a:bodyPr>
+              <a:lstStyle/>
+              <a:p>
+                <a:r>
+                  <a:rPr lang="en-US" dirty="0">
+                    <a:latin typeface="Times New Roman" panose="02020603050405020304" pitchFamily="18" charset="0"/>
+                    <a:cs typeface="Times New Roman" panose="02020603050405020304" pitchFamily="18" charset="0"/>
+                  </a:rPr>
+                  <a:t>Tank</a:t>
+                </a:r>
+              </a:p>
+            </p:txBody>
+          </p:sp>
+        </p:grpSp>
+        <p:sp>
+          <p:nvSpPr>
+            <p:cNvPr id="291" name="TextBox 290">
+              <a:extLst>
+                <a:ext uri="{FF2B5EF4-FFF2-40B4-BE49-F238E27FC236}">
+                  <a16:creationId xmlns:a16="http://schemas.microsoft.com/office/drawing/2014/main" id="{CA09E465-4BBD-4935-B4A0-48CDB62E09DF}"/>
+                </a:ext>
+              </a:extLst>
+            </p:cNvPr>
+            <p:cNvSpPr txBox="1"/>
+            <p:nvPr/>
+          </p:nvSpPr>
+          <p:spPr>
+            <a:xfrm>
+              <a:off x="2214601" y="7246470"/>
+              <a:ext cx="1846146" cy="369332"/>
+            </a:xfrm>
+            <a:prstGeom prst="rect">
+              <a:avLst/>
+            </a:prstGeom>
+            <a:noFill/>
+          </p:spPr>
+          <p:txBody>
+            <a:bodyPr wrap="none" rtlCol="0">
+              <a:spAutoFit/>
+            </a:bodyPr>
+            <a:lstStyle/>
+            <a:p>
+              <a:r>
+                <a:rPr lang="en-US" dirty="0">
+                  <a:latin typeface="Times New Roman" panose="02020603050405020304" pitchFamily="18" charset="0"/>
+                  <a:cs typeface="Times New Roman" panose="02020603050405020304" pitchFamily="18" charset="0"/>
+                </a:rPr>
+                <a:t>Water source pipe</a:t>
+              </a:r>
+            </a:p>
+          </p:txBody>
+        </p:sp>
+      </p:grpSp>
     </p:spTree>
     <p:extLst>
       <p:ext uri="{BB962C8B-B14F-4D97-AF65-F5344CB8AC3E}">
@@ -18146,6 +22021,63 @@
   <p:tag name="LATEXADDIN" val="\documentclass{article}&#10;\usepackage{amsmath}&#10;\usepackage{xcolor}&#10;\pagestyle{empty}&#10;\begin{document}&#10;&#10;\definecolor{Monred}{RGB}{172,0,0}&#10;&#10;&#10;$$\Delta h$$&#10;&#10;\end{document}"/>
   <p:tag name="IGUANATEXSIZE" val="20"/>
   <p:tag name="IGUANATEXCURSOR" val="150"/>
+  <p:tag name="TRANSPARENCY" val="True"/>
+  <p:tag name="FILENAME" val=""/>
+  <p:tag name="LATEXENGINEID" val="0"/>
+  <p:tag name="TEMPFOLDER" val="c:\temp\"/>
+  <p:tag name="LATEXFORMHEIGHT" val="312"/>
+  <p:tag name="LATEXFORMWIDTH" val="384"/>
+  <p:tag name="LATEXFORMWRAP" val="True"/>
+  <p:tag name="BITMAPVECTOR" val="0"/>
+</p:tagLst>
+</file>
+
+<file path=ppt/tags/tag10.xml><?xml version="1.0" encoding="utf-8"?>
+<p:tagLst xmlns:a="http://schemas.openxmlformats.org/drawingml/2006/main" xmlns:r="http://schemas.openxmlformats.org/officeDocument/2006/relationships" xmlns:p="http://schemas.openxmlformats.org/presentationml/2006/main">
+  <p:tag name="OUTPUTDPI" val="1200"/>
+  <p:tag name="ORIGINALHEIGHT" val="105.7368"/>
+  <p:tag name="ORIGINALWIDTH" val="302.2122"/>
+  <p:tag name="LATEXADDIN" val="\documentclass{article}&#10;\usepackage{amsmath}&#10;\usepackage{xcolor}&#10;\pagestyle{empty}&#10;\begin{document}&#10;&#10;\definecolor{Monred}{RGB}{172,0,0}&#10;&#10;$$h_{Tank}$$&#10;&#10;&#10;\end{document}"/>
+  <p:tag name="IGUANATEXSIZE" val="20"/>
+  <p:tag name="IGUANATEXCURSOR" val="147"/>
+  <p:tag name="TRANSPARENCY" val="True"/>
+  <p:tag name="FILENAME" val=""/>
+  <p:tag name="LATEXENGINEID" val="0"/>
+  <p:tag name="TEMPFOLDER" val="c:\temp\"/>
+  <p:tag name="LATEXFORMHEIGHT" val="312"/>
+  <p:tag name="LATEXFORMWIDTH" val="384"/>
+  <p:tag name="LATEXFORMWRAP" val="True"/>
+  <p:tag name="BITMAPVECTOR" val="0"/>
+</p:tagLst>
+</file>
+
+<file path=ppt/tags/tag11.xml><?xml version="1.0" encoding="utf-8"?>
+<p:tagLst xmlns:a="http://schemas.openxmlformats.org/drawingml/2006/main" xmlns:r="http://schemas.openxmlformats.org/officeDocument/2006/relationships" xmlns:p="http://schemas.openxmlformats.org/presentationml/2006/main">
+  <p:tag name="OUTPUTDPI" val="1200"/>
+  <p:tag name="ORIGINALHEIGHT" val="113.2358"/>
+  <p:tag name="ORIGINALWIDTH" val="3247.094"/>
+  <p:tag name="LATEXADDIN" val="\documentclass{article}&#10;\usepackage{amsmath}&#10;\usepackage{xcolor}&#10;\pagestyle{empty}&#10;\begin{document}&#10;&#10;\definecolor{Monred}{RGB}{172,0,0}&#10;&#10;$Q_0$ = Initial flow rate of hypochlorite solution at time $t = 0$&#10;&#10;&#10;\end{document}"/>
+  <p:tag name="IGUANATEXSIZE" val="20"/>
+  <p:tag name="IGUANATEXCURSOR" val="203"/>
+  <p:tag name="TRANSPARENCY" val="True"/>
+  <p:tag name="FILENAME" val=""/>
+  <p:tag name="LATEXENGINEID" val="0"/>
+  <p:tag name="TEMPFOLDER" val="c:\temp\"/>
+  <p:tag name="LATEXFORMHEIGHT" val="312"/>
+  <p:tag name="LATEXFORMWIDTH" val="384"/>
+  <p:tag name="LATEXFORMWRAP" val="True"/>
+  <p:tag name="BITMAPVECTOR" val="0"/>
+</p:tagLst>
+</file>
+
+<file path=ppt/tags/tag12.xml><?xml version="1.0" encoding="utf-8"?>
+<p:tagLst xmlns:a="http://schemas.openxmlformats.org/drawingml/2006/main" xmlns:r="http://schemas.openxmlformats.org/officeDocument/2006/relationships" xmlns:p="http://schemas.openxmlformats.org/presentationml/2006/main">
+  <p:tag name="OUTPUTDPI" val="1200"/>
+  <p:tag name="ORIGINALHEIGHT" val="106.4867"/>
+  <p:tag name="ORIGINALWIDTH" val="110.2362"/>
+  <p:tag name="LATEXADDIN" val="\documentclass{article}&#10;\usepackage{amsmath}&#10;\usepackage{xcolor}&#10;\pagestyle{empty}&#10;\begin{document}&#10;&#10;\definecolor{Monred}{RGB}{172,0,0}&#10;&#10;$$h_0$$&#10;&#10;&#10;\end{document}"/>
+  <p:tag name="IGUANATEXSIZE" val="20"/>
+  <p:tag name="IGUANATEXCURSOR" val="144"/>
   <p:tag name="TRANSPARENCY" val="True"/>
   <p:tag name="FILENAME" val=""/>
   <p:tag name="LATEXENGINEID" val="0"/>
@@ -18279,6 +22211,25 @@
   <p:tag name="LATEXADDIN" val="\documentclass{article}&#10;\usepackage{amsmath}&#10;\usepackage{xcolor}&#10;\pagestyle{empty}&#10;\begin{document}&#10;&#10;\definecolor{Monred}{RGB}{172,0,0}&#10;&#10;$$h_0$$&#10;&#10;&#10;\end{document}"/>
   <p:tag name="IGUANATEXSIZE" val="20"/>
   <p:tag name="IGUANATEXCURSOR" val="144"/>
+  <p:tag name="TRANSPARENCY" val="True"/>
+  <p:tag name="FILENAME" val=""/>
+  <p:tag name="LATEXENGINEID" val="0"/>
+  <p:tag name="TEMPFOLDER" val="c:\temp\"/>
+  <p:tag name="LATEXFORMHEIGHT" val="312"/>
+  <p:tag name="LATEXFORMWIDTH" val="384"/>
+  <p:tag name="LATEXFORMWRAP" val="True"/>
+  <p:tag name="BITMAPVECTOR" val="0"/>
+</p:tagLst>
+</file>
+
+<file path=ppt/tags/tag9.xml><?xml version="1.0" encoding="utf-8"?>
+<p:tagLst xmlns:a="http://schemas.openxmlformats.org/drawingml/2006/main" xmlns:r="http://schemas.openxmlformats.org/officeDocument/2006/relationships" xmlns:p="http://schemas.openxmlformats.org/presentationml/2006/main">
+  <p:tag name="OUTPUTDPI" val="1200"/>
+  <p:tag name="ORIGINALHEIGHT" val="260.2175"/>
+  <p:tag name="ORIGINALWIDTH" val="3640.045"/>
+  <p:tag name="LATEXADDIN" val="\documentclass{article}&#10;\usepackage{amsmath}&#10;\usepackage{xcolor}&#10;\pagestyle{empty}&#10;\begin{document}&#10;&#10;\definecolor{Monred}{RGB}{172,0,0}&#10;&#10;$t_{Design}$ = Time it would take to drain the tank if flow was held \\ constant at $Q_0$&#10;&#10;&#10;\end{document}"/>
+  <p:tag name="IGUANATEXSIZE" val="20"/>
+  <p:tag name="IGUANATEXCURSOR" val="208"/>
   <p:tag name="TRANSPARENCY" val="True"/>
   <p:tag name="FILENAME" val=""/>
   <p:tag name="LATEXENGINEID" val="0"/>

</xml_diff>